<commit_message>
Added videos for Unit 3.
</commit_message>
<xml_diff>
--- a/lectures/CourseAdmin.pptx
+++ b/lectures/CourseAdmin.pptx
@@ -222,7 +222,7 @@
           <a:p>
             <a:fld id="{B7D6DDD3-D7E9-488B-B626-1E8285E424D8}" type="datetimeFigureOut">
               <a:rPr lang="en-US" smtClean="0"/>
-              <a:t>1/18/2019</a:t>
+              <a:t>8/19/2020</a:t>
             </a:fld>
             <a:endParaRPr lang="en-US"/>
           </a:p>
@@ -5243,7 +5243,7 @@
             <a:pPr lvl="1"/>
             <a:r>
               <a:rPr lang="en-US" dirty="0"/>
-              <a:t>Make sure you get 3.6</a:t>
+              <a:t>Make sure you get 3.7</a:t>
             </a:r>
           </a:p>
           <a:p>
@@ -5838,7 +5838,15 @@
           <a:p>
             <a:r>
               <a:rPr lang="en-US" dirty="0"/>
-              <a:t>Grad EL 6123:  Intro to Machine Learning</a:t>
+              <a:t>Grad EL</a:t>
+            </a:r>
+            <a:r>
+              <a:rPr lang="es-ES" dirty="0"/>
+              <a:t>-GY</a:t>
+            </a:r>
+            <a:r>
+              <a:rPr lang="en-US" dirty="0"/>
+              <a:t> 6143:  Intro to Machine Learning</a:t>
             </a:r>
           </a:p>
           <a:p>

</xml_diff>

<commit_message>
Re-recorded the Unit 3 videos to improve audio quality.
</commit_message>
<xml_diff>
--- a/lectures/CourseAdmin.pptx
+++ b/lectures/CourseAdmin.pptx
@@ -222,7 +222,7 @@
           <a:p>
             <a:fld id="{B7D6DDD3-D7E9-488B-B626-1E8285E424D8}" type="datetimeFigureOut">
               <a:rPr lang="en-US" smtClean="0"/>
-              <a:t>8/19/2020</a:t>
+              <a:t>8/22/2020</a:t>
             </a:fld>
             <a:endParaRPr lang="en-US"/>
           </a:p>
@@ -5467,58 +5467,34 @@
           </a:p>
           <a:p>
             <a:pPr lvl="1"/>
-            <a:r>
-              <a:rPr lang="en-US" dirty="0"/>
-              <a:t>Office Hours:  Thursdays, 2-4pm</a:t>
-            </a:r>
-          </a:p>
-          <a:p>
-            <a:pPr lvl="1"/>
             <a:endParaRPr lang="en-US" dirty="0"/>
           </a:p>
           <a:p>
             <a:r>
               <a:rPr lang="de-DE" dirty="0"/>
-              <a:t>Head TAs:  </a:t>
+              <a:t>Head TA:  </a:t>
             </a:r>
           </a:p>
           <a:p>
             <a:pPr lvl="1"/>
             <a:r>
               <a:rPr lang="de-DE" dirty="0"/>
-              <a:t>Juntao Chen </a:t>
-            </a:r>
-            <a:r>
-              <a:rPr lang="de-DE" dirty="0">
+              <a:t>William Xia </a:t>
+            </a:r>
+            <a:r>
+              <a:rPr lang="en-US" sz="1800" u="sng" dirty="0">
+                <a:solidFill>
+                  <a:srgbClr val="0000FF"/>
+                </a:solidFill>
+                <a:effectLst/>
+                <a:latin typeface="Calibri" panose="020F0502020204030204" pitchFamily="34" charset="0"/>
+                <a:ea typeface="Calibri" panose="020F0502020204030204" pitchFamily="34" charset="0"/>
+                <a:cs typeface="Times New Roman" panose="02020603050405020304" pitchFamily="18" charset="0"/>
                 <a:hlinkClick r:id="rId3"/>
               </a:rPr>
-              <a:t>jc6412@nyu.edu</a:t>
+              <a:t>wx312@nyu.edu</a:t>
             </a:r>
             <a:endParaRPr lang="de-DE" dirty="0"/>
-          </a:p>
-          <a:p>
-            <a:pPr lvl="1"/>
-            <a:r>
-              <a:rPr lang="de-DE" dirty="0"/>
-              <a:t>Amirhossein Khalilian-Gourtani </a:t>
-            </a:r>
-            <a:r>
-              <a:rPr lang="de-DE" dirty="0">
-                <a:hlinkClick r:id="rId4"/>
-              </a:rPr>
-              <a:t>akg404@nyu.edu</a:t>
-            </a:r>
-            <a:r>
-              <a:rPr lang="de-DE" dirty="0"/>
-              <a:t> </a:t>
-            </a:r>
-          </a:p>
-          <a:p>
-            <a:pPr lvl="1"/>
-            <a:r>
-              <a:rPr lang="de-DE" dirty="0"/>
-              <a:t>Office Hours: TBD</a:t>
-            </a:r>
           </a:p>
           <a:p>
             <a:pPr lvl="1"/>

</xml_diff>

<commit_message>
Added the in-class versions
</commit_message>
<xml_diff>
--- a/lectures/CourseAdmin.pptx
+++ b/lectures/CourseAdmin.pptx
@@ -222,7 +222,7 @@
           <a:p>
             <a:fld id="{B7D6DDD3-D7E9-488B-B626-1E8285E424D8}" type="datetimeFigureOut">
               <a:rPr lang="en-US" smtClean="0"/>
-              <a:t>9/9/2020</a:t>
+              <a:t>9/2/2021</a:t>
             </a:fld>
             <a:endParaRPr lang="en-US"/>
           </a:p>
@@ -4318,7 +4318,7 @@
         <p:spPr/>
         <p:txBody>
           <a:bodyPr>
-            <a:normAutofit lnSpcReduction="10000"/>
+            <a:normAutofit/>
           </a:bodyPr>
           <a:lstStyle/>
           <a:p>
@@ -4359,13 +4359,6 @@
             <a:r>
               <a:rPr lang="en-US" dirty="0"/>
               <a:t> of 2 preferred</a:t>
-            </a:r>
-          </a:p>
-          <a:p>
-            <a:pPr lvl="1"/>
-            <a:r>
-              <a:rPr lang="en-US" dirty="0"/>
-              <a:t>In NYU Classes, join a group “project1, project2, …”  </a:t>
             </a:r>
           </a:p>
           <a:p>
@@ -5243,7 +5236,7 @@
             <a:pPr lvl="1"/>
             <a:r>
               <a:rPr lang="en-US" dirty="0"/>
-              <a:t>Make sure you get 3.7</a:t>
+              <a:t>Make sure you get 3.9</a:t>
             </a:r>
           </a:p>
           <a:p>
@@ -5462,7 +5455,15 @@
             <a:pPr lvl="1"/>
             <a:r>
               <a:rPr lang="en-US" dirty="0"/>
-              <a:t>2 MetroTech Center 9.104</a:t>
+              <a:t>370 Jay St, 9</a:t>
+            </a:r>
+            <a:r>
+              <a:rPr lang="en-US" baseline="30000" dirty="0"/>
+              <a:t>th</a:t>
+            </a:r>
+            <a:r>
+              <a:rPr lang="en-US" dirty="0"/>
+              <a:t> floor</a:t>
             </a:r>
           </a:p>
           <a:p>
@@ -5472,14 +5473,14 @@
           <a:p>
             <a:r>
               <a:rPr lang="de-DE" dirty="0"/>
-              <a:t>Head TA:  </a:t>
+              <a:t>Course Assistant:  </a:t>
             </a:r>
           </a:p>
           <a:p>
             <a:pPr lvl="1"/>
             <a:r>
               <a:rPr lang="de-DE" dirty="0"/>
-              <a:t>William Xia </a:t>
+              <a:t>Billy Sun </a:t>
             </a:r>
             <a:r>
               <a:rPr lang="en-US" sz="1800" u="sng" dirty="0">
@@ -5490,9 +5491,8 @@
                 <a:latin typeface="Calibri" panose="020F0502020204030204" pitchFamily="34" charset="0"/>
                 <a:ea typeface="Calibri" panose="020F0502020204030204" pitchFamily="34" charset="0"/>
                 <a:cs typeface="Times New Roman" panose="02020603050405020304" pitchFamily="18" charset="0"/>
-                <a:hlinkClick r:id="rId3"/>
               </a:rPr>
-              <a:t>wx312@nyu.edu</a:t>
+              <a:t>ds5749@nyu.edu</a:t>
             </a:r>
             <a:endParaRPr lang="de-DE" dirty="0"/>
           </a:p>
@@ -6578,7 +6578,7 @@
             <a:pPr lvl="1"/>
             <a:r>
               <a:rPr lang="en-US" dirty="0"/>
-              <a:t>You do not need to know python before class.  But, we will go over it quickly.</a:t>
+              <a:t>You do not need to know python before class.  But we will go over it quickly.</a:t>
             </a:r>
           </a:p>
           <a:p>
@@ -6600,7 +6600,7 @@
             <a:pPr lvl="1"/>
             <a:r>
               <a:rPr lang="en-US" dirty="0"/>
-              <a:t>You should know or being willing to learn object oriented programming </a:t>
+              <a:t>You should know or being willing to learn object-oriented programming </a:t>
             </a:r>
           </a:p>
           <a:p>
@@ -6621,7 +6621,7 @@
             </a:r>
             <a:r>
               <a:rPr lang="en-US" dirty="0"/>
-              <a:t> notebook (make sure you install Version 3.6)</a:t>
+              <a:t> notebook (make sure you install Version 3.9)</a:t>
             </a:r>
             <a:br>
               <a:rPr lang="en-US" dirty="0"/>

</xml_diff>

<commit_message>
Updated the course admin for the new material
</commit_message>
<xml_diff>
--- a/lectures/CourseAdmin.pptx
+++ b/lectures/CourseAdmin.pptx
@@ -14,11 +14,11 @@
     <p:sldId id="264" r:id="rId5"/>
     <p:sldId id="259" r:id="rId6"/>
     <p:sldId id="275" r:id="rId7"/>
-    <p:sldId id="273" r:id="rId8"/>
-    <p:sldId id="265" r:id="rId9"/>
-    <p:sldId id="260" r:id="rId10"/>
-    <p:sldId id="261" r:id="rId11"/>
-    <p:sldId id="266" r:id="rId12"/>
+    <p:sldId id="265" r:id="rId8"/>
+    <p:sldId id="260" r:id="rId9"/>
+    <p:sldId id="261" r:id="rId10"/>
+    <p:sldId id="266" r:id="rId11"/>
+    <p:sldId id="276" r:id="rId12"/>
     <p:sldId id="263" r:id="rId13"/>
     <p:sldId id="272" r:id="rId14"/>
     <p:sldId id="269" r:id="rId15"/>
@@ -223,7 +223,7 @@
           <a:p>
             <a:fld id="{B7D6DDD3-D7E9-488B-B626-1E8285E424D8}" type="datetimeFigureOut">
               <a:rPr lang="en-US" smtClean="0"/>
-              <a:t>9/2/2024</a:t>
+              <a:t>8/26/2025</a:t>
             </a:fld>
             <a:endParaRPr lang="en-US"/>
           </a:p>
@@ -4120,7 +4120,7 @@
           <a:p>
             <a:r>
               <a:rPr lang="en-US" dirty="0"/>
-              <a:t>Grading:  Undergraduate</a:t>
+              <a:t>Grading:  Graduate</a:t>
             </a:r>
           </a:p>
         </p:txBody>
@@ -4137,12 +4137,21 @@
         </p:nvSpPr>
         <p:spPr/>
         <p:txBody>
-          <a:bodyPr/>
+          <a:bodyPr>
+            <a:normAutofit/>
+          </a:bodyPr>
           <a:lstStyle/>
           <a:p>
             <a:r>
               <a:rPr lang="en-US" dirty="0"/>
-              <a:t>Midterm 1:  25%, Midterm 2: 25%, Labs, HW: 25%, Final project: 25%</a:t>
+              <a:t>Midterm 35%, Final 35%, Labs / HW 30%</a:t>
+            </a:r>
+          </a:p>
+          <a:p>
+            <a:pPr lvl="1"/>
+            <a:r>
+              <a:rPr lang="en-US" dirty="0"/>
+              <a:t>Optional project:  Up to 20%</a:t>
             </a:r>
           </a:p>
           <a:p>
@@ -4169,21 +4178,21 @@
           <a:p>
             <a:r>
               <a:rPr lang="en-US" dirty="0"/>
-              <a:t>Midterms</a:t>
+              <a:t>Midterms &amp; final</a:t>
             </a:r>
           </a:p>
           <a:p>
             <a:pPr lvl="1"/>
             <a:r>
               <a:rPr lang="en-US" dirty="0"/>
-              <a:t>Each over approx. 3-4 weeks of material</a:t>
+              <a:t>Each over approx. 6-7 weeks</a:t>
             </a:r>
           </a:p>
           <a:p>
             <a:pPr lvl="1"/>
             <a:r>
               <a:rPr lang="en-US" dirty="0"/>
-              <a:t>Closed book with cheat sheet.  </a:t>
+              <a:t>Open book but no electronic aids.</a:t>
             </a:r>
           </a:p>
           <a:p>
@@ -4196,7 +4205,7 @@
           <a:p>
             <a:r>
               <a:rPr lang="en-US" dirty="0"/>
-              <a:t>Final project:  </a:t>
+              <a:t>Optional final project:  </a:t>
             </a:r>
           </a:p>
           <a:p>
@@ -4248,7 +4257,7 @@
     </p:spTree>
     <p:extLst>
       <p:ext uri="{BB962C8B-B14F-4D97-AF65-F5344CB8AC3E}">
-        <p14:creationId xmlns:p14="http://schemas.microsoft.com/office/powerpoint/2010/main" val="2111641996"/>
+        <p14:creationId xmlns:p14="http://schemas.microsoft.com/office/powerpoint/2010/main" val="1044182445"/>
       </p:ext>
     </p:extLst>
   </p:cSld>
@@ -4277,7 +4286,13 @@
       </p:grpSpPr>
       <p:sp>
         <p:nvSpPr>
-          <p:cNvPr id="2" name="Title 1"/>
+          <p:cNvPr id="2" name="Title 1">
+            <a:extLst>
+              <a:ext uri="{FF2B5EF4-FFF2-40B4-BE49-F238E27FC236}">
+                <a16:creationId xmlns:a16="http://schemas.microsoft.com/office/drawing/2014/main" id="{73875262-9ACE-D673-7158-6A4A0659C735}"/>
+              </a:ext>
+            </a:extLst>
+          </p:cNvPr>
           <p:cNvSpPr>
             <a:spLocks noGrp="1"/>
           </p:cNvSpPr>
@@ -4292,120 +4307,2721 @@
           <a:p>
             <a:r>
               <a:rPr lang="en-US" dirty="0"/>
-              <a:t>Grading:  Graduate</a:t>
+              <a:t>Lecture Sequence</a:t>
             </a:r>
           </a:p>
         </p:txBody>
       </p:sp>
-      <p:sp>
-        <p:nvSpPr>
-          <p:cNvPr id="3" name="Content Placeholder 2"/>
-          <p:cNvSpPr>
-            <a:spLocks noGrp="1"/>
-          </p:cNvSpPr>
+      <p:graphicFrame>
+        <p:nvGraphicFramePr>
+          <p:cNvPr id="5" name="Content Placeholder 4">
+            <a:extLst>
+              <a:ext uri="{FF2B5EF4-FFF2-40B4-BE49-F238E27FC236}">
+                <a16:creationId xmlns:a16="http://schemas.microsoft.com/office/drawing/2014/main" id="{E7FC14B8-BAE2-B5F9-5584-638312DF1C1E}"/>
+              </a:ext>
+            </a:extLst>
+          </p:cNvPr>
+          <p:cNvGraphicFramePr>
+            <a:graphicFrameLocks noGrp="1"/>
+          </p:cNvGraphicFramePr>
           <p:nvPr>
             <p:ph idx="1"/>
+            <p:extLst>
+              <p:ext uri="{D42A27DB-BD31-4B8C-83A1-F6EECF244321}">
+                <p14:modId xmlns:p14="http://schemas.microsoft.com/office/powerpoint/2010/main" val="3162228220"/>
+              </p:ext>
+            </p:extLst>
           </p:nvPr>
-        </p:nvSpPr>
-        <p:spPr/>
-        <p:txBody>
-          <a:bodyPr>
-            <a:normAutofit/>
-          </a:bodyPr>
-          <a:lstStyle/>
-          <a:p>
-            <a:r>
-              <a:rPr lang="en-US" dirty="0"/>
-              <a:t>Midterm 35%, Final 35%, Labs / HW 30%</a:t>
-            </a:r>
-          </a:p>
-          <a:p>
-            <a:pPr lvl="1"/>
-            <a:r>
-              <a:rPr lang="en-US" dirty="0"/>
-              <a:t>Optional project:  Up to 20%</a:t>
-            </a:r>
-          </a:p>
-          <a:p>
-            <a:r>
-              <a:rPr lang="en-US" dirty="0"/>
-              <a:t>Labs:  Simple python exercises</a:t>
-            </a:r>
-          </a:p>
-          <a:p>
-            <a:pPr lvl="1"/>
-            <a:r>
-              <a:rPr lang="en-US" dirty="0"/>
-              <a:t>Given as </a:t>
-            </a:r>
-            <a:r>
-              <a:rPr lang="en-US" dirty="0" err="1"/>
-              <a:t>jupyter</a:t>
-            </a:r>
-            <a:r>
-              <a:rPr lang="en-US" dirty="0"/>
-              <a:t> notebook that you complete.</a:t>
-            </a:r>
-          </a:p>
-          <a:p>
-            <a:r>
-              <a:rPr lang="en-US" dirty="0"/>
-              <a:t>Midterms &amp; final</a:t>
-            </a:r>
-          </a:p>
-          <a:p>
-            <a:pPr lvl="1"/>
-            <a:r>
-              <a:rPr lang="en-US" dirty="0"/>
-              <a:t>Each over approx. 6-7 weeks</a:t>
-            </a:r>
-          </a:p>
-          <a:p>
-            <a:pPr lvl="1"/>
-            <a:r>
-              <a:rPr lang="en-US" dirty="0"/>
-              <a:t>Open book but no electronic aids.</a:t>
-            </a:r>
-          </a:p>
-          <a:p>
-            <a:pPr lvl="1"/>
-            <a:r>
-              <a:rPr lang="en-US" dirty="0"/>
-              <a:t>Follows homework and quiz problems + some very basic python questions</a:t>
-            </a:r>
-          </a:p>
-          <a:p>
-            <a:r>
-              <a:rPr lang="en-US" dirty="0"/>
-              <a:t>Optional final project:  </a:t>
-            </a:r>
-          </a:p>
-          <a:p>
-            <a:pPr lvl="1"/>
-            <a:r>
-              <a:rPr lang="en-US" dirty="0"/>
-              <a:t>Use machine learning in some interesting way.</a:t>
-            </a:r>
-          </a:p>
-          <a:p>
-            <a:pPr lvl="1"/>
-            <a:r>
-              <a:rPr lang="en-US" dirty="0"/>
-              <a:t>Must use data and python analysis.</a:t>
-            </a:r>
-          </a:p>
-          <a:p>
-            <a:pPr lvl="1"/>
-            <a:r>
-              <a:rPr lang="en-US" dirty="0"/>
-              <a:t>Provide final report.</a:t>
-            </a:r>
-          </a:p>
-        </p:txBody>
-      </p:sp>
-      <p:sp>
-        <p:nvSpPr>
-          <p:cNvPr id="4" name="Slide Number Placeholder 3"/>
+        </p:nvGraphicFramePr>
+        <p:xfrm>
+          <a:off x="1159726" y="1326814"/>
+          <a:ext cx="10158761" cy="4566607"/>
+        </p:xfrm>
+        <a:graphic>
+          <a:graphicData uri="http://schemas.openxmlformats.org/drawingml/2006/table">
+            <a:tbl>
+              <a:tblPr firstRow="1" firstCol="1" bandRow="1">
+                <a:tableStyleId>{5C22544A-7EE6-4342-B048-85BDC9FD1C3A}</a:tableStyleId>
+              </a:tblPr>
+              <a:tblGrid>
+                <a:gridCol w="1752189">
+                  <a:extLst>
+                    <a:ext uri="{9D8B030D-6E8A-4147-A177-3AD203B41FA5}">
+                      <a16:colId xmlns:a16="http://schemas.microsoft.com/office/drawing/2014/main" val="2778826053"/>
+                    </a:ext>
+                  </a:extLst>
+                </a:gridCol>
+                <a:gridCol w="945001">
+                  <a:extLst>
+                    <a:ext uri="{9D8B030D-6E8A-4147-A177-3AD203B41FA5}">
+                      <a16:colId xmlns:a16="http://schemas.microsoft.com/office/drawing/2014/main" val="3021085648"/>
+                    </a:ext>
+                  </a:extLst>
+                </a:gridCol>
+                <a:gridCol w="2500315">
+                  <a:extLst>
+                    <a:ext uri="{9D8B030D-6E8A-4147-A177-3AD203B41FA5}">
+                      <a16:colId xmlns:a16="http://schemas.microsoft.com/office/drawing/2014/main" val="537178345"/>
+                    </a:ext>
+                  </a:extLst>
+                </a:gridCol>
+                <a:gridCol w="1122189">
+                  <a:extLst>
+                    <a:ext uri="{9D8B030D-6E8A-4147-A177-3AD203B41FA5}">
+                      <a16:colId xmlns:a16="http://schemas.microsoft.com/office/drawing/2014/main" val="2133788425"/>
+                    </a:ext>
+                  </a:extLst>
+                </a:gridCol>
+                <a:gridCol w="3839067">
+                  <a:extLst>
+                    <a:ext uri="{9D8B030D-6E8A-4147-A177-3AD203B41FA5}">
+                      <a16:colId xmlns:a16="http://schemas.microsoft.com/office/drawing/2014/main" val="1693535276"/>
+                    </a:ext>
+                  </a:extLst>
+                </a:gridCol>
+              </a:tblGrid>
+              <a:tr h="219227">
+                <a:tc>
+                  <a:txBody>
+                    <a:bodyPr/>
+                    <a:lstStyle/>
+                    <a:p>
+                      <a:pPr marL="0" marR="0">
+                        <a:lnSpc>
+                          <a:spcPct val="107000"/>
+                        </a:lnSpc>
+                        <a:spcAft>
+                          <a:spcPts val="800"/>
+                        </a:spcAft>
+                        <a:buNone/>
+                      </a:pPr>
+                      <a:r>
+                        <a:rPr lang="en-US" sz="1100">
+                          <a:effectLst/>
+                        </a:rPr>
+                        <a:t>Date</a:t>
+                      </a:r>
+                      <a:endParaRPr lang="en-US" sz="1100">
+                        <a:effectLst/>
+                        <a:latin typeface="Calibri" panose="020F0502020204030204" pitchFamily="34" charset="0"/>
+                        <a:ea typeface="Calibri" panose="020F0502020204030204" pitchFamily="34" charset="0"/>
+                        <a:cs typeface="Times New Roman" panose="02020603050405020304" pitchFamily="18" charset="0"/>
+                      </a:endParaRPr>
+                    </a:p>
+                  </a:txBody>
+                  <a:tcPr marL="68580" marR="68580" marT="0" marB="0"/>
+                </a:tc>
+                <a:tc gridSpan="2">
+                  <a:txBody>
+                    <a:bodyPr/>
+                    <a:lstStyle/>
+                    <a:p>
+                      <a:pPr marL="0" marR="0" algn="ctr">
+                        <a:lnSpc>
+                          <a:spcPct val="107000"/>
+                        </a:lnSpc>
+                        <a:spcAft>
+                          <a:spcPts val="800"/>
+                        </a:spcAft>
+                        <a:buNone/>
+                      </a:pPr>
+                      <a:r>
+                        <a:rPr lang="en-US" sz="1100">
+                          <a:effectLst/>
+                        </a:rPr>
+                        <a:t>Prior Years</a:t>
+                      </a:r>
+                      <a:endParaRPr lang="en-US" sz="1100">
+                        <a:effectLst/>
+                        <a:latin typeface="Calibri" panose="020F0502020204030204" pitchFamily="34" charset="0"/>
+                        <a:ea typeface="Calibri" panose="020F0502020204030204" pitchFamily="34" charset="0"/>
+                        <a:cs typeface="Times New Roman" panose="02020603050405020304" pitchFamily="18" charset="0"/>
+                      </a:endParaRPr>
+                    </a:p>
+                  </a:txBody>
+                  <a:tcPr marL="68580" marR="68580" marT="0" marB="0"/>
+                </a:tc>
+                <a:tc hMerge="1">
+                  <a:txBody>
+                    <a:bodyPr/>
+                    <a:lstStyle/>
+                    <a:p>
+                      <a:endParaRPr lang="en-US"/>
+                    </a:p>
+                  </a:txBody>
+                  <a:tcPr/>
+                </a:tc>
+                <a:tc gridSpan="2">
+                  <a:txBody>
+                    <a:bodyPr/>
+                    <a:lstStyle/>
+                    <a:p>
+                      <a:pPr marL="0" marR="0" algn="ctr">
+                        <a:lnSpc>
+                          <a:spcPct val="107000"/>
+                        </a:lnSpc>
+                        <a:spcAft>
+                          <a:spcPts val="800"/>
+                        </a:spcAft>
+                        <a:buNone/>
+                      </a:pPr>
+                      <a:r>
+                        <a:rPr lang="en-US" sz="1100">
+                          <a:effectLst/>
+                        </a:rPr>
+                        <a:t>Fall 2025</a:t>
+                      </a:r>
+                      <a:endParaRPr lang="en-US" sz="1100">
+                        <a:effectLst/>
+                        <a:latin typeface="Calibri" panose="020F0502020204030204" pitchFamily="34" charset="0"/>
+                        <a:ea typeface="Calibri" panose="020F0502020204030204" pitchFamily="34" charset="0"/>
+                        <a:cs typeface="Times New Roman" panose="02020603050405020304" pitchFamily="18" charset="0"/>
+                      </a:endParaRPr>
+                    </a:p>
+                  </a:txBody>
+                  <a:tcPr marL="68580" marR="68580" marT="0" marB="0"/>
+                </a:tc>
+                <a:tc hMerge="1">
+                  <a:txBody>
+                    <a:bodyPr/>
+                    <a:lstStyle/>
+                    <a:p>
+                      <a:endParaRPr lang="en-US"/>
+                    </a:p>
+                  </a:txBody>
+                  <a:tcPr/>
+                </a:tc>
+                <a:extLst>
+                  <a:ext uri="{0D108BD9-81ED-4DB2-BD59-A6C34878D82A}">
+                    <a16:rowId xmlns:a16="http://schemas.microsoft.com/office/drawing/2014/main" val="4051057374"/>
+                  </a:ext>
+                </a:extLst>
+              </a:tr>
+              <a:tr h="219227">
+                <a:tc>
+                  <a:txBody>
+                    <a:bodyPr/>
+                    <a:lstStyle/>
+                    <a:p>
+                      <a:pPr marL="0" marR="0">
+                        <a:lnSpc>
+                          <a:spcPct val="107000"/>
+                        </a:lnSpc>
+                        <a:spcAft>
+                          <a:spcPts val="800"/>
+                        </a:spcAft>
+                        <a:buNone/>
+                      </a:pPr>
+                      <a:r>
+                        <a:rPr lang="en-US" sz="1100">
+                          <a:effectLst/>
+                        </a:rPr>
+                        <a:t> </a:t>
+                      </a:r>
+                      <a:endParaRPr lang="en-US" sz="1100">
+                        <a:effectLst/>
+                        <a:latin typeface="Calibri" panose="020F0502020204030204" pitchFamily="34" charset="0"/>
+                        <a:ea typeface="Calibri" panose="020F0502020204030204" pitchFamily="34" charset="0"/>
+                        <a:cs typeface="Times New Roman" panose="02020603050405020304" pitchFamily="18" charset="0"/>
+                      </a:endParaRPr>
+                    </a:p>
+                  </a:txBody>
+                  <a:tcPr marL="68580" marR="68580" marT="0" marB="0"/>
+                </a:tc>
+                <a:tc>
+                  <a:txBody>
+                    <a:bodyPr/>
+                    <a:lstStyle/>
+                    <a:p>
+                      <a:pPr marL="0" marR="0">
+                        <a:lnSpc>
+                          <a:spcPct val="107000"/>
+                        </a:lnSpc>
+                        <a:spcAft>
+                          <a:spcPts val="800"/>
+                        </a:spcAft>
+                        <a:buNone/>
+                      </a:pPr>
+                      <a:r>
+                        <a:rPr lang="en-US" sz="1100">
+                          <a:effectLst/>
+                        </a:rPr>
+                        <a:t>Unit</a:t>
+                      </a:r>
+                      <a:endParaRPr lang="en-US" sz="1100">
+                        <a:effectLst/>
+                        <a:latin typeface="Calibri" panose="020F0502020204030204" pitchFamily="34" charset="0"/>
+                        <a:ea typeface="Calibri" panose="020F0502020204030204" pitchFamily="34" charset="0"/>
+                        <a:cs typeface="Times New Roman" panose="02020603050405020304" pitchFamily="18" charset="0"/>
+                      </a:endParaRPr>
+                    </a:p>
+                  </a:txBody>
+                  <a:tcPr marL="68580" marR="68580" marT="0" marB="0"/>
+                </a:tc>
+                <a:tc>
+                  <a:txBody>
+                    <a:bodyPr/>
+                    <a:lstStyle/>
+                    <a:p>
+                      <a:pPr marL="0" marR="0">
+                        <a:lnSpc>
+                          <a:spcPct val="107000"/>
+                        </a:lnSpc>
+                        <a:spcAft>
+                          <a:spcPts val="800"/>
+                        </a:spcAft>
+                        <a:buNone/>
+                      </a:pPr>
+                      <a:r>
+                        <a:rPr lang="en-US" sz="1100">
+                          <a:effectLst/>
+                        </a:rPr>
+                        <a:t>Description</a:t>
+                      </a:r>
+                      <a:endParaRPr lang="en-US" sz="1100">
+                        <a:effectLst/>
+                        <a:latin typeface="Calibri" panose="020F0502020204030204" pitchFamily="34" charset="0"/>
+                        <a:ea typeface="Calibri" panose="020F0502020204030204" pitchFamily="34" charset="0"/>
+                        <a:cs typeface="Times New Roman" panose="02020603050405020304" pitchFamily="18" charset="0"/>
+                      </a:endParaRPr>
+                    </a:p>
+                  </a:txBody>
+                  <a:tcPr marL="68580" marR="68580" marT="0" marB="0"/>
+                </a:tc>
+                <a:tc>
+                  <a:txBody>
+                    <a:bodyPr/>
+                    <a:lstStyle/>
+                    <a:p>
+                      <a:pPr marL="0" marR="0">
+                        <a:lnSpc>
+                          <a:spcPct val="107000"/>
+                        </a:lnSpc>
+                        <a:spcAft>
+                          <a:spcPts val="800"/>
+                        </a:spcAft>
+                        <a:buNone/>
+                      </a:pPr>
+                      <a:r>
+                        <a:rPr lang="en-US" sz="1100">
+                          <a:effectLst/>
+                        </a:rPr>
+                        <a:t>Unit</a:t>
+                      </a:r>
+                      <a:endParaRPr lang="en-US" sz="1100">
+                        <a:effectLst/>
+                        <a:latin typeface="Calibri" panose="020F0502020204030204" pitchFamily="34" charset="0"/>
+                        <a:ea typeface="Calibri" panose="020F0502020204030204" pitchFamily="34" charset="0"/>
+                        <a:cs typeface="Times New Roman" panose="02020603050405020304" pitchFamily="18" charset="0"/>
+                      </a:endParaRPr>
+                    </a:p>
+                  </a:txBody>
+                  <a:tcPr marL="68580" marR="68580" marT="0" marB="0"/>
+                </a:tc>
+                <a:tc>
+                  <a:txBody>
+                    <a:bodyPr/>
+                    <a:lstStyle/>
+                    <a:p>
+                      <a:pPr marL="0" marR="0">
+                        <a:lnSpc>
+                          <a:spcPct val="107000"/>
+                        </a:lnSpc>
+                        <a:spcAft>
+                          <a:spcPts val="800"/>
+                        </a:spcAft>
+                        <a:buNone/>
+                      </a:pPr>
+                      <a:r>
+                        <a:rPr lang="en-US" sz="1100">
+                          <a:effectLst/>
+                        </a:rPr>
+                        <a:t>Description</a:t>
+                      </a:r>
+                      <a:endParaRPr lang="en-US" sz="1100">
+                        <a:effectLst/>
+                        <a:latin typeface="Calibri" panose="020F0502020204030204" pitchFamily="34" charset="0"/>
+                        <a:ea typeface="Calibri" panose="020F0502020204030204" pitchFamily="34" charset="0"/>
+                        <a:cs typeface="Times New Roman" panose="02020603050405020304" pitchFamily="18" charset="0"/>
+                      </a:endParaRPr>
+                    </a:p>
+                  </a:txBody>
+                  <a:tcPr marL="68580" marR="68580" marT="0" marB="0"/>
+                </a:tc>
+                <a:extLst>
+                  <a:ext uri="{0D108BD9-81ED-4DB2-BD59-A6C34878D82A}">
+                    <a16:rowId xmlns:a16="http://schemas.microsoft.com/office/drawing/2014/main" val="3946776678"/>
+                  </a:ext>
+                </a:extLst>
+              </a:tr>
+              <a:tr h="620523">
+                <a:tc>
+                  <a:txBody>
+                    <a:bodyPr/>
+                    <a:lstStyle/>
+                    <a:p>
+                      <a:pPr marL="0" marR="0" algn="r">
+                        <a:lnSpc>
+                          <a:spcPct val="107000"/>
+                        </a:lnSpc>
+                        <a:spcAft>
+                          <a:spcPts val="800"/>
+                        </a:spcAft>
+                        <a:buNone/>
+                      </a:pPr>
+                      <a:r>
+                        <a:rPr lang="en-US" sz="1100">
+                          <a:effectLst/>
+                        </a:rPr>
+                        <a:t>9/2/2025</a:t>
+                      </a:r>
+                      <a:endParaRPr lang="en-US" sz="1100">
+                        <a:effectLst/>
+                        <a:latin typeface="Calibri" panose="020F0502020204030204" pitchFamily="34" charset="0"/>
+                        <a:ea typeface="Calibri" panose="020F0502020204030204" pitchFamily="34" charset="0"/>
+                        <a:cs typeface="Times New Roman" panose="02020603050405020304" pitchFamily="18" charset="0"/>
+                      </a:endParaRPr>
+                    </a:p>
+                  </a:txBody>
+                  <a:tcPr marL="68580" marR="68580" marT="0" marB="0"/>
+                </a:tc>
+                <a:tc>
+                  <a:txBody>
+                    <a:bodyPr/>
+                    <a:lstStyle/>
+                    <a:p>
+                      <a:pPr marL="0" marR="0" algn="r">
+                        <a:lnSpc>
+                          <a:spcPct val="107000"/>
+                        </a:lnSpc>
+                        <a:spcAft>
+                          <a:spcPts val="800"/>
+                        </a:spcAft>
+                        <a:buNone/>
+                      </a:pPr>
+                      <a:r>
+                        <a:rPr lang="en-US" sz="1100">
+                          <a:effectLst/>
+                        </a:rPr>
+                        <a:t>1, 2</a:t>
+                      </a:r>
+                      <a:endParaRPr lang="en-US" sz="1100">
+                        <a:effectLst/>
+                        <a:latin typeface="Calibri" panose="020F0502020204030204" pitchFamily="34" charset="0"/>
+                        <a:ea typeface="Calibri" panose="020F0502020204030204" pitchFamily="34" charset="0"/>
+                        <a:cs typeface="Times New Roman" panose="02020603050405020304" pitchFamily="18" charset="0"/>
+                      </a:endParaRPr>
+                    </a:p>
+                  </a:txBody>
+                  <a:tcPr marL="68580" marR="68580" marT="0" marB="0"/>
+                </a:tc>
+                <a:tc>
+                  <a:txBody>
+                    <a:bodyPr/>
+                    <a:lstStyle/>
+                    <a:p>
+                      <a:pPr marL="0" marR="0">
+                        <a:lnSpc>
+                          <a:spcPct val="107000"/>
+                        </a:lnSpc>
+                        <a:spcAft>
+                          <a:spcPts val="800"/>
+                        </a:spcAft>
+                        <a:buNone/>
+                      </a:pPr>
+                      <a:r>
+                        <a:rPr lang="en-US" sz="1100">
+                          <a:effectLst/>
+                        </a:rPr>
+                        <a:t>Course Admin.  What is ML? Multiple Linear Regression</a:t>
+                      </a:r>
+                      <a:endParaRPr lang="en-US" sz="1100">
+                        <a:effectLst/>
+                        <a:latin typeface="Calibri" panose="020F0502020204030204" pitchFamily="34" charset="0"/>
+                        <a:ea typeface="Calibri" panose="020F0502020204030204" pitchFamily="34" charset="0"/>
+                        <a:cs typeface="Times New Roman" panose="02020603050405020304" pitchFamily="18" charset="0"/>
+                      </a:endParaRPr>
+                    </a:p>
+                  </a:txBody>
+                  <a:tcPr marL="68580" marR="68580" marT="0" marB="0"/>
+                </a:tc>
+                <a:tc>
+                  <a:txBody>
+                    <a:bodyPr/>
+                    <a:lstStyle/>
+                    <a:p>
+                      <a:pPr marL="0" marR="0" algn="r">
+                        <a:lnSpc>
+                          <a:spcPct val="107000"/>
+                        </a:lnSpc>
+                        <a:spcAft>
+                          <a:spcPts val="800"/>
+                        </a:spcAft>
+                        <a:buNone/>
+                      </a:pPr>
+                      <a:r>
+                        <a:rPr lang="en-US" sz="1100">
+                          <a:effectLst/>
+                        </a:rPr>
+                        <a:t>1, 2</a:t>
+                      </a:r>
+                      <a:endParaRPr lang="en-US" sz="1100">
+                        <a:effectLst/>
+                        <a:latin typeface="Calibri" panose="020F0502020204030204" pitchFamily="34" charset="0"/>
+                        <a:ea typeface="Calibri" panose="020F0502020204030204" pitchFamily="34" charset="0"/>
+                        <a:cs typeface="Times New Roman" panose="02020603050405020304" pitchFamily="18" charset="0"/>
+                      </a:endParaRPr>
+                    </a:p>
+                  </a:txBody>
+                  <a:tcPr marL="68580" marR="68580" marT="0" marB="0"/>
+                </a:tc>
+                <a:tc>
+                  <a:txBody>
+                    <a:bodyPr/>
+                    <a:lstStyle/>
+                    <a:p>
+                      <a:pPr marL="0" marR="0">
+                        <a:lnSpc>
+                          <a:spcPct val="107000"/>
+                        </a:lnSpc>
+                        <a:spcAft>
+                          <a:spcPts val="800"/>
+                        </a:spcAft>
+                        <a:buNone/>
+                      </a:pPr>
+                      <a:r>
+                        <a:rPr lang="en-US" sz="1100">
+                          <a:effectLst/>
+                        </a:rPr>
+                        <a:t>Course Admin.  What is ML?  Multiple Linear Regression</a:t>
+                      </a:r>
+                      <a:endParaRPr lang="en-US" sz="1100">
+                        <a:effectLst/>
+                        <a:latin typeface="Calibri" panose="020F0502020204030204" pitchFamily="34" charset="0"/>
+                        <a:ea typeface="Calibri" panose="020F0502020204030204" pitchFamily="34" charset="0"/>
+                        <a:cs typeface="Times New Roman" panose="02020603050405020304" pitchFamily="18" charset="0"/>
+                      </a:endParaRPr>
+                    </a:p>
+                  </a:txBody>
+                  <a:tcPr marL="68580" marR="68580" marT="0" marB="0"/>
+                </a:tc>
+                <a:extLst>
+                  <a:ext uri="{0D108BD9-81ED-4DB2-BD59-A6C34878D82A}">
+                    <a16:rowId xmlns:a16="http://schemas.microsoft.com/office/drawing/2014/main" val="2579647247"/>
+                  </a:ext>
+                </a:extLst>
+              </a:tr>
+              <a:tr h="219227">
+                <a:tc>
+                  <a:txBody>
+                    <a:bodyPr/>
+                    <a:lstStyle/>
+                    <a:p>
+                      <a:pPr marL="0" marR="0" algn="r">
+                        <a:lnSpc>
+                          <a:spcPct val="107000"/>
+                        </a:lnSpc>
+                        <a:spcAft>
+                          <a:spcPts val="800"/>
+                        </a:spcAft>
+                        <a:buNone/>
+                      </a:pPr>
+                      <a:r>
+                        <a:rPr lang="en-US" sz="1100">
+                          <a:effectLst/>
+                        </a:rPr>
+                        <a:t>9/9/2025</a:t>
+                      </a:r>
+                      <a:endParaRPr lang="en-US" sz="1100">
+                        <a:effectLst/>
+                        <a:latin typeface="Calibri" panose="020F0502020204030204" pitchFamily="34" charset="0"/>
+                        <a:ea typeface="Calibri" panose="020F0502020204030204" pitchFamily="34" charset="0"/>
+                        <a:cs typeface="Times New Roman" panose="02020603050405020304" pitchFamily="18" charset="0"/>
+                      </a:endParaRPr>
+                    </a:p>
+                  </a:txBody>
+                  <a:tcPr marL="68580" marR="68580" marT="0" marB="0"/>
+                </a:tc>
+                <a:tc>
+                  <a:txBody>
+                    <a:bodyPr/>
+                    <a:lstStyle/>
+                    <a:p>
+                      <a:pPr marL="0" marR="0" algn="r">
+                        <a:lnSpc>
+                          <a:spcPct val="107000"/>
+                        </a:lnSpc>
+                        <a:spcAft>
+                          <a:spcPts val="800"/>
+                        </a:spcAft>
+                        <a:buNone/>
+                      </a:pPr>
+                      <a:r>
+                        <a:rPr lang="en-US" sz="1100">
+                          <a:effectLst/>
+                        </a:rPr>
+                        <a:t>3</a:t>
+                      </a:r>
+                      <a:endParaRPr lang="en-US" sz="1100">
+                        <a:effectLst/>
+                        <a:latin typeface="Calibri" panose="020F0502020204030204" pitchFamily="34" charset="0"/>
+                        <a:ea typeface="Calibri" panose="020F0502020204030204" pitchFamily="34" charset="0"/>
+                        <a:cs typeface="Times New Roman" panose="02020603050405020304" pitchFamily="18" charset="0"/>
+                      </a:endParaRPr>
+                    </a:p>
+                  </a:txBody>
+                  <a:tcPr marL="68580" marR="68580" marT="0" marB="0"/>
+                </a:tc>
+                <a:tc>
+                  <a:txBody>
+                    <a:bodyPr/>
+                    <a:lstStyle/>
+                    <a:p>
+                      <a:pPr marL="0" marR="0">
+                        <a:lnSpc>
+                          <a:spcPct val="107000"/>
+                        </a:lnSpc>
+                        <a:spcAft>
+                          <a:spcPts val="800"/>
+                        </a:spcAft>
+                        <a:buNone/>
+                      </a:pPr>
+                      <a:r>
+                        <a:rPr lang="en-US" sz="1100">
+                          <a:effectLst/>
+                        </a:rPr>
+                        <a:t>Model Selection</a:t>
+                      </a:r>
+                      <a:endParaRPr lang="en-US" sz="1100">
+                        <a:effectLst/>
+                        <a:latin typeface="Calibri" panose="020F0502020204030204" pitchFamily="34" charset="0"/>
+                        <a:ea typeface="Calibri" panose="020F0502020204030204" pitchFamily="34" charset="0"/>
+                        <a:cs typeface="Times New Roman" panose="02020603050405020304" pitchFamily="18" charset="0"/>
+                      </a:endParaRPr>
+                    </a:p>
+                  </a:txBody>
+                  <a:tcPr marL="68580" marR="68580" marT="0" marB="0"/>
+                </a:tc>
+                <a:tc>
+                  <a:txBody>
+                    <a:bodyPr/>
+                    <a:lstStyle/>
+                    <a:p>
+                      <a:pPr marL="0" marR="0" algn="r">
+                        <a:lnSpc>
+                          <a:spcPct val="107000"/>
+                        </a:lnSpc>
+                        <a:spcAft>
+                          <a:spcPts val="800"/>
+                        </a:spcAft>
+                        <a:buNone/>
+                      </a:pPr>
+                      <a:r>
+                        <a:rPr lang="en-US" sz="1100">
+                          <a:effectLst/>
+                        </a:rPr>
+                        <a:t>3</a:t>
+                      </a:r>
+                      <a:endParaRPr lang="en-US" sz="1100">
+                        <a:effectLst/>
+                        <a:latin typeface="Calibri" panose="020F0502020204030204" pitchFamily="34" charset="0"/>
+                        <a:ea typeface="Calibri" panose="020F0502020204030204" pitchFamily="34" charset="0"/>
+                        <a:cs typeface="Times New Roman" panose="02020603050405020304" pitchFamily="18" charset="0"/>
+                      </a:endParaRPr>
+                    </a:p>
+                  </a:txBody>
+                  <a:tcPr marL="68580" marR="68580" marT="0" marB="0"/>
+                </a:tc>
+                <a:tc>
+                  <a:txBody>
+                    <a:bodyPr/>
+                    <a:lstStyle/>
+                    <a:p>
+                      <a:pPr marL="0" marR="0">
+                        <a:lnSpc>
+                          <a:spcPct val="107000"/>
+                        </a:lnSpc>
+                        <a:spcAft>
+                          <a:spcPts val="800"/>
+                        </a:spcAft>
+                        <a:buNone/>
+                      </a:pPr>
+                      <a:r>
+                        <a:rPr lang="en-US" sz="1100">
+                          <a:effectLst/>
+                        </a:rPr>
+                        <a:t>Model Selection</a:t>
+                      </a:r>
+                      <a:endParaRPr lang="en-US" sz="1100">
+                        <a:effectLst/>
+                        <a:latin typeface="Calibri" panose="020F0502020204030204" pitchFamily="34" charset="0"/>
+                        <a:ea typeface="Calibri" panose="020F0502020204030204" pitchFamily="34" charset="0"/>
+                        <a:cs typeface="Times New Roman" panose="02020603050405020304" pitchFamily="18" charset="0"/>
+                      </a:endParaRPr>
+                    </a:p>
+                  </a:txBody>
+                  <a:tcPr marL="68580" marR="68580" marT="0" marB="0"/>
+                </a:tc>
+                <a:extLst>
+                  <a:ext uri="{0D108BD9-81ED-4DB2-BD59-A6C34878D82A}">
+                    <a16:rowId xmlns:a16="http://schemas.microsoft.com/office/drawing/2014/main" val="3284752394"/>
+                  </a:ext>
+                </a:extLst>
+              </a:tr>
+              <a:tr h="219227">
+                <a:tc>
+                  <a:txBody>
+                    <a:bodyPr/>
+                    <a:lstStyle/>
+                    <a:p>
+                      <a:pPr marL="0" marR="0" algn="r">
+                        <a:lnSpc>
+                          <a:spcPct val="107000"/>
+                        </a:lnSpc>
+                        <a:spcAft>
+                          <a:spcPts val="800"/>
+                        </a:spcAft>
+                        <a:buNone/>
+                      </a:pPr>
+                      <a:r>
+                        <a:rPr lang="en-US" sz="1100">
+                          <a:effectLst/>
+                        </a:rPr>
+                        <a:t>9/16/2025</a:t>
+                      </a:r>
+                      <a:endParaRPr lang="en-US" sz="1100">
+                        <a:effectLst/>
+                        <a:latin typeface="Calibri" panose="020F0502020204030204" pitchFamily="34" charset="0"/>
+                        <a:ea typeface="Calibri" panose="020F0502020204030204" pitchFamily="34" charset="0"/>
+                        <a:cs typeface="Times New Roman" panose="02020603050405020304" pitchFamily="18" charset="0"/>
+                      </a:endParaRPr>
+                    </a:p>
+                  </a:txBody>
+                  <a:tcPr marL="68580" marR="68580" marT="0" marB="0"/>
+                </a:tc>
+                <a:tc>
+                  <a:txBody>
+                    <a:bodyPr/>
+                    <a:lstStyle/>
+                    <a:p>
+                      <a:pPr marL="0" marR="0" algn="r">
+                        <a:lnSpc>
+                          <a:spcPct val="107000"/>
+                        </a:lnSpc>
+                        <a:spcAft>
+                          <a:spcPts val="800"/>
+                        </a:spcAft>
+                        <a:buNone/>
+                      </a:pPr>
+                      <a:r>
+                        <a:rPr lang="en-US" sz="1100">
+                          <a:effectLst/>
+                        </a:rPr>
+                        <a:t>4</a:t>
+                      </a:r>
+                      <a:endParaRPr lang="en-US" sz="1100">
+                        <a:effectLst/>
+                        <a:latin typeface="Calibri" panose="020F0502020204030204" pitchFamily="34" charset="0"/>
+                        <a:ea typeface="Calibri" panose="020F0502020204030204" pitchFamily="34" charset="0"/>
+                        <a:cs typeface="Times New Roman" panose="02020603050405020304" pitchFamily="18" charset="0"/>
+                      </a:endParaRPr>
+                    </a:p>
+                  </a:txBody>
+                  <a:tcPr marL="68580" marR="68580" marT="0" marB="0"/>
+                </a:tc>
+                <a:tc>
+                  <a:txBody>
+                    <a:bodyPr/>
+                    <a:lstStyle/>
+                    <a:p>
+                      <a:pPr marL="0" marR="0">
+                        <a:lnSpc>
+                          <a:spcPct val="107000"/>
+                        </a:lnSpc>
+                        <a:spcAft>
+                          <a:spcPts val="800"/>
+                        </a:spcAft>
+                        <a:buNone/>
+                      </a:pPr>
+                      <a:r>
+                        <a:rPr lang="en-US" sz="1100">
+                          <a:effectLst/>
+                        </a:rPr>
+                        <a:t>Regularization and LASSO</a:t>
+                      </a:r>
+                      <a:endParaRPr lang="en-US" sz="1100">
+                        <a:effectLst/>
+                        <a:latin typeface="Calibri" panose="020F0502020204030204" pitchFamily="34" charset="0"/>
+                        <a:ea typeface="Calibri" panose="020F0502020204030204" pitchFamily="34" charset="0"/>
+                        <a:cs typeface="Times New Roman" panose="02020603050405020304" pitchFamily="18" charset="0"/>
+                      </a:endParaRPr>
+                    </a:p>
+                  </a:txBody>
+                  <a:tcPr marL="68580" marR="68580" marT="0" marB="0"/>
+                </a:tc>
+                <a:tc>
+                  <a:txBody>
+                    <a:bodyPr/>
+                    <a:lstStyle/>
+                    <a:p>
+                      <a:pPr marL="0" marR="0" algn="r">
+                        <a:lnSpc>
+                          <a:spcPct val="107000"/>
+                        </a:lnSpc>
+                        <a:spcAft>
+                          <a:spcPts val="800"/>
+                        </a:spcAft>
+                        <a:buNone/>
+                      </a:pPr>
+                      <a:r>
+                        <a:rPr lang="en-US" sz="1100">
+                          <a:effectLst/>
+                        </a:rPr>
+                        <a:t>4</a:t>
+                      </a:r>
+                      <a:endParaRPr lang="en-US" sz="1100">
+                        <a:effectLst/>
+                        <a:latin typeface="Calibri" panose="020F0502020204030204" pitchFamily="34" charset="0"/>
+                        <a:ea typeface="Calibri" panose="020F0502020204030204" pitchFamily="34" charset="0"/>
+                        <a:cs typeface="Times New Roman" panose="02020603050405020304" pitchFamily="18" charset="0"/>
+                      </a:endParaRPr>
+                    </a:p>
+                  </a:txBody>
+                  <a:tcPr marL="68580" marR="68580" marT="0" marB="0"/>
+                </a:tc>
+                <a:tc>
+                  <a:txBody>
+                    <a:bodyPr/>
+                    <a:lstStyle/>
+                    <a:p>
+                      <a:pPr marL="0" marR="0">
+                        <a:lnSpc>
+                          <a:spcPct val="107000"/>
+                        </a:lnSpc>
+                        <a:spcAft>
+                          <a:spcPts val="800"/>
+                        </a:spcAft>
+                        <a:buNone/>
+                      </a:pPr>
+                      <a:r>
+                        <a:rPr lang="en-US" sz="1100">
+                          <a:effectLst/>
+                        </a:rPr>
+                        <a:t>Regularization and LASSO</a:t>
+                      </a:r>
+                      <a:endParaRPr lang="en-US" sz="1100">
+                        <a:effectLst/>
+                        <a:latin typeface="Calibri" panose="020F0502020204030204" pitchFamily="34" charset="0"/>
+                        <a:ea typeface="Calibri" panose="020F0502020204030204" pitchFamily="34" charset="0"/>
+                        <a:cs typeface="Times New Roman" panose="02020603050405020304" pitchFamily="18" charset="0"/>
+                      </a:endParaRPr>
+                    </a:p>
+                  </a:txBody>
+                  <a:tcPr marL="68580" marR="68580" marT="0" marB="0"/>
+                </a:tc>
+                <a:extLst>
+                  <a:ext uri="{0D108BD9-81ED-4DB2-BD59-A6C34878D82A}">
+                    <a16:rowId xmlns:a16="http://schemas.microsoft.com/office/drawing/2014/main" val="104560152"/>
+                  </a:ext>
+                </a:extLst>
+              </a:tr>
+              <a:tr h="219227">
+                <a:tc>
+                  <a:txBody>
+                    <a:bodyPr/>
+                    <a:lstStyle/>
+                    <a:p>
+                      <a:pPr marL="0" marR="0" algn="r">
+                        <a:lnSpc>
+                          <a:spcPct val="107000"/>
+                        </a:lnSpc>
+                        <a:spcAft>
+                          <a:spcPts val="800"/>
+                        </a:spcAft>
+                        <a:buNone/>
+                      </a:pPr>
+                      <a:r>
+                        <a:rPr lang="en-US" sz="1100">
+                          <a:effectLst/>
+                        </a:rPr>
+                        <a:t>9/23/2025</a:t>
+                      </a:r>
+                      <a:endParaRPr lang="en-US" sz="1100">
+                        <a:effectLst/>
+                        <a:latin typeface="Calibri" panose="020F0502020204030204" pitchFamily="34" charset="0"/>
+                        <a:ea typeface="Calibri" panose="020F0502020204030204" pitchFamily="34" charset="0"/>
+                        <a:cs typeface="Times New Roman" panose="02020603050405020304" pitchFamily="18" charset="0"/>
+                      </a:endParaRPr>
+                    </a:p>
+                  </a:txBody>
+                  <a:tcPr marL="68580" marR="68580" marT="0" marB="0"/>
+                </a:tc>
+                <a:tc>
+                  <a:txBody>
+                    <a:bodyPr/>
+                    <a:lstStyle/>
+                    <a:p>
+                      <a:pPr marL="0" marR="0" algn="r">
+                        <a:lnSpc>
+                          <a:spcPct val="107000"/>
+                        </a:lnSpc>
+                        <a:spcAft>
+                          <a:spcPts val="800"/>
+                        </a:spcAft>
+                        <a:buNone/>
+                      </a:pPr>
+                      <a:r>
+                        <a:rPr lang="en-US" sz="1100">
+                          <a:effectLst/>
+                        </a:rPr>
+                        <a:t>5</a:t>
+                      </a:r>
+                      <a:endParaRPr lang="en-US" sz="1100">
+                        <a:effectLst/>
+                        <a:latin typeface="Calibri" panose="020F0502020204030204" pitchFamily="34" charset="0"/>
+                        <a:ea typeface="Calibri" panose="020F0502020204030204" pitchFamily="34" charset="0"/>
+                        <a:cs typeface="Times New Roman" panose="02020603050405020304" pitchFamily="18" charset="0"/>
+                      </a:endParaRPr>
+                    </a:p>
+                  </a:txBody>
+                  <a:tcPr marL="68580" marR="68580" marT="0" marB="0"/>
+                </a:tc>
+                <a:tc>
+                  <a:txBody>
+                    <a:bodyPr/>
+                    <a:lstStyle/>
+                    <a:p>
+                      <a:pPr marL="0" marR="0">
+                        <a:lnSpc>
+                          <a:spcPct val="107000"/>
+                        </a:lnSpc>
+                        <a:spcAft>
+                          <a:spcPts val="800"/>
+                        </a:spcAft>
+                        <a:buNone/>
+                      </a:pPr>
+                      <a:r>
+                        <a:rPr lang="en-US" sz="1100">
+                          <a:effectLst/>
+                        </a:rPr>
+                        <a:t>Logistic Regression</a:t>
+                      </a:r>
+                      <a:endParaRPr lang="en-US" sz="1100">
+                        <a:effectLst/>
+                        <a:latin typeface="Calibri" panose="020F0502020204030204" pitchFamily="34" charset="0"/>
+                        <a:ea typeface="Calibri" panose="020F0502020204030204" pitchFamily="34" charset="0"/>
+                        <a:cs typeface="Times New Roman" panose="02020603050405020304" pitchFamily="18" charset="0"/>
+                      </a:endParaRPr>
+                    </a:p>
+                  </a:txBody>
+                  <a:tcPr marL="68580" marR="68580" marT="0" marB="0"/>
+                </a:tc>
+                <a:tc>
+                  <a:txBody>
+                    <a:bodyPr/>
+                    <a:lstStyle/>
+                    <a:p>
+                      <a:pPr marL="0" marR="0" algn="r">
+                        <a:lnSpc>
+                          <a:spcPct val="107000"/>
+                        </a:lnSpc>
+                        <a:spcAft>
+                          <a:spcPts val="800"/>
+                        </a:spcAft>
+                        <a:buNone/>
+                      </a:pPr>
+                      <a:r>
+                        <a:rPr lang="en-US" sz="1100">
+                          <a:effectLst/>
+                        </a:rPr>
+                        <a:t>5</a:t>
+                      </a:r>
+                      <a:endParaRPr lang="en-US" sz="1100">
+                        <a:effectLst/>
+                        <a:latin typeface="Calibri" panose="020F0502020204030204" pitchFamily="34" charset="0"/>
+                        <a:ea typeface="Calibri" panose="020F0502020204030204" pitchFamily="34" charset="0"/>
+                        <a:cs typeface="Times New Roman" panose="02020603050405020304" pitchFamily="18" charset="0"/>
+                      </a:endParaRPr>
+                    </a:p>
+                  </a:txBody>
+                  <a:tcPr marL="68580" marR="68580" marT="0" marB="0"/>
+                </a:tc>
+                <a:tc>
+                  <a:txBody>
+                    <a:bodyPr/>
+                    <a:lstStyle/>
+                    <a:p>
+                      <a:pPr marL="0" marR="0">
+                        <a:lnSpc>
+                          <a:spcPct val="107000"/>
+                        </a:lnSpc>
+                        <a:spcAft>
+                          <a:spcPts val="800"/>
+                        </a:spcAft>
+                        <a:buNone/>
+                      </a:pPr>
+                      <a:r>
+                        <a:rPr lang="en-US" sz="1100">
+                          <a:effectLst/>
+                        </a:rPr>
+                        <a:t>Logistic Regression</a:t>
+                      </a:r>
+                      <a:endParaRPr lang="en-US" sz="1100">
+                        <a:effectLst/>
+                        <a:latin typeface="Calibri" panose="020F0502020204030204" pitchFamily="34" charset="0"/>
+                        <a:ea typeface="Calibri" panose="020F0502020204030204" pitchFamily="34" charset="0"/>
+                        <a:cs typeface="Times New Roman" panose="02020603050405020304" pitchFamily="18" charset="0"/>
+                      </a:endParaRPr>
+                    </a:p>
+                  </a:txBody>
+                  <a:tcPr marL="68580" marR="68580" marT="0" marB="0"/>
+                </a:tc>
+                <a:extLst>
+                  <a:ext uri="{0D108BD9-81ED-4DB2-BD59-A6C34878D82A}">
+                    <a16:rowId xmlns:a16="http://schemas.microsoft.com/office/drawing/2014/main" val="3834370061"/>
+                  </a:ext>
+                </a:extLst>
+              </a:tr>
+              <a:tr h="219227">
+                <a:tc>
+                  <a:txBody>
+                    <a:bodyPr/>
+                    <a:lstStyle/>
+                    <a:p>
+                      <a:pPr marL="0" marR="0" algn="r">
+                        <a:lnSpc>
+                          <a:spcPct val="107000"/>
+                        </a:lnSpc>
+                        <a:spcAft>
+                          <a:spcPts val="800"/>
+                        </a:spcAft>
+                        <a:buNone/>
+                      </a:pPr>
+                      <a:r>
+                        <a:rPr lang="en-US" sz="1100">
+                          <a:effectLst/>
+                        </a:rPr>
+                        <a:t>9/30/2025</a:t>
+                      </a:r>
+                      <a:endParaRPr lang="en-US" sz="1100">
+                        <a:effectLst/>
+                        <a:latin typeface="Calibri" panose="020F0502020204030204" pitchFamily="34" charset="0"/>
+                        <a:ea typeface="Calibri" panose="020F0502020204030204" pitchFamily="34" charset="0"/>
+                        <a:cs typeface="Times New Roman" panose="02020603050405020304" pitchFamily="18" charset="0"/>
+                      </a:endParaRPr>
+                    </a:p>
+                  </a:txBody>
+                  <a:tcPr marL="68580" marR="68580" marT="0" marB="0"/>
+                </a:tc>
+                <a:tc>
+                  <a:txBody>
+                    <a:bodyPr/>
+                    <a:lstStyle/>
+                    <a:p>
+                      <a:pPr marL="0" marR="0" algn="r">
+                        <a:lnSpc>
+                          <a:spcPct val="107000"/>
+                        </a:lnSpc>
+                        <a:spcAft>
+                          <a:spcPts val="800"/>
+                        </a:spcAft>
+                        <a:buNone/>
+                      </a:pPr>
+                      <a:r>
+                        <a:rPr lang="en-US" sz="1100">
+                          <a:effectLst/>
+                        </a:rPr>
+                        <a:t>6</a:t>
+                      </a:r>
+                      <a:endParaRPr lang="en-US" sz="1100">
+                        <a:effectLst/>
+                        <a:latin typeface="Calibri" panose="020F0502020204030204" pitchFamily="34" charset="0"/>
+                        <a:ea typeface="Calibri" panose="020F0502020204030204" pitchFamily="34" charset="0"/>
+                        <a:cs typeface="Times New Roman" panose="02020603050405020304" pitchFamily="18" charset="0"/>
+                      </a:endParaRPr>
+                    </a:p>
+                  </a:txBody>
+                  <a:tcPr marL="68580" marR="68580" marT="0" marB="0"/>
+                </a:tc>
+                <a:tc>
+                  <a:txBody>
+                    <a:bodyPr/>
+                    <a:lstStyle/>
+                    <a:p>
+                      <a:pPr marL="0" marR="0">
+                        <a:lnSpc>
+                          <a:spcPct val="107000"/>
+                        </a:lnSpc>
+                        <a:spcAft>
+                          <a:spcPts val="800"/>
+                        </a:spcAft>
+                        <a:buNone/>
+                      </a:pPr>
+                      <a:r>
+                        <a:rPr lang="en-US" sz="1100">
+                          <a:effectLst/>
+                        </a:rPr>
+                        <a:t>Nonlinear Optimization</a:t>
+                      </a:r>
+                      <a:endParaRPr lang="en-US" sz="1100">
+                        <a:effectLst/>
+                        <a:latin typeface="Calibri" panose="020F0502020204030204" pitchFamily="34" charset="0"/>
+                        <a:ea typeface="Calibri" panose="020F0502020204030204" pitchFamily="34" charset="0"/>
+                        <a:cs typeface="Times New Roman" panose="02020603050405020304" pitchFamily="18" charset="0"/>
+                      </a:endParaRPr>
+                    </a:p>
+                  </a:txBody>
+                  <a:tcPr marL="68580" marR="68580" marT="0" marB="0"/>
+                </a:tc>
+                <a:tc>
+                  <a:txBody>
+                    <a:bodyPr/>
+                    <a:lstStyle/>
+                    <a:p>
+                      <a:pPr marL="0" marR="0" algn="r">
+                        <a:lnSpc>
+                          <a:spcPct val="107000"/>
+                        </a:lnSpc>
+                        <a:spcAft>
+                          <a:spcPts val="800"/>
+                        </a:spcAft>
+                        <a:buNone/>
+                      </a:pPr>
+                      <a:r>
+                        <a:rPr lang="en-US" sz="1100">
+                          <a:effectLst/>
+                        </a:rPr>
+                        <a:t>6</a:t>
+                      </a:r>
+                      <a:endParaRPr lang="en-US" sz="1100">
+                        <a:effectLst/>
+                        <a:latin typeface="Calibri" panose="020F0502020204030204" pitchFamily="34" charset="0"/>
+                        <a:ea typeface="Calibri" panose="020F0502020204030204" pitchFamily="34" charset="0"/>
+                        <a:cs typeface="Times New Roman" panose="02020603050405020304" pitchFamily="18" charset="0"/>
+                      </a:endParaRPr>
+                    </a:p>
+                  </a:txBody>
+                  <a:tcPr marL="68580" marR="68580" marT="0" marB="0"/>
+                </a:tc>
+                <a:tc>
+                  <a:txBody>
+                    <a:bodyPr/>
+                    <a:lstStyle/>
+                    <a:p>
+                      <a:pPr marL="0" marR="0">
+                        <a:lnSpc>
+                          <a:spcPct val="107000"/>
+                        </a:lnSpc>
+                        <a:spcAft>
+                          <a:spcPts val="800"/>
+                        </a:spcAft>
+                        <a:buNone/>
+                      </a:pPr>
+                      <a:r>
+                        <a:rPr lang="en-US" sz="1100">
+                          <a:effectLst/>
+                        </a:rPr>
+                        <a:t>Nonlinear Optimization</a:t>
+                      </a:r>
+                      <a:endParaRPr lang="en-US" sz="1100">
+                        <a:effectLst/>
+                        <a:latin typeface="Calibri" panose="020F0502020204030204" pitchFamily="34" charset="0"/>
+                        <a:ea typeface="Calibri" panose="020F0502020204030204" pitchFamily="34" charset="0"/>
+                        <a:cs typeface="Times New Roman" panose="02020603050405020304" pitchFamily="18" charset="0"/>
+                      </a:endParaRPr>
+                    </a:p>
+                  </a:txBody>
+                  <a:tcPr marL="68580" marR="68580" marT="0" marB="0"/>
+                </a:tc>
+                <a:extLst>
+                  <a:ext uri="{0D108BD9-81ED-4DB2-BD59-A6C34878D82A}">
+                    <a16:rowId xmlns:a16="http://schemas.microsoft.com/office/drawing/2014/main" val="332518636"/>
+                  </a:ext>
+                </a:extLst>
+              </a:tr>
+              <a:tr h="219227">
+                <a:tc>
+                  <a:txBody>
+                    <a:bodyPr/>
+                    <a:lstStyle/>
+                    <a:p>
+                      <a:pPr marL="0" marR="0" algn="r">
+                        <a:lnSpc>
+                          <a:spcPct val="107000"/>
+                        </a:lnSpc>
+                        <a:spcAft>
+                          <a:spcPts val="800"/>
+                        </a:spcAft>
+                        <a:buNone/>
+                      </a:pPr>
+                      <a:r>
+                        <a:rPr lang="en-US" sz="1100">
+                          <a:effectLst/>
+                        </a:rPr>
+                        <a:t>10/7/2025</a:t>
+                      </a:r>
+                      <a:endParaRPr lang="en-US" sz="1100">
+                        <a:effectLst/>
+                        <a:latin typeface="Calibri" panose="020F0502020204030204" pitchFamily="34" charset="0"/>
+                        <a:ea typeface="Calibri" panose="020F0502020204030204" pitchFamily="34" charset="0"/>
+                        <a:cs typeface="Times New Roman" panose="02020603050405020304" pitchFamily="18" charset="0"/>
+                      </a:endParaRPr>
+                    </a:p>
+                  </a:txBody>
+                  <a:tcPr marL="68580" marR="68580" marT="0" marB="0"/>
+                </a:tc>
+                <a:tc>
+                  <a:txBody>
+                    <a:bodyPr/>
+                    <a:lstStyle/>
+                    <a:p>
+                      <a:pPr marL="0" marR="0" algn="r">
+                        <a:lnSpc>
+                          <a:spcPct val="107000"/>
+                        </a:lnSpc>
+                        <a:spcAft>
+                          <a:spcPts val="800"/>
+                        </a:spcAft>
+                        <a:buNone/>
+                      </a:pPr>
+                      <a:r>
+                        <a:rPr lang="en-US" sz="1100">
+                          <a:effectLst/>
+                        </a:rPr>
+                        <a:t> </a:t>
+                      </a:r>
+                      <a:endParaRPr lang="en-US" sz="1100">
+                        <a:effectLst/>
+                        <a:latin typeface="Calibri" panose="020F0502020204030204" pitchFamily="34" charset="0"/>
+                        <a:ea typeface="Calibri" panose="020F0502020204030204" pitchFamily="34" charset="0"/>
+                        <a:cs typeface="Times New Roman" panose="02020603050405020304" pitchFamily="18" charset="0"/>
+                      </a:endParaRPr>
+                    </a:p>
+                  </a:txBody>
+                  <a:tcPr marL="68580" marR="68580" marT="0" marB="0"/>
+                </a:tc>
+                <a:tc>
+                  <a:txBody>
+                    <a:bodyPr/>
+                    <a:lstStyle/>
+                    <a:p>
+                      <a:pPr marL="0" marR="0">
+                        <a:lnSpc>
+                          <a:spcPct val="107000"/>
+                        </a:lnSpc>
+                        <a:spcAft>
+                          <a:spcPts val="800"/>
+                        </a:spcAft>
+                        <a:buNone/>
+                      </a:pPr>
+                      <a:r>
+                        <a:rPr lang="en-US" sz="1100">
+                          <a:effectLst/>
+                        </a:rPr>
+                        <a:t>Midterm review</a:t>
+                      </a:r>
+                      <a:endParaRPr lang="en-US" sz="1100">
+                        <a:effectLst/>
+                        <a:latin typeface="Calibri" panose="020F0502020204030204" pitchFamily="34" charset="0"/>
+                        <a:ea typeface="Calibri" panose="020F0502020204030204" pitchFamily="34" charset="0"/>
+                        <a:cs typeface="Times New Roman" panose="02020603050405020304" pitchFamily="18" charset="0"/>
+                      </a:endParaRPr>
+                    </a:p>
+                  </a:txBody>
+                  <a:tcPr marL="68580" marR="68580" marT="0" marB="0"/>
+                </a:tc>
+                <a:tc>
+                  <a:txBody>
+                    <a:bodyPr/>
+                    <a:lstStyle/>
+                    <a:p>
+                      <a:pPr marL="0" marR="0" algn="r">
+                        <a:lnSpc>
+                          <a:spcPct val="107000"/>
+                        </a:lnSpc>
+                        <a:spcAft>
+                          <a:spcPts val="800"/>
+                        </a:spcAft>
+                        <a:buNone/>
+                      </a:pPr>
+                      <a:r>
+                        <a:rPr lang="en-US" sz="1100">
+                          <a:effectLst/>
+                        </a:rPr>
+                        <a:t> </a:t>
+                      </a:r>
+                      <a:endParaRPr lang="en-US" sz="1100">
+                        <a:effectLst/>
+                        <a:latin typeface="Calibri" panose="020F0502020204030204" pitchFamily="34" charset="0"/>
+                        <a:ea typeface="Calibri" panose="020F0502020204030204" pitchFamily="34" charset="0"/>
+                        <a:cs typeface="Times New Roman" panose="02020603050405020304" pitchFamily="18" charset="0"/>
+                      </a:endParaRPr>
+                    </a:p>
+                  </a:txBody>
+                  <a:tcPr marL="68580" marR="68580" marT="0" marB="0"/>
+                </a:tc>
+                <a:tc>
+                  <a:txBody>
+                    <a:bodyPr/>
+                    <a:lstStyle/>
+                    <a:p>
+                      <a:pPr marL="0" marR="0">
+                        <a:lnSpc>
+                          <a:spcPct val="107000"/>
+                        </a:lnSpc>
+                        <a:spcAft>
+                          <a:spcPts val="800"/>
+                        </a:spcAft>
+                        <a:buNone/>
+                      </a:pPr>
+                      <a:r>
+                        <a:rPr lang="en-US" sz="1100">
+                          <a:effectLst/>
+                        </a:rPr>
+                        <a:t>Midterm review</a:t>
+                      </a:r>
+                      <a:endParaRPr lang="en-US" sz="1100">
+                        <a:effectLst/>
+                        <a:latin typeface="Calibri" panose="020F0502020204030204" pitchFamily="34" charset="0"/>
+                        <a:ea typeface="Calibri" panose="020F0502020204030204" pitchFamily="34" charset="0"/>
+                        <a:cs typeface="Times New Roman" panose="02020603050405020304" pitchFamily="18" charset="0"/>
+                      </a:endParaRPr>
+                    </a:p>
+                  </a:txBody>
+                  <a:tcPr marL="68580" marR="68580" marT="0" marB="0"/>
+                </a:tc>
+                <a:extLst>
+                  <a:ext uri="{0D108BD9-81ED-4DB2-BD59-A6C34878D82A}">
+                    <a16:rowId xmlns:a16="http://schemas.microsoft.com/office/drawing/2014/main" val="2583143595"/>
+                  </a:ext>
+                </a:extLst>
+              </a:tr>
+              <a:tr h="219227">
+                <a:tc>
+                  <a:txBody>
+                    <a:bodyPr/>
+                    <a:lstStyle/>
+                    <a:p>
+                      <a:pPr marL="0" marR="0" algn="r">
+                        <a:lnSpc>
+                          <a:spcPct val="107000"/>
+                        </a:lnSpc>
+                        <a:spcAft>
+                          <a:spcPts val="800"/>
+                        </a:spcAft>
+                        <a:buNone/>
+                      </a:pPr>
+                      <a:r>
+                        <a:rPr lang="en-US" sz="1100">
+                          <a:effectLst/>
+                        </a:rPr>
+                        <a:t>10/14/2025</a:t>
+                      </a:r>
+                      <a:endParaRPr lang="en-US" sz="1100">
+                        <a:effectLst/>
+                        <a:latin typeface="Calibri" panose="020F0502020204030204" pitchFamily="34" charset="0"/>
+                        <a:ea typeface="Calibri" panose="020F0502020204030204" pitchFamily="34" charset="0"/>
+                        <a:cs typeface="Times New Roman" panose="02020603050405020304" pitchFamily="18" charset="0"/>
+                      </a:endParaRPr>
+                    </a:p>
+                  </a:txBody>
+                  <a:tcPr marL="68580" marR="68580" marT="0" marB="0"/>
+                </a:tc>
+                <a:tc>
+                  <a:txBody>
+                    <a:bodyPr/>
+                    <a:lstStyle/>
+                    <a:p>
+                      <a:pPr marL="0" marR="0">
+                        <a:lnSpc>
+                          <a:spcPct val="107000"/>
+                        </a:lnSpc>
+                        <a:spcAft>
+                          <a:spcPts val="800"/>
+                        </a:spcAft>
+                        <a:buNone/>
+                      </a:pPr>
+                      <a:r>
+                        <a:rPr lang="en-US" sz="1100">
+                          <a:effectLst/>
+                        </a:rPr>
+                        <a:t> </a:t>
+                      </a:r>
+                      <a:endParaRPr lang="en-US" sz="1100">
+                        <a:effectLst/>
+                        <a:latin typeface="Calibri" panose="020F0502020204030204" pitchFamily="34" charset="0"/>
+                        <a:ea typeface="Calibri" panose="020F0502020204030204" pitchFamily="34" charset="0"/>
+                        <a:cs typeface="Times New Roman" panose="02020603050405020304" pitchFamily="18" charset="0"/>
+                      </a:endParaRPr>
+                    </a:p>
+                  </a:txBody>
+                  <a:tcPr marL="68580" marR="68580" marT="0" marB="0"/>
+                </a:tc>
+                <a:tc>
+                  <a:txBody>
+                    <a:bodyPr/>
+                    <a:lstStyle/>
+                    <a:p>
+                      <a:pPr marL="0" marR="0">
+                        <a:lnSpc>
+                          <a:spcPct val="107000"/>
+                        </a:lnSpc>
+                        <a:spcAft>
+                          <a:spcPts val="800"/>
+                        </a:spcAft>
+                        <a:buNone/>
+                      </a:pPr>
+                      <a:r>
+                        <a:rPr lang="en-US" sz="1100">
+                          <a:effectLst/>
+                        </a:rPr>
+                        <a:t>No class:  Spring break</a:t>
+                      </a:r>
+                      <a:endParaRPr lang="en-US" sz="1100">
+                        <a:effectLst/>
+                        <a:latin typeface="Calibri" panose="020F0502020204030204" pitchFamily="34" charset="0"/>
+                        <a:ea typeface="Calibri" panose="020F0502020204030204" pitchFamily="34" charset="0"/>
+                        <a:cs typeface="Times New Roman" panose="02020603050405020304" pitchFamily="18" charset="0"/>
+                      </a:endParaRPr>
+                    </a:p>
+                  </a:txBody>
+                  <a:tcPr marL="68580" marR="68580" marT="0" marB="0"/>
+                </a:tc>
+                <a:tc>
+                  <a:txBody>
+                    <a:bodyPr/>
+                    <a:lstStyle/>
+                    <a:p>
+                      <a:pPr marL="0" marR="0">
+                        <a:lnSpc>
+                          <a:spcPct val="107000"/>
+                        </a:lnSpc>
+                        <a:spcAft>
+                          <a:spcPts val="800"/>
+                        </a:spcAft>
+                        <a:buNone/>
+                      </a:pPr>
+                      <a:r>
+                        <a:rPr lang="en-US" sz="1100">
+                          <a:effectLst/>
+                        </a:rPr>
+                        <a:t> </a:t>
+                      </a:r>
+                      <a:endParaRPr lang="en-US" sz="1100">
+                        <a:effectLst/>
+                        <a:latin typeface="Calibri" panose="020F0502020204030204" pitchFamily="34" charset="0"/>
+                        <a:ea typeface="Calibri" panose="020F0502020204030204" pitchFamily="34" charset="0"/>
+                        <a:cs typeface="Times New Roman" panose="02020603050405020304" pitchFamily="18" charset="0"/>
+                      </a:endParaRPr>
+                    </a:p>
+                  </a:txBody>
+                  <a:tcPr marL="68580" marR="68580" marT="0" marB="0"/>
+                </a:tc>
+                <a:tc>
+                  <a:txBody>
+                    <a:bodyPr/>
+                    <a:lstStyle/>
+                    <a:p>
+                      <a:pPr marL="0" marR="0">
+                        <a:lnSpc>
+                          <a:spcPct val="107000"/>
+                        </a:lnSpc>
+                        <a:spcAft>
+                          <a:spcPts val="800"/>
+                        </a:spcAft>
+                        <a:buNone/>
+                      </a:pPr>
+                      <a:r>
+                        <a:rPr lang="en-US" sz="1100">
+                          <a:effectLst/>
+                        </a:rPr>
+                        <a:t>No class:  Spring break</a:t>
+                      </a:r>
+                      <a:endParaRPr lang="en-US" sz="1100">
+                        <a:effectLst/>
+                        <a:latin typeface="Calibri" panose="020F0502020204030204" pitchFamily="34" charset="0"/>
+                        <a:ea typeface="Calibri" panose="020F0502020204030204" pitchFamily="34" charset="0"/>
+                        <a:cs typeface="Times New Roman" panose="02020603050405020304" pitchFamily="18" charset="0"/>
+                      </a:endParaRPr>
+                    </a:p>
+                  </a:txBody>
+                  <a:tcPr marL="68580" marR="68580" marT="0" marB="0"/>
+                </a:tc>
+                <a:extLst>
+                  <a:ext uri="{0D108BD9-81ED-4DB2-BD59-A6C34878D82A}">
+                    <a16:rowId xmlns:a16="http://schemas.microsoft.com/office/drawing/2014/main" val="777045765"/>
+                  </a:ext>
+                </a:extLst>
+              </a:tr>
+              <a:tr h="219227">
+                <a:tc>
+                  <a:txBody>
+                    <a:bodyPr/>
+                    <a:lstStyle/>
+                    <a:p>
+                      <a:pPr marL="0" marR="0" algn="r">
+                        <a:lnSpc>
+                          <a:spcPct val="107000"/>
+                        </a:lnSpc>
+                        <a:spcAft>
+                          <a:spcPts val="800"/>
+                        </a:spcAft>
+                        <a:buNone/>
+                      </a:pPr>
+                      <a:r>
+                        <a:rPr lang="en-US" sz="1100">
+                          <a:effectLst/>
+                        </a:rPr>
+                        <a:t>10/21/2025</a:t>
+                      </a:r>
+                      <a:endParaRPr lang="en-US" sz="1100">
+                        <a:effectLst/>
+                        <a:latin typeface="Calibri" panose="020F0502020204030204" pitchFamily="34" charset="0"/>
+                        <a:ea typeface="Calibri" panose="020F0502020204030204" pitchFamily="34" charset="0"/>
+                        <a:cs typeface="Times New Roman" panose="02020603050405020304" pitchFamily="18" charset="0"/>
+                      </a:endParaRPr>
+                    </a:p>
+                  </a:txBody>
+                  <a:tcPr marL="68580" marR="68580" marT="0" marB="0"/>
+                </a:tc>
+                <a:tc>
+                  <a:txBody>
+                    <a:bodyPr/>
+                    <a:lstStyle/>
+                    <a:p>
+                      <a:pPr marL="0" marR="0">
+                        <a:lnSpc>
+                          <a:spcPct val="107000"/>
+                        </a:lnSpc>
+                        <a:spcAft>
+                          <a:spcPts val="800"/>
+                        </a:spcAft>
+                        <a:buNone/>
+                      </a:pPr>
+                      <a:r>
+                        <a:rPr lang="en-US" sz="1100">
+                          <a:effectLst/>
+                        </a:rPr>
+                        <a:t> </a:t>
+                      </a:r>
+                      <a:endParaRPr lang="en-US" sz="1100">
+                        <a:effectLst/>
+                        <a:latin typeface="Calibri" panose="020F0502020204030204" pitchFamily="34" charset="0"/>
+                        <a:ea typeface="Calibri" panose="020F0502020204030204" pitchFamily="34" charset="0"/>
+                        <a:cs typeface="Times New Roman" panose="02020603050405020304" pitchFamily="18" charset="0"/>
+                      </a:endParaRPr>
+                    </a:p>
+                  </a:txBody>
+                  <a:tcPr marL="68580" marR="68580" marT="0" marB="0"/>
+                </a:tc>
+                <a:tc>
+                  <a:txBody>
+                    <a:bodyPr/>
+                    <a:lstStyle/>
+                    <a:p>
+                      <a:pPr marL="0" marR="0">
+                        <a:lnSpc>
+                          <a:spcPct val="107000"/>
+                        </a:lnSpc>
+                        <a:spcAft>
+                          <a:spcPts val="800"/>
+                        </a:spcAft>
+                        <a:buNone/>
+                      </a:pPr>
+                      <a:r>
+                        <a:rPr lang="en-US" sz="1100">
+                          <a:effectLst/>
+                        </a:rPr>
+                        <a:t>Midterm </a:t>
+                      </a:r>
+                      <a:endParaRPr lang="en-US" sz="1100">
+                        <a:effectLst/>
+                        <a:latin typeface="Calibri" panose="020F0502020204030204" pitchFamily="34" charset="0"/>
+                        <a:ea typeface="Calibri" panose="020F0502020204030204" pitchFamily="34" charset="0"/>
+                        <a:cs typeface="Times New Roman" panose="02020603050405020304" pitchFamily="18" charset="0"/>
+                      </a:endParaRPr>
+                    </a:p>
+                  </a:txBody>
+                  <a:tcPr marL="68580" marR="68580" marT="0" marB="0"/>
+                </a:tc>
+                <a:tc>
+                  <a:txBody>
+                    <a:bodyPr/>
+                    <a:lstStyle/>
+                    <a:p>
+                      <a:pPr marL="0" marR="0">
+                        <a:lnSpc>
+                          <a:spcPct val="107000"/>
+                        </a:lnSpc>
+                        <a:spcAft>
+                          <a:spcPts val="800"/>
+                        </a:spcAft>
+                        <a:buNone/>
+                      </a:pPr>
+                      <a:r>
+                        <a:rPr lang="en-US" sz="1100">
+                          <a:effectLst/>
+                        </a:rPr>
+                        <a:t> </a:t>
+                      </a:r>
+                      <a:endParaRPr lang="en-US" sz="1100">
+                        <a:effectLst/>
+                        <a:latin typeface="Calibri" panose="020F0502020204030204" pitchFamily="34" charset="0"/>
+                        <a:ea typeface="Calibri" panose="020F0502020204030204" pitchFamily="34" charset="0"/>
+                        <a:cs typeface="Times New Roman" panose="02020603050405020304" pitchFamily="18" charset="0"/>
+                      </a:endParaRPr>
+                    </a:p>
+                  </a:txBody>
+                  <a:tcPr marL="68580" marR="68580" marT="0" marB="0"/>
+                </a:tc>
+                <a:tc>
+                  <a:txBody>
+                    <a:bodyPr/>
+                    <a:lstStyle/>
+                    <a:p>
+                      <a:pPr marL="0" marR="0">
+                        <a:lnSpc>
+                          <a:spcPct val="107000"/>
+                        </a:lnSpc>
+                        <a:spcAft>
+                          <a:spcPts val="800"/>
+                        </a:spcAft>
+                        <a:buNone/>
+                      </a:pPr>
+                      <a:r>
+                        <a:rPr lang="en-US" sz="1100">
+                          <a:effectLst/>
+                        </a:rPr>
+                        <a:t>Midterm </a:t>
+                      </a:r>
+                      <a:endParaRPr lang="en-US" sz="1100">
+                        <a:effectLst/>
+                        <a:latin typeface="Calibri" panose="020F0502020204030204" pitchFamily="34" charset="0"/>
+                        <a:ea typeface="Calibri" panose="020F0502020204030204" pitchFamily="34" charset="0"/>
+                        <a:cs typeface="Times New Roman" panose="02020603050405020304" pitchFamily="18" charset="0"/>
+                      </a:endParaRPr>
+                    </a:p>
+                  </a:txBody>
+                  <a:tcPr marL="68580" marR="68580" marT="0" marB="0"/>
+                </a:tc>
+                <a:extLst>
+                  <a:ext uri="{0D108BD9-81ED-4DB2-BD59-A6C34878D82A}">
+                    <a16:rowId xmlns:a16="http://schemas.microsoft.com/office/drawing/2014/main" val="655389731"/>
+                  </a:ext>
+                </a:extLst>
+              </a:tr>
+              <a:tr h="219227">
+                <a:tc>
+                  <a:txBody>
+                    <a:bodyPr/>
+                    <a:lstStyle/>
+                    <a:p>
+                      <a:pPr marL="0" marR="0" algn="r">
+                        <a:lnSpc>
+                          <a:spcPct val="107000"/>
+                        </a:lnSpc>
+                        <a:spcAft>
+                          <a:spcPts val="800"/>
+                        </a:spcAft>
+                        <a:buNone/>
+                      </a:pPr>
+                      <a:r>
+                        <a:rPr lang="en-US" sz="1100">
+                          <a:effectLst/>
+                        </a:rPr>
+                        <a:t>10/28/2025</a:t>
+                      </a:r>
+                      <a:endParaRPr lang="en-US" sz="1100">
+                        <a:effectLst/>
+                        <a:latin typeface="Calibri" panose="020F0502020204030204" pitchFamily="34" charset="0"/>
+                        <a:ea typeface="Calibri" panose="020F0502020204030204" pitchFamily="34" charset="0"/>
+                        <a:cs typeface="Times New Roman" panose="02020603050405020304" pitchFamily="18" charset="0"/>
+                      </a:endParaRPr>
+                    </a:p>
+                  </a:txBody>
+                  <a:tcPr marL="68580" marR="68580" marT="0" marB="0"/>
+                </a:tc>
+                <a:tc>
+                  <a:txBody>
+                    <a:bodyPr/>
+                    <a:lstStyle/>
+                    <a:p>
+                      <a:pPr marL="0" marR="0" algn="r">
+                        <a:lnSpc>
+                          <a:spcPct val="107000"/>
+                        </a:lnSpc>
+                        <a:spcAft>
+                          <a:spcPts val="800"/>
+                        </a:spcAft>
+                        <a:buNone/>
+                      </a:pPr>
+                      <a:r>
+                        <a:rPr lang="en-US" sz="1100">
+                          <a:effectLst/>
+                        </a:rPr>
+                        <a:t>7</a:t>
+                      </a:r>
+                      <a:endParaRPr lang="en-US" sz="1100">
+                        <a:effectLst/>
+                        <a:latin typeface="Calibri" panose="020F0502020204030204" pitchFamily="34" charset="0"/>
+                        <a:ea typeface="Calibri" panose="020F0502020204030204" pitchFamily="34" charset="0"/>
+                        <a:cs typeface="Times New Roman" panose="02020603050405020304" pitchFamily="18" charset="0"/>
+                      </a:endParaRPr>
+                    </a:p>
+                  </a:txBody>
+                  <a:tcPr marL="68580" marR="68580" marT="0" marB="0"/>
+                </a:tc>
+                <a:tc>
+                  <a:txBody>
+                    <a:bodyPr/>
+                    <a:lstStyle/>
+                    <a:p>
+                      <a:pPr marL="0" marR="0">
+                        <a:lnSpc>
+                          <a:spcPct val="107000"/>
+                        </a:lnSpc>
+                        <a:spcAft>
+                          <a:spcPts val="800"/>
+                        </a:spcAft>
+                        <a:buNone/>
+                      </a:pPr>
+                      <a:r>
+                        <a:rPr lang="en-US" sz="1100">
+                          <a:effectLst/>
+                        </a:rPr>
+                        <a:t>SVMs</a:t>
+                      </a:r>
+                      <a:endParaRPr lang="en-US" sz="1100">
+                        <a:effectLst/>
+                        <a:latin typeface="Calibri" panose="020F0502020204030204" pitchFamily="34" charset="0"/>
+                        <a:ea typeface="Calibri" panose="020F0502020204030204" pitchFamily="34" charset="0"/>
+                        <a:cs typeface="Times New Roman" panose="02020603050405020304" pitchFamily="18" charset="0"/>
+                      </a:endParaRPr>
+                    </a:p>
+                  </a:txBody>
+                  <a:tcPr marL="68580" marR="68580" marT="0" marB="0"/>
+                </a:tc>
+                <a:tc>
+                  <a:txBody>
+                    <a:bodyPr/>
+                    <a:lstStyle/>
+                    <a:p>
+                      <a:pPr marL="0" marR="0" algn="r">
+                        <a:lnSpc>
+                          <a:spcPct val="107000"/>
+                        </a:lnSpc>
+                        <a:spcAft>
+                          <a:spcPts val="800"/>
+                        </a:spcAft>
+                        <a:buNone/>
+                      </a:pPr>
+                      <a:r>
+                        <a:rPr lang="en-US" sz="1100">
+                          <a:effectLst/>
+                        </a:rPr>
+                        <a:t>8</a:t>
+                      </a:r>
+                      <a:endParaRPr lang="en-US" sz="1100">
+                        <a:effectLst/>
+                        <a:latin typeface="Calibri" panose="020F0502020204030204" pitchFamily="34" charset="0"/>
+                        <a:ea typeface="Calibri" panose="020F0502020204030204" pitchFamily="34" charset="0"/>
+                        <a:cs typeface="Times New Roman" panose="02020603050405020304" pitchFamily="18" charset="0"/>
+                      </a:endParaRPr>
+                    </a:p>
+                  </a:txBody>
+                  <a:tcPr marL="68580" marR="68580" marT="0" marB="0"/>
+                </a:tc>
+                <a:tc>
+                  <a:txBody>
+                    <a:bodyPr/>
+                    <a:lstStyle/>
+                    <a:p>
+                      <a:pPr marL="0" marR="0">
+                        <a:lnSpc>
+                          <a:spcPct val="107000"/>
+                        </a:lnSpc>
+                        <a:spcAft>
+                          <a:spcPts val="800"/>
+                        </a:spcAft>
+                        <a:buNone/>
+                      </a:pPr>
+                      <a:r>
+                        <a:rPr lang="en-US" sz="1100">
+                          <a:effectLst/>
+                        </a:rPr>
+                        <a:t>Neural Networks</a:t>
+                      </a:r>
+                      <a:endParaRPr lang="en-US" sz="1100">
+                        <a:effectLst/>
+                        <a:latin typeface="Calibri" panose="020F0502020204030204" pitchFamily="34" charset="0"/>
+                        <a:ea typeface="Calibri" panose="020F0502020204030204" pitchFamily="34" charset="0"/>
+                        <a:cs typeface="Times New Roman" panose="02020603050405020304" pitchFamily="18" charset="0"/>
+                      </a:endParaRPr>
+                    </a:p>
+                  </a:txBody>
+                  <a:tcPr marL="68580" marR="68580" marT="0" marB="0"/>
+                </a:tc>
+                <a:extLst>
+                  <a:ext uri="{0D108BD9-81ED-4DB2-BD59-A6C34878D82A}">
+                    <a16:rowId xmlns:a16="http://schemas.microsoft.com/office/drawing/2014/main" val="1387858286"/>
+                  </a:ext>
+                </a:extLst>
+              </a:tr>
+              <a:tr h="219227">
+                <a:tc>
+                  <a:txBody>
+                    <a:bodyPr/>
+                    <a:lstStyle/>
+                    <a:p>
+                      <a:pPr marL="0" marR="0" algn="r">
+                        <a:lnSpc>
+                          <a:spcPct val="107000"/>
+                        </a:lnSpc>
+                        <a:spcAft>
+                          <a:spcPts val="800"/>
+                        </a:spcAft>
+                        <a:buNone/>
+                      </a:pPr>
+                      <a:r>
+                        <a:rPr lang="en-US" sz="1100">
+                          <a:effectLst/>
+                        </a:rPr>
+                        <a:t>11/4/2025</a:t>
+                      </a:r>
+                      <a:endParaRPr lang="en-US" sz="1100">
+                        <a:effectLst/>
+                        <a:latin typeface="Calibri" panose="020F0502020204030204" pitchFamily="34" charset="0"/>
+                        <a:ea typeface="Calibri" panose="020F0502020204030204" pitchFamily="34" charset="0"/>
+                        <a:cs typeface="Times New Roman" panose="02020603050405020304" pitchFamily="18" charset="0"/>
+                      </a:endParaRPr>
+                    </a:p>
+                  </a:txBody>
+                  <a:tcPr marL="68580" marR="68580" marT="0" marB="0"/>
+                </a:tc>
+                <a:tc>
+                  <a:txBody>
+                    <a:bodyPr/>
+                    <a:lstStyle/>
+                    <a:p>
+                      <a:pPr marL="0" marR="0" algn="r">
+                        <a:lnSpc>
+                          <a:spcPct val="107000"/>
+                        </a:lnSpc>
+                        <a:spcAft>
+                          <a:spcPts val="800"/>
+                        </a:spcAft>
+                        <a:buNone/>
+                      </a:pPr>
+                      <a:r>
+                        <a:rPr lang="en-US" sz="1100">
+                          <a:effectLst/>
+                        </a:rPr>
+                        <a:t>8</a:t>
+                      </a:r>
+                      <a:endParaRPr lang="en-US" sz="1100">
+                        <a:effectLst/>
+                        <a:latin typeface="Calibri" panose="020F0502020204030204" pitchFamily="34" charset="0"/>
+                        <a:ea typeface="Calibri" panose="020F0502020204030204" pitchFamily="34" charset="0"/>
+                        <a:cs typeface="Times New Roman" panose="02020603050405020304" pitchFamily="18" charset="0"/>
+                      </a:endParaRPr>
+                    </a:p>
+                  </a:txBody>
+                  <a:tcPr marL="68580" marR="68580" marT="0" marB="0"/>
+                </a:tc>
+                <a:tc>
+                  <a:txBody>
+                    <a:bodyPr/>
+                    <a:lstStyle/>
+                    <a:p>
+                      <a:pPr marL="0" marR="0">
+                        <a:lnSpc>
+                          <a:spcPct val="107000"/>
+                        </a:lnSpc>
+                        <a:spcAft>
+                          <a:spcPts val="800"/>
+                        </a:spcAft>
+                        <a:buNone/>
+                      </a:pPr>
+                      <a:r>
+                        <a:rPr lang="en-US" sz="1100">
+                          <a:effectLst/>
+                        </a:rPr>
+                        <a:t>Neural Networks</a:t>
+                      </a:r>
+                      <a:endParaRPr lang="en-US" sz="1100">
+                        <a:effectLst/>
+                        <a:latin typeface="Calibri" panose="020F0502020204030204" pitchFamily="34" charset="0"/>
+                        <a:ea typeface="Calibri" panose="020F0502020204030204" pitchFamily="34" charset="0"/>
+                        <a:cs typeface="Times New Roman" panose="02020603050405020304" pitchFamily="18" charset="0"/>
+                      </a:endParaRPr>
+                    </a:p>
+                  </a:txBody>
+                  <a:tcPr marL="68580" marR="68580" marT="0" marB="0"/>
+                </a:tc>
+                <a:tc>
+                  <a:txBody>
+                    <a:bodyPr/>
+                    <a:lstStyle/>
+                    <a:p>
+                      <a:pPr marL="0" marR="0" algn="r">
+                        <a:lnSpc>
+                          <a:spcPct val="107000"/>
+                        </a:lnSpc>
+                        <a:spcAft>
+                          <a:spcPts val="800"/>
+                        </a:spcAft>
+                        <a:buNone/>
+                      </a:pPr>
+                      <a:r>
+                        <a:rPr lang="en-US" sz="1100">
+                          <a:effectLst/>
+                        </a:rPr>
+                        <a:t>9</a:t>
+                      </a:r>
+                      <a:endParaRPr lang="en-US" sz="1100">
+                        <a:effectLst/>
+                        <a:latin typeface="Calibri" panose="020F0502020204030204" pitchFamily="34" charset="0"/>
+                        <a:ea typeface="Calibri" panose="020F0502020204030204" pitchFamily="34" charset="0"/>
+                        <a:cs typeface="Times New Roman" panose="02020603050405020304" pitchFamily="18" charset="0"/>
+                      </a:endParaRPr>
+                    </a:p>
+                  </a:txBody>
+                  <a:tcPr marL="68580" marR="68580" marT="0" marB="0"/>
+                </a:tc>
+                <a:tc>
+                  <a:txBody>
+                    <a:bodyPr/>
+                    <a:lstStyle/>
+                    <a:p>
+                      <a:pPr marL="0" marR="0">
+                        <a:lnSpc>
+                          <a:spcPct val="107000"/>
+                        </a:lnSpc>
+                        <a:spcAft>
+                          <a:spcPts val="800"/>
+                        </a:spcAft>
+                        <a:buNone/>
+                      </a:pPr>
+                      <a:r>
+                        <a:rPr lang="en-US" sz="1100">
+                          <a:effectLst/>
+                        </a:rPr>
+                        <a:t>Convolutional neural networks</a:t>
+                      </a:r>
+                      <a:endParaRPr lang="en-US" sz="1100">
+                        <a:effectLst/>
+                        <a:latin typeface="Calibri" panose="020F0502020204030204" pitchFamily="34" charset="0"/>
+                        <a:ea typeface="Calibri" panose="020F0502020204030204" pitchFamily="34" charset="0"/>
+                        <a:cs typeface="Times New Roman" panose="02020603050405020304" pitchFamily="18" charset="0"/>
+                      </a:endParaRPr>
+                    </a:p>
+                  </a:txBody>
+                  <a:tcPr marL="68580" marR="68580" marT="0" marB="0"/>
+                </a:tc>
+                <a:extLst>
+                  <a:ext uri="{0D108BD9-81ED-4DB2-BD59-A6C34878D82A}">
+                    <a16:rowId xmlns:a16="http://schemas.microsoft.com/office/drawing/2014/main" val="1444267972"/>
+                  </a:ext>
+                </a:extLst>
+              </a:tr>
+              <a:tr h="438453">
+                <a:tc>
+                  <a:txBody>
+                    <a:bodyPr/>
+                    <a:lstStyle/>
+                    <a:p>
+                      <a:pPr marL="0" marR="0" algn="r">
+                        <a:lnSpc>
+                          <a:spcPct val="107000"/>
+                        </a:lnSpc>
+                        <a:spcAft>
+                          <a:spcPts val="800"/>
+                        </a:spcAft>
+                        <a:buNone/>
+                      </a:pPr>
+                      <a:r>
+                        <a:rPr lang="en-US" sz="1100">
+                          <a:effectLst/>
+                        </a:rPr>
+                        <a:t>11/11/2025</a:t>
+                      </a:r>
+                      <a:endParaRPr lang="en-US" sz="1100">
+                        <a:effectLst/>
+                        <a:latin typeface="Calibri" panose="020F0502020204030204" pitchFamily="34" charset="0"/>
+                        <a:ea typeface="Calibri" panose="020F0502020204030204" pitchFamily="34" charset="0"/>
+                        <a:cs typeface="Times New Roman" panose="02020603050405020304" pitchFamily="18" charset="0"/>
+                      </a:endParaRPr>
+                    </a:p>
+                  </a:txBody>
+                  <a:tcPr marL="68580" marR="68580" marT="0" marB="0"/>
+                </a:tc>
+                <a:tc>
+                  <a:txBody>
+                    <a:bodyPr/>
+                    <a:lstStyle/>
+                    <a:p>
+                      <a:pPr marL="0" marR="0" algn="r">
+                        <a:lnSpc>
+                          <a:spcPct val="107000"/>
+                        </a:lnSpc>
+                        <a:spcAft>
+                          <a:spcPts val="800"/>
+                        </a:spcAft>
+                        <a:buNone/>
+                      </a:pPr>
+                      <a:r>
+                        <a:rPr lang="en-US" sz="1100">
+                          <a:effectLst/>
+                        </a:rPr>
+                        <a:t>9</a:t>
+                      </a:r>
+                      <a:endParaRPr lang="en-US" sz="1100">
+                        <a:effectLst/>
+                        <a:latin typeface="Calibri" panose="020F0502020204030204" pitchFamily="34" charset="0"/>
+                        <a:ea typeface="Calibri" panose="020F0502020204030204" pitchFamily="34" charset="0"/>
+                        <a:cs typeface="Times New Roman" panose="02020603050405020304" pitchFamily="18" charset="0"/>
+                      </a:endParaRPr>
+                    </a:p>
+                  </a:txBody>
+                  <a:tcPr marL="68580" marR="68580" marT="0" marB="0"/>
+                </a:tc>
+                <a:tc>
+                  <a:txBody>
+                    <a:bodyPr/>
+                    <a:lstStyle/>
+                    <a:p>
+                      <a:pPr marL="0" marR="0">
+                        <a:lnSpc>
+                          <a:spcPct val="107000"/>
+                        </a:lnSpc>
+                        <a:spcAft>
+                          <a:spcPts val="800"/>
+                        </a:spcAft>
+                        <a:buNone/>
+                      </a:pPr>
+                      <a:r>
+                        <a:rPr lang="en-US" sz="1100">
+                          <a:effectLst/>
+                        </a:rPr>
+                        <a:t>Convolutional neural networks</a:t>
+                      </a:r>
+                      <a:endParaRPr lang="en-US" sz="1100">
+                        <a:effectLst/>
+                        <a:latin typeface="Calibri" panose="020F0502020204030204" pitchFamily="34" charset="0"/>
+                        <a:ea typeface="Calibri" panose="020F0502020204030204" pitchFamily="34" charset="0"/>
+                        <a:cs typeface="Times New Roman" panose="02020603050405020304" pitchFamily="18" charset="0"/>
+                      </a:endParaRPr>
+                    </a:p>
+                  </a:txBody>
+                  <a:tcPr marL="68580" marR="68580" marT="0" marB="0"/>
+                </a:tc>
+                <a:tc>
+                  <a:txBody>
+                    <a:bodyPr/>
+                    <a:lstStyle/>
+                    <a:p>
+                      <a:pPr marL="0" marR="0" algn="r">
+                        <a:lnSpc>
+                          <a:spcPct val="107000"/>
+                        </a:lnSpc>
+                        <a:spcAft>
+                          <a:spcPts val="800"/>
+                        </a:spcAft>
+                        <a:buNone/>
+                      </a:pPr>
+                      <a:r>
+                        <a:rPr lang="en-US" sz="1100">
+                          <a:effectLst/>
+                        </a:rPr>
+                        <a:t>10</a:t>
+                      </a:r>
+                      <a:endParaRPr lang="en-US" sz="1100">
+                        <a:effectLst/>
+                        <a:latin typeface="Calibri" panose="020F0502020204030204" pitchFamily="34" charset="0"/>
+                        <a:ea typeface="Calibri" panose="020F0502020204030204" pitchFamily="34" charset="0"/>
+                        <a:cs typeface="Times New Roman" panose="02020603050405020304" pitchFamily="18" charset="0"/>
+                      </a:endParaRPr>
+                    </a:p>
+                  </a:txBody>
+                  <a:tcPr marL="68580" marR="68580" marT="0" marB="0"/>
+                </a:tc>
+                <a:tc>
+                  <a:txBody>
+                    <a:bodyPr/>
+                    <a:lstStyle/>
+                    <a:p>
+                      <a:pPr marL="0" marR="0">
+                        <a:lnSpc>
+                          <a:spcPct val="107000"/>
+                        </a:lnSpc>
+                        <a:spcAft>
+                          <a:spcPts val="800"/>
+                        </a:spcAft>
+                        <a:buNone/>
+                      </a:pPr>
+                      <a:r>
+                        <a:rPr lang="en-US" sz="1100">
+                          <a:effectLst/>
+                        </a:rPr>
+                        <a:t>PCA</a:t>
+                      </a:r>
+                      <a:endParaRPr lang="en-US" sz="1100">
+                        <a:effectLst/>
+                        <a:latin typeface="Calibri" panose="020F0502020204030204" pitchFamily="34" charset="0"/>
+                        <a:ea typeface="Calibri" panose="020F0502020204030204" pitchFamily="34" charset="0"/>
+                        <a:cs typeface="Times New Roman" panose="02020603050405020304" pitchFamily="18" charset="0"/>
+                      </a:endParaRPr>
+                    </a:p>
+                  </a:txBody>
+                  <a:tcPr marL="68580" marR="68580" marT="0" marB="0"/>
+                </a:tc>
+                <a:extLst>
+                  <a:ext uri="{0D108BD9-81ED-4DB2-BD59-A6C34878D82A}">
+                    <a16:rowId xmlns:a16="http://schemas.microsoft.com/office/drawing/2014/main" val="4249027757"/>
+                  </a:ext>
+                </a:extLst>
+              </a:tr>
+              <a:tr h="219227">
+                <a:tc>
+                  <a:txBody>
+                    <a:bodyPr/>
+                    <a:lstStyle/>
+                    <a:p>
+                      <a:pPr marL="0" marR="0" algn="r">
+                        <a:lnSpc>
+                          <a:spcPct val="107000"/>
+                        </a:lnSpc>
+                        <a:spcAft>
+                          <a:spcPts val="800"/>
+                        </a:spcAft>
+                        <a:buNone/>
+                      </a:pPr>
+                      <a:r>
+                        <a:rPr lang="en-US" sz="1100">
+                          <a:effectLst/>
+                        </a:rPr>
+                        <a:t>11/18/2025</a:t>
+                      </a:r>
+                      <a:endParaRPr lang="en-US" sz="1100">
+                        <a:effectLst/>
+                        <a:latin typeface="Calibri" panose="020F0502020204030204" pitchFamily="34" charset="0"/>
+                        <a:ea typeface="Calibri" panose="020F0502020204030204" pitchFamily="34" charset="0"/>
+                        <a:cs typeface="Times New Roman" panose="02020603050405020304" pitchFamily="18" charset="0"/>
+                      </a:endParaRPr>
+                    </a:p>
+                  </a:txBody>
+                  <a:tcPr marL="68580" marR="68580" marT="0" marB="0"/>
+                </a:tc>
+                <a:tc>
+                  <a:txBody>
+                    <a:bodyPr/>
+                    <a:lstStyle/>
+                    <a:p>
+                      <a:pPr marL="0" marR="0" algn="r">
+                        <a:lnSpc>
+                          <a:spcPct val="107000"/>
+                        </a:lnSpc>
+                        <a:spcAft>
+                          <a:spcPts val="800"/>
+                        </a:spcAft>
+                        <a:buNone/>
+                      </a:pPr>
+                      <a:r>
+                        <a:rPr lang="en-US" sz="1100">
+                          <a:effectLst/>
+                        </a:rPr>
+                        <a:t>10</a:t>
+                      </a:r>
+                      <a:endParaRPr lang="en-US" sz="1100">
+                        <a:effectLst/>
+                        <a:latin typeface="Calibri" panose="020F0502020204030204" pitchFamily="34" charset="0"/>
+                        <a:ea typeface="Calibri" panose="020F0502020204030204" pitchFamily="34" charset="0"/>
+                        <a:cs typeface="Times New Roman" panose="02020603050405020304" pitchFamily="18" charset="0"/>
+                      </a:endParaRPr>
+                    </a:p>
+                  </a:txBody>
+                  <a:tcPr marL="68580" marR="68580" marT="0" marB="0"/>
+                </a:tc>
+                <a:tc>
+                  <a:txBody>
+                    <a:bodyPr/>
+                    <a:lstStyle/>
+                    <a:p>
+                      <a:pPr marL="0" marR="0">
+                        <a:lnSpc>
+                          <a:spcPct val="107000"/>
+                        </a:lnSpc>
+                        <a:spcAft>
+                          <a:spcPts val="800"/>
+                        </a:spcAft>
+                        <a:buNone/>
+                      </a:pPr>
+                      <a:r>
+                        <a:rPr lang="en-US" sz="1100">
+                          <a:effectLst/>
+                        </a:rPr>
+                        <a:t>PCA</a:t>
+                      </a:r>
+                      <a:endParaRPr lang="en-US" sz="1100">
+                        <a:effectLst/>
+                        <a:latin typeface="Calibri" panose="020F0502020204030204" pitchFamily="34" charset="0"/>
+                        <a:ea typeface="Calibri" panose="020F0502020204030204" pitchFamily="34" charset="0"/>
+                        <a:cs typeface="Times New Roman" panose="02020603050405020304" pitchFamily="18" charset="0"/>
+                      </a:endParaRPr>
+                    </a:p>
+                  </a:txBody>
+                  <a:tcPr marL="68580" marR="68580" marT="0" marB="0"/>
+                </a:tc>
+                <a:tc>
+                  <a:txBody>
+                    <a:bodyPr/>
+                    <a:lstStyle/>
+                    <a:p>
+                      <a:pPr marL="0" marR="0" algn="r">
+                        <a:lnSpc>
+                          <a:spcPct val="107000"/>
+                        </a:lnSpc>
+                        <a:spcAft>
+                          <a:spcPts val="800"/>
+                        </a:spcAft>
+                        <a:buNone/>
+                      </a:pPr>
+                      <a:r>
+                        <a:rPr lang="en-US" sz="1100">
+                          <a:effectLst/>
+                        </a:rPr>
+                        <a:t>11</a:t>
+                      </a:r>
+                      <a:endParaRPr lang="en-US" sz="1100">
+                        <a:effectLst/>
+                        <a:latin typeface="Calibri" panose="020F0502020204030204" pitchFamily="34" charset="0"/>
+                        <a:ea typeface="Calibri" panose="020F0502020204030204" pitchFamily="34" charset="0"/>
+                        <a:cs typeface="Times New Roman" panose="02020603050405020304" pitchFamily="18" charset="0"/>
+                      </a:endParaRPr>
+                    </a:p>
+                  </a:txBody>
+                  <a:tcPr marL="68580" marR="68580" marT="0" marB="0"/>
+                </a:tc>
+                <a:tc>
+                  <a:txBody>
+                    <a:bodyPr/>
+                    <a:lstStyle/>
+                    <a:p>
+                      <a:pPr marL="0" marR="0">
+                        <a:lnSpc>
+                          <a:spcPct val="107000"/>
+                        </a:lnSpc>
+                        <a:spcAft>
+                          <a:spcPts val="800"/>
+                        </a:spcAft>
+                        <a:buNone/>
+                      </a:pPr>
+                      <a:r>
+                        <a:rPr lang="en-US" sz="1100">
+                          <a:effectLst/>
+                        </a:rPr>
+                        <a:t>Word Embeddings and tokenization</a:t>
+                      </a:r>
+                      <a:endParaRPr lang="en-US" sz="1100">
+                        <a:effectLst/>
+                        <a:latin typeface="Calibri" panose="020F0502020204030204" pitchFamily="34" charset="0"/>
+                        <a:ea typeface="Calibri" panose="020F0502020204030204" pitchFamily="34" charset="0"/>
+                        <a:cs typeface="Times New Roman" panose="02020603050405020304" pitchFamily="18" charset="0"/>
+                      </a:endParaRPr>
+                    </a:p>
+                  </a:txBody>
+                  <a:tcPr marL="68580" marR="68580" marT="0" marB="0"/>
+                </a:tc>
+                <a:extLst>
+                  <a:ext uri="{0D108BD9-81ED-4DB2-BD59-A6C34878D82A}">
+                    <a16:rowId xmlns:a16="http://schemas.microsoft.com/office/drawing/2014/main" val="4056372383"/>
+                  </a:ext>
+                </a:extLst>
+              </a:tr>
+              <a:tr h="219227">
+                <a:tc>
+                  <a:txBody>
+                    <a:bodyPr/>
+                    <a:lstStyle/>
+                    <a:p>
+                      <a:pPr marL="0" marR="0" algn="r">
+                        <a:lnSpc>
+                          <a:spcPct val="107000"/>
+                        </a:lnSpc>
+                        <a:spcAft>
+                          <a:spcPts val="800"/>
+                        </a:spcAft>
+                        <a:buNone/>
+                      </a:pPr>
+                      <a:r>
+                        <a:rPr lang="en-US" sz="1100">
+                          <a:effectLst/>
+                        </a:rPr>
+                        <a:t>11/25/2025</a:t>
+                      </a:r>
+                      <a:endParaRPr lang="en-US" sz="1100">
+                        <a:effectLst/>
+                        <a:latin typeface="Calibri" panose="020F0502020204030204" pitchFamily="34" charset="0"/>
+                        <a:ea typeface="Calibri" panose="020F0502020204030204" pitchFamily="34" charset="0"/>
+                        <a:cs typeface="Times New Roman" panose="02020603050405020304" pitchFamily="18" charset="0"/>
+                      </a:endParaRPr>
+                    </a:p>
+                  </a:txBody>
+                  <a:tcPr marL="68580" marR="68580" marT="0" marB="0"/>
+                </a:tc>
+                <a:tc>
+                  <a:txBody>
+                    <a:bodyPr/>
+                    <a:lstStyle/>
+                    <a:p>
+                      <a:pPr marL="0" marR="0" algn="r">
+                        <a:lnSpc>
+                          <a:spcPct val="107000"/>
+                        </a:lnSpc>
+                        <a:spcAft>
+                          <a:spcPts val="800"/>
+                        </a:spcAft>
+                        <a:buNone/>
+                      </a:pPr>
+                      <a:r>
+                        <a:rPr lang="en-US" sz="1100">
+                          <a:effectLst/>
+                        </a:rPr>
+                        <a:t>11</a:t>
+                      </a:r>
+                      <a:endParaRPr lang="en-US" sz="1100">
+                        <a:effectLst/>
+                        <a:latin typeface="Calibri" panose="020F0502020204030204" pitchFamily="34" charset="0"/>
+                        <a:ea typeface="Calibri" panose="020F0502020204030204" pitchFamily="34" charset="0"/>
+                        <a:cs typeface="Times New Roman" panose="02020603050405020304" pitchFamily="18" charset="0"/>
+                      </a:endParaRPr>
+                    </a:p>
+                  </a:txBody>
+                  <a:tcPr marL="68580" marR="68580" marT="0" marB="0"/>
+                </a:tc>
+                <a:tc>
+                  <a:txBody>
+                    <a:bodyPr/>
+                    <a:lstStyle/>
+                    <a:p>
+                      <a:pPr marL="0" marR="0">
+                        <a:lnSpc>
+                          <a:spcPct val="107000"/>
+                        </a:lnSpc>
+                        <a:spcAft>
+                          <a:spcPts val="800"/>
+                        </a:spcAft>
+                        <a:buNone/>
+                      </a:pPr>
+                      <a:r>
+                        <a:rPr lang="en-US" sz="1100">
+                          <a:effectLst/>
+                        </a:rPr>
+                        <a:t>Clustering and K-means</a:t>
+                      </a:r>
+                      <a:endParaRPr lang="en-US" sz="1100">
+                        <a:effectLst/>
+                        <a:latin typeface="Calibri" panose="020F0502020204030204" pitchFamily="34" charset="0"/>
+                        <a:ea typeface="Calibri" panose="020F0502020204030204" pitchFamily="34" charset="0"/>
+                        <a:cs typeface="Times New Roman" panose="02020603050405020304" pitchFamily="18" charset="0"/>
+                      </a:endParaRPr>
+                    </a:p>
+                  </a:txBody>
+                  <a:tcPr marL="68580" marR="68580" marT="0" marB="0"/>
+                </a:tc>
+                <a:tc>
+                  <a:txBody>
+                    <a:bodyPr/>
+                    <a:lstStyle/>
+                    <a:p>
+                      <a:pPr marL="0" marR="0" algn="r">
+                        <a:lnSpc>
+                          <a:spcPct val="107000"/>
+                        </a:lnSpc>
+                        <a:spcAft>
+                          <a:spcPts val="800"/>
+                        </a:spcAft>
+                        <a:buNone/>
+                      </a:pPr>
+                      <a:r>
+                        <a:rPr lang="en-US" sz="1100">
+                          <a:effectLst/>
+                        </a:rPr>
+                        <a:t>12</a:t>
+                      </a:r>
+                      <a:endParaRPr lang="en-US" sz="1100">
+                        <a:effectLst/>
+                        <a:latin typeface="Calibri" panose="020F0502020204030204" pitchFamily="34" charset="0"/>
+                        <a:ea typeface="Calibri" panose="020F0502020204030204" pitchFamily="34" charset="0"/>
+                        <a:cs typeface="Times New Roman" panose="02020603050405020304" pitchFamily="18" charset="0"/>
+                      </a:endParaRPr>
+                    </a:p>
+                  </a:txBody>
+                  <a:tcPr marL="68580" marR="68580" marT="0" marB="0"/>
+                </a:tc>
+                <a:tc>
+                  <a:txBody>
+                    <a:bodyPr/>
+                    <a:lstStyle/>
+                    <a:p>
+                      <a:pPr marL="0" marR="0">
+                        <a:lnSpc>
+                          <a:spcPct val="107000"/>
+                        </a:lnSpc>
+                        <a:spcAft>
+                          <a:spcPts val="800"/>
+                        </a:spcAft>
+                        <a:buNone/>
+                      </a:pPr>
+                      <a:r>
+                        <a:rPr lang="en-US" sz="1100">
+                          <a:effectLst/>
+                        </a:rPr>
+                        <a:t>Attention and LLMs</a:t>
+                      </a:r>
+                      <a:endParaRPr lang="en-US" sz="1100">
+                        <a:effectLst/>
+                        <a:latin typeface="Calibri" panose="020F0502020204030204" pitchFamily="34" charset="0"/>
+                        <a:ea typeface="Calibri" panose="020F0502020204030204" pitchFamily="34" charset="0"/>
+                        <a:cs typeface="Times New Roman" panose="02020603050405020304" pitchFamily="18" charset="0"/>
+                      </a:endParaRPr>
+                    </a:p>
+                  </a:txBody>
+                  <a:tcPr marL="68580" marR="68580" marT="0" marB="0"/>
+                </a:tc>
+                <a:extLst>
+                  <a:ext uri="{0D108BD9-81ED-4DB2-BD59-A6C34878D82A}">
+                    <a16:rowId xmlns:a16="http://schemas.microsoft.com/office/drawing/2014/main" val="4442857"/>
+                  </a:ext>
+                </a:extLst>
+              </a:tr>
+              <a:tr h="438453">
+                <a:tc>
+                  <a:txBody>
+                    <a:bodyPr/>
+                    <a:lstStyle/>
+                    <a:p>
+                      <a:pPr marL="0" marR="0" algn="r">
+                        <a:lnSpc>
+                          <a:spcPct val="107000"/>
+                        </a:lnSpc>
+                        <a:spcAft>
+                          <a:spcPts val="800"/>
+                        </a:spcAft>
+                        <a:buNone/>
+                      </a:pPr>
+                      <a:r>
+                        <a:rPr lang="en-US" sz="1100">
+                          <a:effectLst/>
+                        </a:rPr>
+                        <a:t>12/2/2025</a:t>
+                      </a:r>
+                      <a:endParaRPr lang="en-US" sz="1100">
+                        <a:effectLst/>
+                        <a:latin typeface="Calibri" panose="020F0502020204030204" pitchFamily="34" charset="0"/>
+                        <a:ea typeface="Calibri" panose="020F0502020204030204" pitchFamily="34" charset="0"/>
+                        <a:cs typeface="Times New Roman" panose="02020603050405020304" pitchFamily="18" charset="0"/>
+                      </a:endParaRPr>
+                    </a:p>
+                  </a:txBody>
+                  <a:tcPr marL="68580" marR="68580" marT="0" marB="0"/>
+                </a:tc>
+                <a:tc>
+                  <a:txBody>
+                    <a:bodyPr/>
+                    <a:lstStyle/>
+                    <a:p>
+                      <a:pPr marL="0" marR="0">
+                        <a:lnSpc>
+                          <a:spcPct val="107000"/>
+                        </a:lnSpc>
+                        <a:spcAft>
+                          <a:spcPts val="800"/>
+                        </a:spcAft>
+                        <a:buNone/>
+                      </a:pPr>
+                      <a:r>
+                        <a:rPr lang="en-US" sz="1100">
+                          <a:effectLst/>
+                        </a:rPr>
+                        <a:t> </a:t>
+                      </a:r>
+                      <a:endParaRPr lang="en-US" sz="1100">
+                        <a:effectLst/>
+                        <a:latin typeface="Calibri" panose="020F0502020204030204" pitchFamily="34" charset="0"/>
+                        <a:ea typeface="Calibri" panose="020F0502020204030204" pitchFamily="34" charset="0"/>
+                        <a:cs typeface="Times New Roman" panose="02020603050405020304" pitchFamily="18" charset="0"/>
+                      </a:endParaRPr>
+                    </a:p>
+                  </a:txBody>
+                  <a:tcPr marL="68580" marR="68580" marT="0" marB="0"/>
+                </a:tc>
+                <a:tc>
+                  <a:txBody>
+                    <a:bodyPr/>
+                    <a:lstStyle/>
+                    <a:p>
+                      <a:pPr marL="0" marR="0">
+                        <a:lnSpc>
+                          <a:spcPct val="107000"/>
+                        </a:lnSpc>
+                        <a:spcAft>
+                          <a:spcPts val="800"/>
+                        </a:spcAft>
+                        <a:buNone/>
+                      </a:pPr>
+                      <a:r>
+                        <a:rPr lang="en-US" sz="1100">
+                          <a:effectLst/>
+                        </a:rPr>
+                        <a:t>Final Exam Review / Make Up</a:t>
+                      </a:r>
+                      <a:endParaRPr lang="en-US" sz="1100">
+                        <a:effectLst/>
+                        <a:latin typeface="Calibri" panose="020F0502020204030204" pitchFamily="34" charset="0"/>
+                        <a:ea typeface="Calibri" panose="020F0502020204030204" pitchFamily="34" charset="0"/>
+                        <a:cs typeface="Times New Roman" panose="02020603050405020304" pitchFamily="18" charset="0"/>
+                      </a:endParaRPr>
+                    </a:p>
+                  </a:txBody>
+                  <a:tcPr marL="68580" marR="68580" marT="0" marB="0"/>
+                </a:tc>
+                <a:tc>
+                  <a:txBody>
+                    <a:bodyPr/>
+                    <a:lstStyle/>
+                    <a:p>
+                      <a:pPr marL="0" marR="0" algn="r">
+                        <a:lnSpc>
+                          <a:spcPct val="107000"/>
+                        </a:lnSpc>
+                        <a:spcAft>
+                          <a:spcPts val="800"/>
+                        </a:spcAft>
+                        <a:buNone/>
+                      </a:pPr>
+                      <a:r>
+                        <a:rPr lang="en-US" sz="1100">
+                          <a:effectLst/>
+                        </a:rPr>
+                        <a:t>13</a:t>
+                      </a:r>
+                      <a:endParaRPr lang="en-US" sz="1100">
+                        <a:effectLst/>
+                        <a:latin typeface="Calibri" panose="020F0502020204030204" pitchFamily="34" charset="0"/>
+                        <a:ea typeface="Calibri" panose="020F0502020204030204" pitchFamily="34" charset="0"/>
+                        <a:cs typeface="Times New Roman" panose="02020603050405020304" pitchFamily="18" charset="0"/>
+                      </a:endParaRPr>
+                    </a:p>
+                  </a:txBody>
+                  <a:tcPr marL="68580" marR="68580" marT="0" marB="0"/>
+                </a:tc>
+                <a:tc>
+                  <a:txBody>
+                    <a:bodyPr/>
+                    <a:lstStyle/>
+                    <a:p>
+                      <a:pPr marL="0" marR="0">
+                        <a:lnSpc>
+                          <a:spcPct val="107000"/>
+                        </a:lnSpc>
+                        <a:spcAft>
+                          <a:spcPts val="800"/>
+                        </a:spcAft>
+                        <a:buNone/>
+                      </a:pPr>
+                      <a:r>
+                        <a:rPr lang="en-US" sz="1100">
+                          <a:effectLst/>
+                        </a:rPr>
+                        <a:t>Clustering and K-means [Modified]</a:t>
+                      </a:r>
+                      <a:endParaRPr lang="en-US" sz="1100">
+                        <a:effectLst/>
+                        <a:latin typeface="Calibri" panose="020F0502020204030204" pitchFamily="34" charset="0"/>
+                        <a:ea typeface="Calibri" panose="020F0502020204030204" pitchFamily="34" charset="0"/>
+                        <a:cs typeface="Times New Roman" panose="02020603050405020304" pitchFamily="18" charset="0"/>
+                      </a:endParaRPr>
+                    </a:p>
+                  </a:txBody>
+                  <a:tcPr marL="68580" marR="68580" marT="0" marB="0"/>
+                </a:tc>
+                <a:extLst>
+                  <a:ext uri="{0D108BD9-81ED-4DB2-BD59-A6C34878D82A}">
+                    <a16:rowId xmlns:a16="http://schemas.microsoft.com/office/drawing/2014/main" val="2274709475"/>
+                  </a:ext>
+                </a:extLst>
+              </a:tr>
+              <a:tr h="219227">
+                <a:tc>
+                  <a:txBody>
+                    <a:bodyPr/>
+                    <a:lstStyle/>
+                    <a:p>
+                      <a:pPr marL="0" marR="0" algn="r">
+                        <a:lnSpc>
+                          <a:spcPct val="107000"/>
+                        </a:lnSpc>
+                        <a:spcAft>
+                          <a:spcPts val="800"/>
+                        </a:spcAft>
+                        <a:buNone/>
+                      </a:pPr>
+                      <a:r>
+                        <a:rPr lang="en-US" sz="1100">
+                          <a:effectLst/>
+                        </a:rPr>
+                        <a:t>12/9/2025</a:t>
+                      </a:r>
+                      <a:endParaRPr lang="en-US" sz="1100">
+                        <a:effectLst/>
+                        <a:latin typeface="Calibri" panose="020F0502020204030204" pitchFamily="34" charset="0"/>
+                        <a:ea typeface="Calibri" panose="020F0502020204030204" pitchFamily="34" charset="0"/>
+                        <a:cs typeface="Times New Roman" panose="02020603050405020304" pitchFamily="18" charset="0"/>
+                      </a:endParaRPr>
+                    </a:p>
+                  </a:txBody>
+                  <a:tcPr marL="68580" marR="68580" marT="0" marB="0"/>
+                </a:tc>
+                <a:tc>
+                  <a:txBody>
+                    <a:bodyPr/>
+                    <a:lstStyle/>
+                    <a:p>
+                      <a:pPr marL="0" marR="0">
+                        <a:lnSpc>
+                          <a:spcPct val="107000"/>
+                        </a:lnSpc>
+                        <a:spcAft>
+                          <a:spcPts val="800"/>
+                        </a:spcAft>
+                        <a:buNone/>
+                      </a:pPr>
+                      <a:r>
+                        <a:rPr lang="en-US" sz="1100">
+                          <a:effectLst/>
+                        </a:rPr>
+                        <a:t> </a:t>
+                      </a:r>
+                      <a:endParaRPr lang="en-US" sz="1100">
+                        <a:effectLst/>
+                        <a:latin typeface="Calibri" panose="020F0502020204030204" pitchFamily="34" charset="0"/>
+                        <a:ea typeface="Calibri" panose="020F0502020204030204" pitchFamily="34" charset="0"/>
+                        <a:cs typeface="Times New Roman" panose="02020603050405020304" pitchFamily="18" charset="0"/>
+                      </a:endParaRPr>
+                    </a:p>
+                  </a:txBody>
+                  <a:tcPr marL="68580" marR="68580" marT="0" marB="0"/>
+                </a:tc>
+                <a:tc>
+                  <a:txBody>
+                    <a:bodyPr/>
+                    <a:lstStyle/>
+                    <a:p>
+                      <a:pPr marL="0" marR="0">
+                        <a:lnSpc>
+                          <a:spcPct val="107000"/>
+                        </a:lnSpc>
+                        <a:spcAft>
+                          <a:spcPts val="800"/>
+                        </a:spcAft>
+                        <a:buNone/>
+                      </a:pPr>
+                      <a:r>
+                        <a:rPr lang="en-US" sz="1100">
+                          <a:effectLst/>
+                        </a:rPr>
+                        <a:t>Final Exam</a:t>
+                      </a:r>
+                      <a:endParaRPr lang="en-US" sz="1100">
+                        <a:effectLst/>
+                        <a:latin typeface="Calibri" panose="020F0502020204030204" pitchFamily="34" charset="0"/>
+                        <a:ea typeface="Calibri" panose="020F0502020204030204" pitchFamily="34" charset="0"/>
+                        <a:cs typeface="Times New Roman" panose="02020603050405020304" pitchFamily="18" charset="0"/>
+                      </a:endParaRPr>
+                    </a:p>
+                  </a:txBody>
+                  <a:tcPr marL="68580" marR="68580" marT="0" marB="0"/>
+                </a:tc>
+                <a:tc>
+                  <a:txBody>
+                    <a:bodyPr/>
+                    <a:lstStyle/>
+                    <a:p>
+                      <a:pPr marL="0" marR="0">
+                        <a:lnSpc>
+                          <a:spcPct val="107000"/>
+                        </a:lnSpc>
+                        <a:spcAft>
+                          <a:spcPts val="800"/>
+                        </a:spcAft>
+                        <a:buNone/>
+                      </a:pPr>
+                      <a:r>
+                        <a:rPr lang="en-US" sz="1100">
+                          <a:effectLst/>
+                        </a:rPr>
+                        <a:t> </a:t>
+                      </a:r>
+                      <a:endParaRPr lang="en-US" sz="1100">
+                        <a:effectLst/>
+                        <a:latin typeface="Calibri" panose="020F0502020204030204" pitchFamily="34" charset="0"/>
+                        <a:ea typeface="Calibri" panose="020F0502020204030204" pitchFamily="34" charset="0"/>
+                        <a:cs typeface="Times New Roman" panose="02020603050405020304" pitchFamily="18" charset="0"/>
+                      </a:endParaRPr>
+                    </a:p>
+                  </a:txBody>
+                  <a:tcPr marL="68580" marR="68580" marT="0" marB="0"/>
+                </a:tc>
+                <a:tc>
+                  <a:txBody>
+                    <a:bodyPr/>
+                    <a:lstStyle/>
+                    <a:p>
+                      <a:pPr marL="0" marR="0">
+                        <a:lnSpc>
+                          <a:spcPct val="107000"/>
+                        </a:lnSpc>
+                        <a:spcAft>
+                          <a:spcPts val="800"/>
+                        </a:spcAft>
+                        <a:buNone/>
+                      </a:pPr>
+                      <a:r>
+                        <a:rPr lang="en-US" sz="1100" dirty="0">
+                          <a:effectLst/>
+                        </a:rPr>
+                        <a:t>Final Exam</a:t>
+                      </a:r>
+                      <a:endParaRPr lang="en-US" sz="1100" dirty="0">
+                        <a:effectLst/>
+                        <a:latin typeface="Calibri" panose="020F0502020204030204" pitchFamily="34" charset="0"/>
+                        <a:ea typeface="Calibri" panose="020F0502020204030204" pitchFamily="34" charset="0"/>
+                        <a:cs typeface="Times New Roman" panose="02020603050405020304" pitchFamily="18" charset="0"/>
+                      </a:endParaRPr>
+                    </a:p>
+                  </a:txBody>
+                  <a:tcPr marL="68580" marR="68580" marT="0" marB="0"/>
+                </a:tc>
+                <a:extLst>
+                  <a:ext uri="{0D108BD9-81ED-4DB2-BD59-A6C34878D82A}">
+                    <a16:rowId xmlns:a16="http://schemas.microsoft.com/office/drawing/2014/main" val="3336184933"/>
+                  </a:ext>
+                </a:extLst>
+              </a:tr>
+            </a:tbl>
+          </a:graphicData>
+        </a:graphic>
+      </p:graphicFrame>
+      <p:sp>
+        <p:nvSpPr>
+          <p:cNvPr id="4" name="Slide Number Placeholder 3">
+            <a:extLst>
+              <a:ext uri="{FF2B5EF4-FFF2-40B4-BE49-F238E27FC236}">
+                <a16:creationId xmlns:a16="http://schemas.microsoft.com/office/drawing/2014/main" id="{418C5A9E-66D5-C1C1-B362-4E1B69F13B67}"/>
+              </a:ext>
+            </a:extLst>
+          </p:cNvPr>
           <p:cNvSpPr>
             <a:spLocks noGrp="1"/>
           </p:cNvSpPr>
@@ -4429,7 +7045,7 @@
     </p:spTree>
     <p:extLst>
       <p:ext uri="{BB962C8B-B14F-4D97-AF65-F5344CB8AC3E}">
-        <p14:creationId xmlns:p14="http://schemas.microsoft.com/office/powerpoint/2010/main" val="1044182445"/>
+        <p14:creationId xmlns:p14="http://schemas.microsoft.com/office/powerpoint/2010/main" val="2770871083"/>
       </p:ext>
     </p:extLst>
   </p:cSld>
@@ -4531,7 +7147,7 @@
             </a:r>
             <a:r>
               <a:rPr lang="en-US" dirty="0"/>
-              <a:t> of 2 preferred</a:t>
+              <a:t> of 2 necessary</a:t>
             </a:r>
           </a:p>
           <a:p>
@@ -4551,28 +7167,7 @@
             <a:pPr lvl="1"/>
             <a:r>
               <a:rPr lang="en-US" dirty="0"/>
-              <a:t>UCI ML repository</a:t>
-            </a:r>
-          </a:p>
-          <a:p>
-            <a:pPr lvl="1"/>
-            <a:r>
-              <a:rPr lang="en-US" dirty="0"/>
-              <a:t>Google </a:t>
-            </a:r>
-            <a:r>
-              <a:rPr lang="en-US" dirty="0" err="1"/>
-              <a:t>BigQuery</a:t>
-            </a:r>
-            <a:r>
-              <a:rPr lang="en-US" dirty="0"/>
-              <a:t> data </a:t>
-            </a:r>
-          </a:p>
-          <a:p>
-            <a:r>
-              <a:rPr lang="en-US" dirty="0"/>
-              <a:t>Write code</a:t>
+              <a:t>write code</a:t>
             </a:r>
           </a:p>
           <a:p>
@@ -5666,8 +8261,16 @@
           <a:lstStyle/>
           <a:p>
             <a:r>
-              <a:rPr lang="en-US" dirty="0"/>
-              <a:t>Professor: Sundeep Rangan, </a:t>
+              <a:rPr lang="en-US" dirty="0">
+                <a:solidFill>
+                  <a:schemeClr val="accent1"/>
+                </a:solidFill>
+              </a:rPr>
+              <a:t>Professor</a:t>
+            </a:r>
+            <a:r>
+              <a:rPr lang="en-US" dirty="0"/>
+              <a:t>: Sundeep Rangan, </a:t>
             </a:r>
             <a:r>
               <a:rPr lang="en-US" dirty="0">
@@ -5697,19 +8300,69 @@
           </a:p>
           <a:p>
             <a:pPr lvl="1"/>
-            <a:endParaRPr lang="en-US" dirty="0"/>
-          </a:p>
-          <a:p>
+            <a:r>
+              <a:rPr lang="en-US" dirty="0"/>
+              <a:t>Office hours:  Wednesdays 16:00 to 17:00 (in my office or on zoom)</a:t>
+            </a:r>
+          </a:p>
+          <a:p>
+            <a:r>
+              <a:rPr lang="en-US" dirty="0">
+                <a:solidFill>
+                  <a:schemeClr val="accent1"/>
+                </a:solidFill>
+              </a:rPr>
+              <a:t>Lecture</a:t>
+            </a:r>
+            <a:r>
+              <a:rPr lang="en-US" dirty="0"/>
+              <a:t>:  Tuesdays 11:00-13:30, 370 Jay St, Room 202 </a:t>
+            </a:r>
+          </a:p>
+          <a:p>
+            <a:pPr lvl="1"/>
+            <a:r>
+              <a:rPr lang="en-US" dirty="0"/>
+              <a:t>All lectures will be on zoom</a:t>
+            </a:r>
+          </a:p>
+          <a:p>
+            <a:pPr lvl="1"/>
+            <a:r>
+              <a:rPr lang="en-US" dirty="0"/>
+              <a:t>Attendance (in person or online) is OK.  Attendance is not mandatory</a:t>
+            </a:r>
+          </a:p>
+          <a:p>
+            <a:pPr lvl="1"/>
+            <a:r>
+              <a:rPr lang="en-US" dirty="0"/>
+              <a:t>Bring your laptop.  We will do in class exercises</a:t>
+            </a:r>
+          </a:p>
+          <a:p>
+            <a:r>
+              <a:rPr lang="de-DE" dirty="0">
+                <a:solidFill>
+                  <a:schemeClr val="accent1"/>
+                </a:solidFill>
+              </a:rPr>
+              <a:t>Course Graders</a:t>
+            </a:r>
             <a:r>
               <a:rPr lang="de-DE" dirty="0"/>
-              <a:t>Course Assistant:  </a:t>
+              <a:t>:  </a:t>
             </a:r>
           </a:p>
           <a:p>
             <a:pPr lvl="1"/>
             <a:r>
-              <a:rPr lang="en-US" dirty="0"/>
-              <a:t>TBD</a:t>
+              <a:rPr lang="en-US" dirty="0" err="1"/>
+              <a:t>Tejdeep</a:t>
+            </a:r>
+            <a:r>
+              <a:rPr lang="en-US" dirty="0"/>
+              <a:t> Chippa, Jay Doshi, Roshan Nayak, Akshat Singh, Sheetal Prasad, Raunak Choudhary</a:t>
             </a:r>
             <a:endParaRPr lang="de-DE" dirty="0"/>
           </a:p>
@@ -5722,13 +8375,6 @@
           </a:p>
           <a:p>
             <a:endParaRPr lang="de-DE" dirty="0"/>
-          </a:p>
-          <a:p>
-            <a:r>
-              <a:rPr lang="de-DE" dirty="0"/>
-              <a:t>There will be several other graders as well</a:t>
-            </a:r>
-            <a:endParaRPr lang="en-US" dirty="0"/>
           </a:p>
         </p:txBody>
       </p:sp>
@@ -6175,7 +8821,7 @@
         <p:spPr/>
         <p:txBody>
           <a:bodyPr>
-            <a:normAutofit fontScale="92500" lnSpcReduction="20000"/>
+            <a:normAutofit/>
           </a:bodyPr>
           <a:lstStyle/>
           <a:p>
@@ -6255,47 +8901,34 @@
           </a:p>
           <a:p>
             <a:r>
+              <a:rPr lang="en-US" dirty="0"/>
+              <a:t> </a:t>
+            </a:r>
+            <a:r>
               <a:rPr lang="en-US" dirty="0" err="1"/>
-              <a:t>Raschka</a:t>
-            </a:r>
-            <a:r>
-              <a:rPr lang="en-US" dirty="0"/>
-              <a:t>, “Python Machine Learning”, 2015.</a:t>
+              <a:t>Tivandar</a:t>
+            </a:r>
+            <a:r>
+              <a:rPr lang="en-US" dirty="0"/>
+              <a:t> Danka, Mathematics of Machine Learning</a:t>
             </a:r>
           </a:p>
           <a:p>
             <a:pPr lvl="1"/>
             <a:r>
-              <a:rPr lang="en-US" u="sng" dirty="0">
-                <a:hlinkClick r:id="rId4"/>
-              </a:rPr>
-              <a:t>http://file.allitebooks.com/20151017/Python%20Machine%20Learning.pdf</a:t>
-            </a:r>
-            <a:endParaRPr lang="en-US" u="sng" dirty="0"/>
-          </a:p>
-          <a:p>
-            <a:pPr lvl="1"/>
-            <a:r>
-              <a:rPr lang="en-US" dirty="0"/>
-              <a:t>Excellent examples of using Python</a:t>
-            </a:r>
+              <a:rPr lang="en-US" dirty="0"/>
+              <a:t>Nice background of all the mathematics you </a:t>
+            </a:r>
+            <a:r>
+              <a:rPr lang="en-US" dirty="0" err="1"/>
+              <a:t>needd</a:t>
+            </a:r>
+            <a:endParaRPr lang="en-US" dirty="0"/>
           </a:p>
           <a:p>
             <a:r>
               <a:rPr lang="en-US" dirty="0"/>
               <a:t>Bishop, “Pattern Recognition and Machine Learning”  (more advanced)</a:t>
-            </a:r>
-          </a:p>
-          <a:p>
-            <a:r>
-              <a:rPr lang="en-US" dirty="0"/>
-              <a:t>Coursera course:  Generally do not cover probability</a:t>
-            </a:r>
-          </a:p>
-          <a:p>
-            <a:r>
-              <a:rPr lang="en-US" dirty="0"/>
-              <a:t>Undergrad probability </a:t>
             </a:r>
           </a:p>
           <a:p>
@@ -6587,13 +9220,7 @@
       </p:grpSpPr>
       <p:sp>
         <p:nvSpPr>
-          <p:cNvPr id="2" name="Title 1">
-            <a:extLst>
-              <a:ext uri="{FF2B5EF4-FFF2-40B4-BE49-F238E27FC236}">
-                <a16:creationId xmlns:a16="http://schemas.microsoft.com/office/drawing/2014/main" id="{61F32447-AE2C-4D39-A850-A499A78A9303}"/>
-              </a:ext>
-            </a:extLst>
-          </p:cNvPr>
+          <p:cNvPr id="2" name="Title 1"/>
           <p:cNvSpPr>
             <a:spLocks noGrp="1"/>
           </p:cNvSpPr>
@@ -6608,20 +9235,14 @@
           <a:p>
             <a:r>
               <a:rPr lang="en-US" dirty="0"/>
-              <a:t>More Resources</a:t>
+              <a:t>Pre-Requisites </a:t>
             </a:r>
           </a:p>
         </p:txBody>
       </p:sp>
       <p:sp>
         <p:nvSpPr>
-          <p:cNvPr id="3" name="Content Placeholder 2">
-            <a:extLst>
-              <a:ext uri="{FF2B5EF4-FFF2-40B4-BE49-F238E27FC236}">
-                <a16:creationId xmlns:a16="http://schemas.microsoft.com/office/drawing/2014/main" id="{3F3E958F-BBA4-4EC9-B3EF-5142FD3AA066}"/>
-              </a:ext>
-            </a:extLst>
-          </p:cNvPr>
+          <p:cNvPr id="3" name="Content Placeholder 2"/>
           <p:cNvSpPr>
             <a:spLocks noGrp="1"/>
           </p:cNvSpPr>
@@ -6631,110 +9252,89 @@
         </p:nvSpPr>
         <p:spPr/>
         <p:txBody>
-          <a:bodyPr/>
+          <a:bodyPr>
+            <a:normAutofit/>
+          </a:bodyPr>
           <a:lstStyle/>
           <a:p>
             <a:r>
               <a:rPr lang="en-US" dirty="0"/>
-              <a:t>Entertaining and very good deep learning lectures by Siraj </a:t>
-            </a:r>
-            <a:r>
-              <a:rPr lang="en-US" dirty="0" err="1"/>
-              <a:t>Raval</a:t>
-            </a:r>
-            <a:endParaRPr lang="en-US" dirty="0"/>
+              <a:t>Undergrad probability required for both UG and Grad version:</a:t>
+            </a:r>
           </a:p>
           <a:p>
             <a:pPr lvl="1"/>
             <a:r>
-              <a:rPr lang="en-US" dirty="0">
-                <a:hlinkClick r:id="rId2"/>
-              </a:rPr>
-              <a:t>https://www.youtube.com/channel/UCWN3xxRkmTPmbKwht9FuE5A</a:t>
-            </a:r>
-            <a:endParaRPr lang="en-US" dirty="0"/>
-          </a:p>
-          <a:p>
-            <a:r>
-              <a:rPr lang="en-US" dirty="0" err="1"/>
-              <a:t>Universite</a:t>
-            </a:r>
-            <a:r>
-              <a:rPr lang="en-US" dirty="0"/>
-              <a:t> de Paris labs: </a:t>
+              <a:rPr lang="en-US" dirty="0"/>
+              <a:t>Basics of random variables, densities, Gaussian distributions, correlation, expectation, </a:t>
+            </a:r>
+            <a:br>
+              <a:rPr lang="en-US" dirty="0"/>
+            </a:br>
+            <a:r>
+              <a:rPr lang="en-US" dirty="0"/>
+              <a:t>conditional densities, Bayes’ theorem</a:t>
             </a:r>
           </a:p>
           <a:p>
             <a:pPr lvl="1"/>
             <a:r>
-              <a:rPr lang="en-US" dirty="0">
-                <a:hlinkClick r:id="rId3"/>
-              </a:rPr>
-              <a:t>https://github.com/m2dsupsdlclass/lectures-labs</a:t>
-            </a:r>
-            <a:endParaRPr lang="en-US" dirty="0"/>
+              <a:rPr lang="en-US" dirty="0"/>
+              <a:t>Will provide a short review</a:t>
+            </a:r>
           </a:p>
           <a:p>
             <a:pPr lvl="1"/>
             <a:r>
               <a:rPr lang="en-US" dirty="0"/>
-              <a:t>Focus on deep learning</a:t>
+              <a:t>NYU classes:  Data analysis or Intro Probability are sufficient</a:t>
+            </a:r>
+          </a:p>
+          <a:p>
+            <a:r>
+              <a:rPr lang="en-US" dirty="0"/>
+              <a:t>Undergraduate calculus and linear algebra</a:t>
             </a:r>
           </a:p>
           <a:p>
             <a:pPr lvl="1"/>
             <a:r>
               <a:rPr lang="en-US" dirty="0"/>
-              <a:t>Similar format to this class</a:t>
-            </a:r>
-          </a:p>
-          <a:p>
-            <a:r>
-              <a:rPr lang="en-US" dirty="0"/>
-              <a:t>Andrew Ng’s machine learning class:</a:t>
+              <a:t>Vectors, matrices, partial derivatives, gradients.</a:t>
             </a:r>
           </a:p>
           <a:p>
             <a:pPr lvl="1"/>
             <a:r>
-              <a:rPr lang="en-US" dirty="0">
-                <a:hlinkClick r:id="rId4"/>
-              </a:rPr>
-              <a:t>https://www.coursera.org/learn/machine-learning</a:t>
-            </a:r>
-            <a:endParaRPr lang="en-US" dirty="0"/>
+              <a:rPr lang="en-US" dirty="0"/>
+              <a:t>Again, we will provide a brief review</a:t>
+            </a:r>
+          </a:p>
+          <a:p>
+            <a:r>
+              <a:rPr lang="en-US" dirty="0"/>
+              <a:t>No machine learning experience is necessary</a:t>
+            </a:r>
           </a:p>
           <a:p>
             <a:pPr lvl="1"/>
             <a:r>
               <a:rPr lang="en-US" dirty="0"/>
-              <a:t>A little less mathematical than this class</a:t>
-            </a:r>
-          </a:p>
-          <a:p>
-            <a:r>
-              <a:rPr lang="en-US" dirty="0"/>
-              <a:t>Many, many others online…</a:t>
-            </a:r>
-          </a:p>
-          <a:p>
-            <a:endParaRPr lang="en-US" dirty="0"/>
+              <a:t>If you have ML experience, do NOT take this class.  </a:t>
+            </a:r>
           </a:p>
           <a:p>
             <a:pPr lvl="1"/>
-            <a:endParaRPr lang="en-US" dirty="0"/>
+            <a:r>
+              <a:rPr lang="en-US" dirty="0"/>
+              <a:t>Take Graduate probability (Fall) then Advanced machine learning (Spring)</a:t>
+            </a:r>
           </a:p>
         </p:txBody>
       </p:sp>
       <p:sp>
         <p:nvSpPr>
-          <p:cNvPr id="4" name="Slide Number Placeholder 3">
-            <a:extLst>
-              <a:ext uri="{FF2B5EF4-FFF2-40B4-BE49-F238E27FC236}">
-                <a16:creationId xmlns:a16="http://schemas.microsoft.com/office/drawing/2014/main" id="{94935313-2585-4328-BA40-93AB4AFBFCEE}"/>
-              </a:ext>
-            </a:extLst>
-          </p:cNvPr>
+          <p:cNvPr id="4" name="Slide Number Placeholder 3"/>
           <p:cNvSpPr>
             <a:spLocks noGrp="1"/>
           </p:cNvSpPr>
@@ -6755,40 +9355,10 @@
           </a:p>
         </p:txBody>
       </p:sp>
-      <p:pic>
-        <p:nvPicPr>
-          <p:cNvPr id="6" name="Picture 5">
-            <a:extLst>
-              <a:ext uri="{FF2B5EF4-FFF2-40B4-BE49-F238E27FC236}">
-                <a16:creationId xmlns:a16="http://schemas.microsoft.com/office/drawing/2014/main" id="{283816B8-39A5-061B-C986-A7B6C6D19433}"/>
-              </a:ext>
-            </a:extLst>
-          </p:cNvPr>
-          <p:cNvPicPr>
-            <a:picLocks noChangeAspect="1"/>
-          </p:cNvPicPr>
-          <p:nvPr/>
-        </p:nvPicPr>
-        <p:blipFill>
-          <a:blip r:embed="rId5"/>
-          <a:stretch>
-            <a:fillRect/>
-          </a:stretch>
-        </p:blipFill>
-        <p:spPr>
-          <a:xfrm>
-            <a:off x="7919896" y="2264856"/>
-            <a:ext cx="4419827" cy="2067031"/>
-          </a:xfrm>
-          <a:prstGeom prst="rect">
-            <a:avLst/>
-          </a:prstGeom>
-        </p:spPr>
-      </p:pic>
     </p:spTree>
     <p:extLst>
       <p:ext uri="{BB962C8B-B14F-4D97-AF65-F5344CB8AC3E}">
-        <p14:creationId xmlns:p14="http://schemas.microsoft.com/office/powerpoint/2010/main" val="1819952337"/>
+        <p14:creationId xmlns:p14="http://schemas.microsoft.com/office/powerpoint/2010/main" val="1913674990"/>
       </p:ext>
     </p:extLst>
   </p:cSld>
@@ -6832,7 +9402,7 @@
           <a:p>
             <a:r>
               <a:rPr lang="en-US" dirty="0"/>
-              <a:t>Pre-Requisites </a:t>
+              <a:t>Pre-Requisites Programming</a:t>
             </a:r>
           </a:p>
         </p:txBody>
@@ -6856,76 +9426,131 @@
           <a:p>
             <a:r>
               <a:rPr lang="en-US" dirty="0"/>
-              <a:t>Undergrad probability required for both UG and Grad version:</a:t>
+              <a:t>Python</a:t>
             </a:r>
           </a:p>
           <a:p>
             <a:pPr lvl="1"/>
             <a:r>
               <a:rPr lang="en-US" dirty="0"/>
-              <a:t>Basics of random variables, densities, Gaussian distributions, correlation, expectation, </a:t>
+              <a:t>All labs are in python, similar to object-oriented MATLAB, but many more libraries.  </a:t>
+            </a:r>
+          </a:p>
+          <a:p>
+            <a:pPr lvl="1"/>
+            <a:r>
+              <a:rPr lang="en-US" dirty="0"/>
+              <a:t>And free!</a:t>
+            </a:r>
+          </a:p>
+          <a:p>
+            <a:r>
+              <a:rPr lang="en-US" dirty="0"/>
+              <a:t>What you need to know</a:t>
+            </a:r>
+          </a:p>
+          <a:p>
+            <a:pPr lvl="1"/>
+            <a:r>
+              <a:rPr lang="en-US" dirty="0"/>
+              <a:t>You do not need to know python before class.  But we will go over it quickly.</a:t>
+            </a:r>
+          </a:p>
+          <a:p>
+            <a:pPr lvl="1"/>
+            <a:r>
+              <a:rPr lang="en-US" dirty="0"/>
+              <a:t>You should have experience in some programming language (</a:t>
+            </a:r>
+            <a:r>
+              <a:rPr lang="en-US" dirty="0" err="1"/>
+              <a:t>eg</a:t>
+            </a:r>
+            <a:r>
+              <a:rPr lang="en-US" dirty="0"/>
+              <a:t>. MATLAB). </a:t>
+            </a:r>
+          </a:p>
+          <a:p>
+            <a:pPr lvl="1"/>
+            <a:r>
+              <a:rPr lang="en-US" dirty="0"/>
+              <a:t>You should know or being willing to learn object-oriented programming </a:t>
+            </a:r>
+          </a:p>
+          <a:p>
+            <a:r>
+              <a:rPr lang="en-US" dirty="0"/>
+              <a:t>Resources:</a:t>
+            </a:r>
+          </a:p>
+          <a:p>
+            <a:pPr lvl="1"/>
+            <a:r>
+              <a:rPr lang="en-US" dirty="0"/>
+              <a:t>Installing python and </a:t>
+            </a:r>
+            <a:r>
+              <a:rPr lang="en-US" dirty="0" err="1"/>
+              <a:t>ipython</a:t>
+            </a:r>
+            <a:r>
+              <a:rPr lang="en-US" dirty="0"/>
+              <a:t> notebook (make sure you install Version 3.12)</a:t>
             </a:r>
             <a:br>
               <a:rPr lang="en-US" dirty="0"/>
             </a:br>
             <a:r>
-              <a:rPr lang="en-US" dirty="0"/>
-              <a:t>conditional densities, Bayes’ theorem</a:t>
+              <a:rPr lang="en-US" u="sng" dirty="0">
+                <a:hlinkClick r:id="rId2"/>
+              </a:rPr>
+              <a:t>http://jupyter-notebook-beginner-guide.readthedocs.io/en/latest/index.html</a:t>
+            </a:r>
+            <a:r>
+              <a:rPr lang="en-US" dirty="0"/>
+              <a:t> </a:t>
             </a:r>
           </a:p>
           <a:p>
             <a:pPr lvl="1"/>
             <a:r>
-              <a:rPr lang="en-US" dirty="0"/>
-              <a:t>Will provide a short review</a:t>
-            </a:r>
+              <a:rPr lang="es-419" dirty="0"/>
+              <a:t>Python tutorial:   </a:t>
+            </a:r>
+            <a:r>
+              <a:rPr lang="es-419" u="sng" dirty="0">
+                <a:hlinkClick r:id="rId3"/>
+              </a:rPr>
+              <a:t>https://docs.python.org/3/tutorial/</a:t>
+            </a:r>
+            <a:r>
+              <a:rPr lang="es-419" dirty="0"/>
+              <a:t> </a:t>
+            </a:r>
+            <a:endParaRPr lang="en-US" dirty="0"/>
           </a:p>
           <a:p>
             <a:pPr lvl="1"/>
             <a:r>
-              <a:rPr lang="en-US" dirty="0"/>
-              <a:t>NYU classes:  Data analysis or Intro Probability are sufficient</a:t>
-            </a:r>
-          </a:p>
-          <a:p>
-            <a:r>
-              <a:rPr lang="en-US" dirty="0"/>
-              <a:t>Undergraduate calculus and linear algebra</a:t>
-            </a:r>
+              <a:rPr lang="en-US" dirty="0" err="1"/>
+              <a:t>Numpy</a:t>
+            </a:r>
+            <a:r>
+              <a:rPr lang="en-US" dirty="0"/>
+              <a:t>:  </a:t>
+            </a:r>
+            <a:r>
+              <a:rPr lang="en-US" dirty="0">
+                <a:hlinkClick r:id="rId4"/>
+              </a:rPr>
+              <a:t>http://cs231n.github.io/python-numpy-tutorial/</a:t>
+            </a:r>
+            <a:endParaRPr lang="en-US" dirty="0"/>
           </a:p>
           <a:p>
             <a:pPr lvl="1"/>
-            <a:r>
-              <a:rPr lang="en-US" dirty="0"/>
-              <a:t>Vectors, matrices, partial derivatives, gradients.</a:t>
-            </a:r>
-          </a:p>
-          <a:p>
-            <a:pPr lvl="1"/>
-            <a:r>
-              <a:rPr lang="en-US" dirty="0"/>
-              <a:t>Again, we will provide a brief review</a:t>
-            </a:r>
-          </a:p>
-          <a:p>
-            <a:r>
-              <a:rPr lang="en-US" dirty="0"/>
-              <a:t>No machine learning experience is necessary</a:t>
-            </a:r>
-          </a:p>
-          <a:p>
-            <a:pPr lvl="1"/>
-            <a:r>
-              <a:rPr lang="en-US" dirty="0"/>
-              <a:t>If you have ML experience, do NOT take this class.  </a:t>
-            </a:r>
-          </a:p>
-          <a:p>
-            <a:pPr lvl="1"/>
-            <a:r>
-              <a:rPr lang="en-US" dirty="0"/>
-              <a:t>Take Graduate probability (Fall) then Advanced machine learning (Spring)</a:t>
-            </a:r>
+            <a:endParaRPr lang="en-US" dirty="0"/>
           </a:p>
         </p:txBody>
       </p:sp>
@@ -6955,7 +9580,7 @@
     </p:spTree>
     <p:extLst>
       <p:ext uri="{BB962C8B-B14F-4D97-AF65-F5344CB8AC3E}">
-        <p14:creationId xmlns:p14="http://schemas.microsoft.com/office/powerpoint/2010/main" val="1913674990"/>
+        <p14:creationId xmlns:p14="http://schemas.microsoft.com/office/powerpoint/2010/main" val="1840468307"/>
       </p:ext>
     </p:extLst>
   </p:cSld>
@@ -6999,7 +9624,7 @@
           <a:p>
             <a:r>
               <a:rPr lang="en-US" dirty="0"/>
-              <a:t>Pre-Requisites Programming</a:t>
+              <a:t>Grading:  Undergraduate</a:t>
             </a:r>
           </a:p>
         </p:txBody>
@@ -7016,138 +9641,88 @@
         </p:nvSpPr>
         <p:spPr/>
         <p:txBody>
-          <a:bodyPr>
-            <a:normAutofit/>
-          </a:bodyPr>
+          <a:bodyPr/>
           <a:lstStyle/>
           <a:p>
             <a:r>
               <a:rPr lang="en-US" dirty="0"/>
-              <a:t>Python</a:t>
+              <a:t>Midterm 1:  25%, Midterm 2: 25%, Labs, HW: 25%, Final project: 25%</a:t>
+            </a:r>
+          </a:p>
+          <a:p>
+            <a:r>
+              <a:rPr lang="en-US" dirty="0"/>
+              <a:t>Labs:  Simple python exercises</a:t>
             </a:r>
           </a:p>
           <a:p>
             <a:pPr lvl="1"/>
             <a:r>
               <a:rPr lang="en-US" dirty="0"/>
-              <a:t>All labs are in python, similar to object-oriented MATLAB, but many more libraries.  </a:t>
+              <a:t>Given as </a:t>
+            </a:r>
+            <a:r>
+              <a:rPr lang="en-US" dirty="0" err="1"/>
+              <a:t>jupyter</a:t>
+            </a:r>
+            <a:r>
+              <a:rPr lang="en-US" dirty="0"/>
+              <a:t> notebook that you complete.</a:t>
+            </a:r>
+          </a:p>
+          <a:p>
+            <a:r>
+              <a:rPr lang="en-US" dirty="0"/>
+              <a:t>Midterms</a:t>
             </a:r>
           </a:p>
           <a:p>
             <a:pPr lvl="1"/>
             <a:r>
               <a:rPr lang="en-US" dirty="0"/>
-              <a:t>And free!</a:t>
-            </a:r>
-          </a:p>
-          <a:p>
-            <a:r>
-              <a:rPr lang="en-US" dirty="0"/>
-              <a:t>What you need to know</a:t>
+              <a:t>Each over approx. 3-4 weeks of material</a:t>
             </a:r>
           </a:p>
           <a:p>
             <a:pPr lvl="1"/>
             <a:r>
               <a:rPr lang="en-US" dirty="0"/>
-              <a:t>You do not need to know python before class.  But we will go over it quickly.</a:t>
+              <a:t>Closed book with cheat sheet.  </a:t>
             </a:r>
           </a:p>
           <a:p>
             <a:pPr lvl="1"/>
             <a:r>
               <a:rPr lang="en-US" dirty="0"/>
-              <a:t>You should have experience in some programming language (</a:t>
-            </a:r>
-            <a:r>
-              <a:rPr lang="en-US" dirty="0" err="1"/>
-              <a:t>eg</a:t>
-            </a:r>
-            <a:r>
-              <a:rPr lang="en-US" dirty="0"/>
-              <a:t>. MATLAB). </a:t>
+              <a:t>Follows homework and quiz problems + some very basic python questions</a:t>
+            </a:r>
+          </a:p>
+          <a:p>
+            <a:r>
+              <a:rPr lang="en-US" dirty="0"/>
+              <a:t>Final project:  </a:t>
             </a:r>
           </a:p>
           <a:p>
             <a:pPr lvl="1"/>
             <a:r>
               <a:rPr lang="en-US" dirty="0"/>
-              <a:t>You should know or being willing to learn object-oriented programming </a:t>
-            </a:r>
-          </a:p>
-          <a:p>
-            <a:r>
-              <a:rPr lang="en-US" dirty="0"/>
-              <a:t>Resources:</a:t>
+              <a:t>Use machine learning in some interesting way.</a:t>
             </a:r>
           </a:p>
           <a:p>
             <a:pPr lvl="1"/>
             <a:r>
               <a:rPr lang="en-US" dirty="0"/>
-              <a:t>Installing python and </a:t>
-            </a:r>
-            <a:r>
-              <a:rPr lang="en-US" dirty="0" err="1"/>
-              <a:t>ipython</a:t>
-            </a:r>
-            <a:r>
-              <a:rPr lang="en-US" dirty="0"/>
-              <a:t> notebook (make sure you install Version 3.12)</a:t>
-            </a:r>
-            <a:br>
-              <a:rPr lang="en-US" dirty="0"/>
-            </a:br>
-            <a:r>
-              <a:rPr lang="en-US" u="sng" dirty="0">
-                <a:hlinkClick r:id="rId2"/>
-              </a:rPr>
-              <a:t>http://jupyter-notebook-beginner-guide.readthedocs.io/en/latest/index.html</a:t>
-            </a:r>
-            <a:r>
-              <a:rPr lang="en-US" dirty="0"/>
-              <a:t> </a:t>
+              <a:t>Must use data and python analysis.</a:t>
             </a:r>
           </a:p>
           <a:p>
             <a:pPr lvl="1"/>
             <a:r>
-              <a:rPr lang="es-419" dirty="0"/>
-              <a:t>Python tutorial:   </a:t>
-            </a:r>
-            <a:r>
-              <a:rPr lang="es-419" u="sng" dirty="0">
-                <a:hlinkClick r:id="rId3"/>
-              </a:rPr>
-              <a:t>https://docs.python.org/3/tutorial/</a:t>
-            </a:r>
-            <a:r>
-              <a:rPr lang="es-419" dirty="0"/>
-              <a:t> </a:t>
-            </a:r>
-            <a:endParaRPr lang="en-US" dirty="0"/>
-          </a:p>
-          <a:p>
-            <a:pPr lvl="1"/>
-            <a:r>
-              <a:rPr lang="en-US" dirty="0" err="1"/>
-              <a:t>Numpy</a:t>
-            </a:r>
-            <a:r>
-              <a:rPr lang="en-US" dirty="0"/>
-              <a:t>:  </a:t>
-            </a:r>
-            <a:r>
-              <a:rPr lang="en-US" dirty="0">
-                <a:hlinkClick r:id="rId4"/>
-              </a:rPr>
-              <a:t>http://cs231n.github.io/python-numpy-tutorial/</a:t>
-            </a:r>
-            <a:endParaRPr lang="en-US" dirty="0"/>
-          </a:p>
-          <a:p>
-            <a:pPr lvl="1"/>
-            <a:endParaRPr lang="en-US" dirty="0"/>
+              <a:rPr lang="en-US" dirty="0"/>
+              <a:t>Provide final report.</a:t>
+            </a:r>
           </a:p>
         </p:txBody>
       </p:sp>
@@ -7177,7 +9752,7 @@
     </p:spTree>
     <p:extLst>
       <p:ext uri="{BB962C8B-B14F-4D97-AF65-F5344CB8AC3E}">
-        <p14:creationId xmlns:p14="http://schemas.microsoft.com/office/powerpoint/2010/main" val="1840468307"/>
+        <p14:creationId xmlns:p14="http://schemas.microsoft.com/office/powerpoint/2010/main" val="2111641996"/>
       </p:ext>
     </p:extLst>
   </p:cSld>

</xml_diff>

<commit_message>
Updated the course admin for the TAs and lecture sequence
</commit_message>
<xml_diff>
--- a/lectures/CourseAdmin.pptx
+++ b/lectures/CourseAdmin.pptx
@@ -5,25 +5,26 @@
     <p:sldMasterId id="2147483648" r:id="rId1"/>
   </p:sldMasterIdLst>
   <p:notesMasterIdLst>
-    <p:notesMasterId r:id="rId18"/>
+    <p:notesMasterId r:id="rId19"/>
   </p:notesMasterIdLst>
   <p:sldIdLst>
     <p:sldId id="258" r:id="rId2"/>
     <p:sldId id="271" r:id="rId3"/>
-    <p:sldId id="270" r:id="rId4"/>
-    <p:sldId id="264" r:id="rId5"/>
-    <p:sldId id="259" r:id="rId6"/>
-    <p:sldId id="275" r:id="rId7"/>
-    <p:sldId id="265" r:id="rId8"/>
-    <p:sldId id="260" r:id="rId9"/>
-    <p:sldId id="261" r:id="rId10"/>
-    <p:sldId id="266" r:id="rId11"/>
-    <p:sldId id="276" r:id="rId12"/>
-    <p:sldId id="263" r:id="rId13"/>
-    <p:sldId id="272" r:id="rId14"/>
-    <p:sldId id="269" r:id="rId15"/>
-    <p:sldId id="274" r:id="rId16"/>
-    <p:sldId id="268" r:id="rId17"/>
+    <p:sldId id="277" r:id="rId4"/>
+    <p:sldId id="270" r:id="rId5"/>
+    <p:sldId id="264" r:id="rId6"/>
+    <p:sldId id="259" r:id="rId7"/>
+    <p:sldId id="275" r:id="rId8"/>
+    <p:sldId id="265" r:id="rId9"/>
+    <p:sldId id="260" r:id="rId10"/>
+    <p:sldId id="261" r:id="rId11"/>
+    <p:sldId id="266" r:id="rId12"/>
+    <p:sldId id="276" r:id="rId13"/>
+    <p:sldId id="263" r:id="rId14"/>
+    <p:sldId id="272" r:id="rId15"/>
+    <p:sldId id="269" r:id="rId16"/>
+    <p:sldId id="274" r:id="rId17"/>
+    <p:sldId id="268" r:id="rId18"/>
   </p:sldIdLst>
   <p:sldSz cx="12192000" cy="6858000"/>
   <p:notesSz cx="7315200" cy="9601200"/>
@@ -223,7 +224,7 @@
           <a:p>
             <a:fld id="{B7D6DDD3-D7E9-488B-B626-1E8285E424D8}" type="datetimeFigureOut">
               <a:rPr lang="en-US" smtClean="0"/>
-              <a:t>8/26/2025</a:t>
+              <a:t>9/8/2025</a:t>
             </a:fld>
             <a:endParaRPr lang="en-US"/>
           </a:p>
@@ -4120,6 +4121,178 @@
           <a:p>
             <a:r>
               <a:rPr lang="en-US" dirty="0"/>
+              <a:t>Grading:  Undergraduate</a:t>
+            </a:r>
+          </a:p>
+        </p:txBody>
+      </p:sp>
+      <p:sp>
+        <p:nvSpPr>
+          <p:cNvPr id="3" name="Content Placeholder 2"/>
+          <p:cNvSpPr>
+            <a:spLocks noGrp="1"/>
+          </p:cNvSpPr>
+          <p:nvPr>
+            <p:ph idx="1"/>
+          </p:nvPr>
+        </p:nvSpPr>
+        <p:spPr/>
+        <p:txBody>
+          <a:bodyPr/>
+          <a:lstStyle/>
+          <a:p>
+            <a:r>
+              <a:rPr lang="en-US" dirty="0"/>
+              <a:t>Midterm 1:  25%, Midterm 2: 25%, Labs, HW: 25%, Final project: 25%</a:t>
+            </a:r>
+          </a:p>
+          <a:p>
+            <a:r>
+              <a:rPr lang="en-US" dirty="0"/>
+              <a:t>Labs:  Simple python exercises</a:t>
+            </a:r>
+          </a:p>
+          <a:p>
+            <a:pPr lvl="1"/>
+            <a:r>
+              <a:rPr lang="en-US" dirty="0"/>
+              <a:t>Given as </a:t>
+            </a:r>
+            <a:r>
+              <a:rPr lang="en-US" dirty="0" err="1"/>
+              <a:t>jupyter</a:t>
+            </a:r>
+            <a:r>
+              <a:rPr lang="en-US" dirty="0"/>
+              <a:t> notebook that you complete.</a:t>
+            </a:r>
+          </a:p>
+          <a:p>
+            <a:r>
+              <a:rPr lang="en-US" dirty="0"/>
+              <a:t>Midterms</a:t>
+            </a:r>
+          </a:p>
+          <a:p>
+            <a:pPr lvl="1"/>
+            <a:r>
+              <a:rPr lang="en-US" dirty="0"/>
+              <a:t>Each over approx. 3-4 weeks of material</a:t>
+            </a:r>
+          </a:p>
+          <a:p>
+            <a:pPr lvl="1"/>
+            <a:r>
+              <a:rPr lang="en-US" dirty="0"/>
+              <a:t>Closed book with cheat sheet.  </a:t>
+            </a:r>
+          </a:p>
+          <a:p>
+            <a:pPr lvl="1"/>
+            <a:r>
+              <a:rPr lang="en-US" dirty="0"/>
+              <a:t>Follows homework and quiz problems + some very basic python questions</a:t>
+            </a:r>
+          </a:p>
+          <a:p>
+            <a:r>
+              <a:rPr lang="en-US" dirty="0"/>
+              <a:t>Final project:  </a:t>
+            </a:r>
+          </a:p>
+          <a:p>
+            <a:pPr lvl="1"/>
+            <a:r>
+              <a:rPr lang="en-US" dirty="0"/>
+              <a:t>Use machine learning in some interesting way.</a:t>
+            </a:r>
+          </a:p>
+          <a:p>
+            <a:pPr lvl="1"/>
+            <a:r>
+              <a:rPr lang="en-US" dirty="0"/>
+              <a:t>Must use data and python analysis.</a:t>
+            </a:r>
+          </a:p>
+          <a:p>
+            <a:pPr lvl="1"/>
+            <a:r>
+              <a:rPr lang="en-US" dirty="0"/>
+              <a:t>Provide final report.</a:t>
+            </a:r>
+          </a:p>
+        </p:txBody>
+      </p:sp>
+      <p:sp>
+        <p:nvSpPr>
+          <p:cNvPr id="4" name="Slide Number Placeholder 3"/>
+          <p:cNvSpPr>
+            <a:spLocks noGrp="1"/>
+          </p:cNvSpPr>
+          <p:nvPr>
+            <p:ph type="sldNum" sz="quarter" idx="12"/>
+          </p:nvPr>
+        </p:nvSpPr>
+        <p:spPr/>
+        <p:txBody>
+          <a:bodyPr/>
+          <a:lstStyle/>
+          <a:p>
+            <a:fld id="{629637A9-119A-49DA-BD12-AAC58B377D80}" type="slidenum">
+              <a:rPr lang="en-US" smtClean="0"/>
+              <a:t>10</a:t>
+            </a:fld>
+            <a:endParaRPr lang="en-US" dirty="0"/>
+          </a:p>
+        </p:txBody>
+      </p:sp>
+    </p:spTree>
+    <p:extLst>
+      <p:ext uri="{BB962C8B-B14F-4D97-AF65-F5344CB8AC3E}">
+        <p14:creationId xmlns:p14="http://schemas.microsoft.com/office/powerpoint/2010/main" val="2111641996"/>
+      </p:ext>
+    </p:extLst>
+  </p:cSld>
+  <p:clrMapOvr>
+    <a:masterClrMapping/>
+  </p:clrMapOvr>
+</p:sld>
+</file>
+
+<file path=ppt/slides/slide11.xml><?xml version="1.0" encoding="utf-8"?>
+<p:sld xmlns:a="http://schemas.openxmlformats.org/drawingml/2006/main" xmlns:r="http://schemas.openxmlformats.org/officeDocument/2006/relationships" xmlns:p="http://schemas.openxmlformats.org/presentationml/2006/main">
+  <p:cSld>
+    <p:spTree>
+      <p:nvGrpSpPr>
+        <p:cNvPr id="1" name=""/>
+        <p:cNvGrpSpPr/>
+        <p:nvPr/>
+      </p:nvGrpSpPr>
+      <p:grpSpPr>
+        <a:xfrm>
+          <a:off x="0" y="0"/>
+          <a:ext cx="0" cy="0"/>
+          <a:chOff x="0" y="0"/>
+          <a:chExt cx="0" cy="0"/>
+        </a:xfrm>
+      </p:grpSpPr>
+      <p:sp>
+        <p:nvSpPr>
+          <p:cNvPr id="2" name="Title 1"/>
+          <p:cNvSpPr>
+            <a:spLocks noGrp="1"/>
+          </p:cNvSpPr>
+          <p:nvPr>
+            <p:ph type="title"/>
+          </p:nvPr>
+        </p:nvSpPr>
+        <p:spPr/>
+        <p:txBody>
+          <a:bodyPr/>
+          <a:lstStyle/>
+          <a:p>
+            <a:r>
+              <a:rPr lang="en-US" dirty="0"/>
               <a:t>Grading:  Graduate</a:t>
             </a:r>
           </a:p>
@@ -4248,7 +4421,7 @@
           <a:p>
             <a:fld id="{629637A9-119A-49DA-BD12-AAC58B377D80}" type="slidenum">
               <a:rPr lang="en-US" smtClean="0"/>
-              <a:t>10</a:t>
+              <a:t>11</a:t>
             </a:fld>
             <a:endParaRPr lang="en-US" dirty="0"/>
           </a:p>
@@ -4267,7 +4440,7 @@
 </p:sld>
 </file>
 
-<file path=ppt/slides/slide11.xml><?xml version="1.0" encoding="utf-8"?>
+<file path=ppt/slides/slide12.xml><?xml version="1.0" encoding="utf-8"?>
 <p:sld xmlns:a="http://schemas.openxmlformats.org/drawingml/2006/main" xmlns:r="http://schemas.openxmlformats.org/officeDocument/2006/relationships" xmlns:p="http://schemas.openxmlformats.org/presentationml/2006/main">
   <p:cSld>
     <p:spTree>
@@ -4328,7 +4501,7 @@
             <p:ph idx="1"/>
             <p:extLst>
               <p:ext uri="{D42A27DB-BD31-4B8C-83A1-F6EECF244321}">
-                <p14:modId xmlns:p14="http://schemas.microsoft.com/office/powerpoint/2010/main" val="3162228220"/>
+                <p14:modId xmlns:p14="http://schemas.microsoft.com/office/powerpoint/2010/main" val="3497473079"/>
               </p:ext>
             </p:extLst>
           </p:nvPr>
@@ -4700,12 +4873,12 @@
                         <a:buNone/>
                       </a:pPr>
                       <a:r>
-                        <a:rPr lang="en-US" sz="1100">
+                        <a:rPr lang="en-US" sz="1100" dirty="0">
                           <a:effectLst/>
                         </a:rPr>
                         <a:t>1, 2</a:t>
                       </a:r>
-                      <a:endParaRPr lang="en-US" sz="1100">
+                      <a:endParaRPr lang="en-US" sz="1100" dirty="0">
                         <a:effectLst/>
                         <a:latin typeface="Calibri" panose="020F0502020204030204" pitchFamily="34" charset="0"/>
                         <a:ea typeface="Calibri" panose="020F0502020204030204" pitchFamily="34" charset="0"/>
@@ -4790,12 +4963,12 @@
                         <a:buNone/>
                       </a:pPr>
                       <a:r>
-                        <a:rPr lang="en-US" sz="1100">
+                        <a:rPr lang="en-US" sz="1100" dirty="0">
                           <a:effectLst/>
                         </a:rPr>
                         <a:t>Course Admin.  What is ML?  Multiple Linear Regression</a:t>
                       </a:r>
-                      <a:endParaRPr lang="en-US" sz="1100">
+                      <a:endParaRPr lang="en-US" sz="1100" dirty="0">
                         <a:effectLst/>
                         <a:latin typeface="Calibri" panose="020F0502020204030204" pitchFamily="34" charset="0"/>
                         <a:ea typeface="Calibri" panose="020F0502020204030204" pitchFamily="34" charset="0"/>
@@ -4917,12 +5090,12 @@
                         <a:buNone/>
                       </a:pPr>
                       <a:r>
-                        <a:rPr lang="en-US" sz="1100">
+                        <a:rPr lang="en-US" sz="1100" dirty="0">
                           <a:effectLst/>
                         </a:rPr>
-                        <a:t>3</a:t>
+                        <a:t>3, 4</a:t>
                       </a:r>
-                      <a:endParaRPr lang="en-US" sz="1100">
+                      <a:endParaRPr lang="en-US" sz="1100" dirty="0">
                         <a:effectLst/>
                         <a:latin typeface="Calibri" panose="020F0502020204030204" pitchFamily="34" charset="0"/>
                         <a:ea typeface="Calibri" panose="020F0502020204030204" pitchFamily="34" charset="0"/>
@@ -4947,12 +5120,12 @@
                         <a:buNone/>
                       </a:pPr>
                       <a:r>
-                        <a:rPr lang="en-US" sz="1100">
+                        <a:rPr lang="en-US" sz="1100" dirty="0">
                           <a:effectLst/>
                         </a:rPr>
-                        <a:t>Model Selection</a:t>
+                        <a:t>Model Selection, Regularization and LASSO</a:t>
                       </a:r>
-                      <a:endParaRPr lang="en-US" sz="1100">
+                      <a:endParaRPr lang="en-US" sz="1100" dirty="0">
                         <a:effectLst/>
                         <a:latin typeface="Calibri" panose="020F0502020204030204" pitchFamily="34" charset="0"/>
                         <a:ea typeface="Calibri" panose="020F0502020204030204" pitchFamily="34" charset="0"/>
@@ -5074,12 +5247,12 @@
                         <a:buNone/>
                       </a:pPr>
                       <a:r>
-                        <a:rPr lang="en-US" sz="1100">
+                        <a:rPr lang="en-US" sz="1100" dirty="0">
                           <a:effectLst/>
                         </a:rPr>
-                        <a:t>4</a:t>
+                        <a:t>5</a:t>
                       </a:r>
-                      <a:endParaRPr lang="en-US" sz="1100">
+                      <a:endParaRPr lang="en-US" sz="1100" dirty="0">
                         <a:effectLst/>
                         <a:latin typeface="Calibri" panose="020F0502020204030204" pitchFamily="34" charset="0"/>
                         <a:ea typeface="Calibri" panose="020F0502020204030204" pitchFamily="34" charset="0"/>
@@ -5104,12 +5277,12 @@
                         <a:buNone/>
                       </a:pPr>
                       <a:r>
-                        <a:rPr lang="en-US" sz="1100">
+                        <a:rPr lang="en-US" sz="1100" dirty="0">
                           <a:effectLst/>
                         </a:rPr>
-                        <a:t>Regularization and LASSO</a:t>
+                        <a:t>Logistic Regression</a:t>
                       </a:r>
-                      <a:endParaRPr lang="en-US" sz="1100">
+                      <a:endParaRPr lang="en-US" sz="1100" dirty="0">
                         <a:effectLst/>
                         <a:latin typeface="Calibri" panose="020F0502020204030204" pitchFamily="34" charset="0"/>
                         <a:ea typeface="Calibri" panose="020F0502020204030204" pitchFamily="34" charset="0"/>
@@ -5234,7 +5407,7 @@
                         <a:rPr lang="en-US" sz="1100">
                           <a:effectLst/>
                         </a:rPr>
-                        <a:t>5</a:t>
+                        <a:t>6</a:t>
                       </a:r>
                       <a:endParaRPr lang="en-US" sz="1100">
                         <a:effectLst/>
@@ -5261,12 +5434,12 @@
                         <a:buNone/>
                       </a:pPr>
                       <a:r>
-                        <a:rPr lang="en-US" sz="1100">
+                        <a:rPr lang="en-US" sz="1100" dirty="0">
                           <a:effectLst/>
                         </a:rPr>
-                        <a:t>Logistic Regression</a:t>
+                        <a:t>Nonlinear Optimization</a:t>
                       </a:r>
-                      <a:endParaRPr lang="en-US" sz="1100">
+                      <a:endParaRPr lang="en-US" sz="1100" dirty="0">
                         <a:effectLst/>
                         <a:latin typeface="Calibri" panose="020F0502020204030204" pitchFamily="34" charset="0"/>
                         <a:ea typeface="Calibri" panose="020F0502020204030204" pitchFamily="34" charset="0"/>
@@ -5388,17 +5561,14 @@
                         <a:buNone/>
                       </a:pPr>
                       <a:r>
-                        <a:rPr lang="en-US" sz="1100">
+                        <a:rPr lang="en-US" sz="1100" dirty="0">
                           <a:effectLst/>
+                          <a:latin typeface="Calibri" panose="020F0502020204030204" pitchFamily="34" charset="0"/>
+                          <a:ea typeface="Calibri" panose="020F0502020204030204" pitchFamily="34" charset="0"/>
+                          <a:cs typeface="Times New Roman" panose="02020603050405020304" pitchFamily="18" charset="0"/>
                         </a:rPr>
-                        <a:t>6</a:t>
+                        <a:t>8</a:t>
                       </a:r>
-                      <a:endParaRPr lang="en-US" sz="1100">
-                        <a:effectLst/>
-                        <a:latin typeface="Calibri" panose="020F0502020204030204" pitchFamily="34" charset="0"/>
-                        <a:ea typeface="Calibri" panose="020F0502020204030204" pitchFamily="34" charset="0"/>
-                        <a:cs typeface="Times New Roman" panose="02020603050405020304" pitchFamily="18" charset="0"/>
-                      </a:endParaRPr>
                     </a:p>
                   </a:txBody>
                   <a:tcPr marL="68580" marR="68580" marT="0" marB="0"/>
@@ -5418,17 +5588,14 @@
                         <a:buNone/>
                       </a:pPr>
                       <a:r>
-                        <a:rPr lang="en-US" sz="1100">
+                        <a:rPr lang="en-US" sz="1100" dirty="0">
                           <a:effectLst/>
+                          <a:latin typeface="Calibri" panose="020F0502020204030204" pitchFamily="34" charset="0"/>
+                          <a:ea typeface="Calibri" panose="020F0502020204030204" pitchFamily="34" charset="0"/>
+                          <a:cs typeface="Times New Roman" panose="02020603050405020304" pitchFamily="18" charset="0"/>
                         </a:rPr>
-                        <a:t>Nonlinear Optimization</a:t>
+                        <a:t>KNN, Kernel methods [New]</a:t>
                       </a:r>
-                      <a:endParaRPr lang="en-US" sz="1100">
-                        <a:effectLst/>
-                        <a:latin typeface="Calibri" panose="020F0502020204030204" pitchFamily="34" charset="0"/>
-                        <a:ea typeface="Calibri" panose="020F0502020204030204" pitchFamily="34" charset="0"/>
-                        <a:cs typeface="Times New Roman" panose="02020603050405020304" pitchFamily="18" charset="0"/>
-                      </a:endParaRPr>
                     </a:p>
                   </a:txBody>
                   <a:tcPr marL="68580" marR="68580" marT="0" marB="0"/>
@@ -5545,12 +5712,12 @@
                         <a:buNone/>
                       </a:pPr>
                       <a:r>
-                        <a:rPr lang="en-US" sz="1100">
+                        <a:rPr lang="en-US" sz="1100" dirty="0">
                           <a:effectLst/>
                         </a:rPr>
-                        <a:t> </a:t>
+                        <a:t>13 </a:t>
                       </a:r>
-                      <a:endParaRPr lang="en-US" sz="1100">
+                      <a:endParaRPr lang="en-US" sz="1100" dirty="0">
                         <a:effectLst/>
                         <a:latin typeface="Calibri" panose="020F0502020204030204" pitchFamily="34" charset="0"/>
                         <a:ea typeface="Calibri" panose="020F0502020204030204" pitchFamily="34" charset="0"/>
@@ -5575,12 +5742,12 @@
                         <a:buNone/>
                       </a:pPr>
                       <a:r>
-                        <a:rPr lang="en-US" sz="1100">
+                        <a:rPr lang="en-US" sz="1100" dirty="0">
                           <a:effectLst/>
                         </a:rPr>
-                        <a:t>Midterm review</a:t>
+                        <a:t>Decision Trees</a:t>
                       </a:r>
-                      <a:endParaRPr lang="en-US" sz="1100">
+                      <a:endParaRPr lang="en-US" sz="1100" dirty="0">
                         <a:effectLst/>
                         <a:latin typeface="Calibri" panose="020F0502020204030204" pitchFamily="34" charset="0"/>
                         <a:ea typeface="Calibri" panose="020F0502020204030204" pitchFamily="34" charset="0"/>
@@ -5889,12 +6056,12 @@
                         <a:buNone/>
                       </a:pPr>
                       <a:r>
-                        <a:rPr lang="en-US" sz="1100">
+                        <a:rPr lang="en-US" sz="1100" dirty="0">
                           <a:effectLst/>
                         </a:rPr>
                         <a:t>Midterm </a:t>
                       </a:r>
-                      <a:endParaRPr lang="en-US" sz="1100">
+                      <a:endParaRPr lang="en-US" sz="1100" dirty="0">
                         <a:effectLst/>
                         <a:latin typeface="Calibri" panose="020F0502020204030204" pitchFamily="34" charset="0"/>
                         <a:ea typeface="Calibri" panose="020F0502020204030204" pitchFamily="34" charset="0"/>
@@ -6360,12 +6527,12 @@
                         <a:buNone/>
                       </a:pPr>
                       <a:r>
-                        <a:rPr lang="en-US" sz="1100">
+                        <a:rPr lang="en-US" sz="1100" dirty="0">
                           <a:effectLst/>
                         </a:rPr>
                         <a:t>PCA</a:t>
                       </a:r>
-                      <a:endParaRPr lang="en-US" sz="1100">
+                      <a:endParaRPr lang="en-US" sz="1100" dirty="0">
                         <a:effectLst/>
                         <a:latin typeface="Calibri" panose="020F0502020204030204" pitchFamily="34" charset="0"/>
                         <a:ea typeface="Calibri" panose="020F0502020204030204" pitchFamily="34" charset="0"/>
@@ -6517,12 +6684,12 @@
                         <a:buNone/>
                       </a:pPr>
                       <a:r>
-                        <a:rPr lang="en-US" sz="1100">
+                        <a:rPr lang="en-US" sz="1100" dirty="0">
                           <a:effectLst/>
                         </a:rPr>
-                        <a:t>Word Embeddings and tokenization</a:t>
+                        <a:t>Word Embeddings and tokenization [New]</a:t>
                       </a:r>
-                      <a:endParaRPr lang="en-US" sz="1100">
+                      <a:endParaRPr lang="en-US" sz="1100" dirty="0">
                         <a:effectLst/>
                         <a:latin typeface="Calibri" panose="020F0502020204030204" pitchFamily="34" charset="0"/>
                         <a:ea typeface="Calibri" panose="020F0502020204030204" pitchFamily="34" charset="0"/>
@@ -6644,12 +6811,12 @@
                         <a:buNone/>
                       </a:pPr>
                       <a:r>
-                        <a:rPr lang="en-US" sz="1100">
+                        <a:rPr lang="en-US" sz="1100" dirty="0">
                           <a:effectLst/>
                         </a:rPr>
                         <a:t>12</a:t>
                       </a:r>
-                      <a:endParaRPr lang="en-US" sz="1100">
+                      <a:endParaRPr lang="en-US" sz="1100" dirty="0">
                         <a:effectLst/>
                         <a:latin typeface="Calibri" panose="020F0502020204030204" pitchFamily="34" charset="0"/>
                         <a:ea typeface="Calibri" panose="020F0502020204030204" pitchFamily="34" charset="0"/>
@@ -6674,12 +6841,12 @@
                         <a:buNone/>
                       </a:pPr>
                       <a:r>
-                        <a:rPr lang="en-US" sz="1100">
+                        <a:rPr lang="en-US" sz="1100" dirty="0">
                           <a:effectLst/>
                         </a:rPr>
-                        <a:t>Attention and LLMs</a:t>
+                        <a:t>Clustering and K-means [Modified]</a:t>
                       </a:r>
-                      <a:endParaRPr lang="en-US" sz="1100">
+                      <a:endParaRPr lang="en-US" sz="1100" dirty="0">
                         <a:effectLst/>
                         <a:latin typeface="Calibri" panose="020F0502020204030204" pitchFamily="34" charset="0"/>
                         <a:ea typeface="Calibri" panose="020F0502020204030204" pitchFamily="34" charset="0"/>
@@ -6771,12 +6938,12 @@
                         <a:buNone/>
                       </a:pPr>
                       <a:r>
-                        <a:rPr lang="en-US" sz="1100">
+                        <a:rPr lang="en-US" sz="1100" dirty="0">
                           <a:effectLst/>
                         </a:rPr>
                         <a:t>Final Exam Review / Make Up</a:t>
                       </a:r>
-                      <a:endParaRPr lang="en-US" sz="1100">
+                      <a:endParaRPr lang="en-US" sz="1100" dirty="0">
                         <a:effectLst/>
                         <a:latin typeface="Calibri" panose="020F0502020204030204" pitchFamily="34" charset="0"/>
                         <a:ea typeface="Calibri" panose="020F0502020204030204" pitchFamily="34" charset="0"/>
@@ -6800,13 +6967,7 @@
                         </a:spcAft>
                         <a:buNone/>
                       </a:pPr>
-                      <a:r>
-                        <a:rPr lang="en-US" sz="1100">
-                          <a:effectLst/>
-                        </a:rPr>
-                        <a:t>13</a:t>
-                      </a:r>
-                      <a:endParaRPr lang="en-US" sz="1100">
+                      <a:endParaRPr lang="en-US" sz="1100" dirty="0">
                         <a:effectLst/>
                         <a:latin typeface="Calibri" panose="020F0502020204030204" pitchFamily="34" charset="0"/>
                         <a:ea typeface="Calibri" panose="020F0502020204030204" pitchFamily="34" charset="0"/>
@@ -6821,20 +6982,28 @@
                     <a:bodyPr/>
                     <a:lstStyle/>
                     <a:p>
-                      <a:pPr marL="0" marR="0">
+                      <a:pPr marL="0" marR="0" lvl="0" indent="0" algn="l" defTabSz="914400" rtl="0" eaLnBrk="1" fontAlgn="auto" latinLnBrk="0" hangingPunct="1">
                         <a:lnSpc>
                           <a:spcPct val="107000"/>
                         </a:lnSpc>
+                        <a:spcBef>
+                          <a:spcPts val="0"/>
+                        </a:spcBef>
                         <a:spcAft>
                           <a:spcPts val="800"/>
                         </a:spcAft>
+                        <a:buClrTx/>
+                        <a:buSzTx/>
+                        <a:buFontTx/>
                         <a:buNone/>
+                        <a:tabLst/>
+                        <a:defRPr/>
                       </a:pPr>
                       <a:r>
                         <a:rPr lang="en-US" sz="1100">
                           <a:effectLst/>
                         </a:rPr>
-                        <a:t>Clustering and K-means [Modified]</a:t>
+                        <a:t>Final Exam Review / Make Up</a:t>
                       </a:r>
                       <a:endParaRPr lang="en-US" sz="1100">
                         <a:effectLst/>
@@ -7036,7 +7205,7 @@
           <a:p>
             <a:fld id="{629637A9-119A-49DA-BD12-AAC58B377D80}" type="slidenum">
               <a:rPr lang="en-US" smtClean="0"/>
-              <a:t>11</a:t>
+              <a:t>12</a:t>
             </a:fld>
             <a:endParaRPr lang="en-US" dirty="0"/>
           </a:p>
@@ -7055,7 +7224,7 @@
 </p:sld>
 </file>
 
-<file path=ppt/slides/slide12.xml><?xml version="1.0" encoding="utf-8"?>
+<file path=ppt/slides/slide13.xml><?xml version="1.0" encoding="utf-8"?>
 <p:sld xmlns:a="http://schemas.openxmlformats.org/drawingml/2006/main" xmlns:r="http://schemas.openxmlformats.org/officeDocument/2006/relationships" xmlns:p="http://schemas.openxmlformats.org/presentationml/2006/main">
   <p:cSld>
     <p:spTree>
@@ -7214,7 +7383,7 @@
           <a:p>
             <a:fld id="{629637A9-119A-49DA-BD12-AAC58B377D80}" type="slidenum">
               <a:rPr lang="en-US" smtClean="0"/>
-              <a:t>12</a:t>
+              <a:t>13</a:t>
             </a:fld>
             <a:endParaRPr lang="en-US" dirty="0"/>
           </a:p>
@@ -7233,7 +7402,7 @@
 </p:sld>
 </file>
 
-<file path=ppt/slides/slide13.xml><?xml version="1.0" encoding="utf-8"?>
+<file path=ppt/slides/slide14.xml><?xml version="1.0" encoding="utf-8"?>
 <p:sld xmlns:a="http://schemas.openxmlformats.org/drawingml/2006/main" xmlns:r="http://schemas.openxmlformats.org/officeDocument/2006/relationships" xmlns:p="http://schemas.openxmlformats.org/presentationml/2006/main">
   <p:cSld>
     <p:spTree>
@@ -7458,7 +7627,7 @@
           <a:p>
             <a:fld id="{629637A9-119A-49DA-BD12-AAC58B377D80}" type="slidenum">
               <a:rPr lang="en-US" smtClean="0"/>
-              <a:t>13</a:t>
+              <a:t>14</a:t>
             </a:fld>
             <a:endParaRPr lang="en-US" dirty="0"/>
           </a:p>
@@ -7477,7 +7646,7 @@
 </p:sld>
 </file>
 
-<file path=ppt/slides/slide14.xml><?xml version="1.0" encoding="utf-8"?>
+<file path=ppt/slides/slide15.xml><?xml version="1.0" encoding="utf-8"?>
 <p:sld xmlns:a="http://schemas.openxmlformats.org/drawingml/2006/main" xmlns:r="http://schemas.openxmlformats.org/officeDocument/2006/relationships" xmlns:p="http://schemas.openxmlformats.org/presentationml/2006/main">
   <p:cSld>
     <p:spTree>
@@ -7623,7 +7792,7 @@
           <a:p>
             <a:fld id="{629637A9-119A-49DA-BD12-AAC58B377D80}" type="slidenum">
               <a:rPr lang="en-US" smtClean="0"/>
-              <a:t>14</a:t>
+              <a:t>15</a:t>
             </a:fld>
             <a:endParaRPr lang="en-US" dirty="0"/>
           </a:p>
@@ -7672,7 +7841,7 @@
 </p:sld>
 </file>
 
-<file path=ppt/slides/slide15.xml><?xml version="1.0" encoding="utf-8"?>
+<file path=ppt/slides/slide16.xml><?xml version="1.0" encoding="utf-8"?>
 <p:sld xmlns:a="http://schemas.openxmlformats.org/drawingml/2006/main" xmlns:r="http://schemas.openxmlformats.org/officeDocument/2006/relationships" xmlns:p="http://schemas.openxmlformats.org/presentationml/2006/main">
   <p:cSld>
     <p:spTree>
@@ -7828,7 +7997,7 @@
           <a:p>
             <a:fld id="{629637A9-119A-49DA-BD12-AAC58B377D80}" type="slidenum">
               <a:rPr lang="en-US" smtClean="0"/>
-              <a:t>15</a:t>
+              <a:t>16</a:t>
             </a:fld>
             <a:endParaRPr lang="en-US" dirty="0"/>
           </a:p>
@@ -7877,7 +8046,7 @@
 </p:sld>
 </file>
 
-<file path=ppt/slides/slide16.xml><?xml version="1.0" encoding="utf-8"?>
+<file path=ppt/slides/slide17.xml><?xml version="1.0" encoding="utf-8"?>
 <p:sld xmlns:a="http://schemas.openxmlformats.org/drawingml/2006/main" xmlns:r="http://schemas.openxmlformats.org/officeDocument/2006/relationships" xmlns:p="http://schemas.openxmlformats.org/presentationml/2006/main">
   <p:cSld>
     <p:spTree>
@@ -8083,7 +8252,7 @@
           <a:p>
             <a:fld id="{629637A9-119A-49DA-BD12-AAC58B377D80}" type="slidenum">
               <a:rPr lang="en-US" smtClean="0"/>
-              <a:t>16</a:t>
+              <a:t>17</a:t>
             </a:fld>
             <a:endParaRPr lang="en-US" dirty="0"/>
           </a:p>
@@ -8357,18 +8526,6 @@
           <a:p>
             <a:pPr lvl="1"/>
             <a:r>
-              <a:rPr lang="en-US" dirty="0" err="1"/>
-              <a:t>Tejdeep</a:t>
-            </a:r>
-            <a:r>
-              <a:rPr lang="en-US" dirty="0"/>
-              <a:t> Chippa, Jay Doshi, Roshan Nayak, Akshat Singh, Sheetal Prasad, Raunak Choudhary</a:t>
-            </a:r>
-            <a:endParaRPr lang="de-DE" dirty="0"/>
-          </a:p>
-          <a:p>
-            <a:pPr lvl="1"/>
-            <a:r>
               <a:rPr lang="de-DE" dirty="0"/>
               <a:t>Ask for all questions regarding homeworks and labs</a:t>
             </a:r>
@@ -8439,6 +8596,888 @@
       </p:grpSpPr>
       <p:sp>
         <p:nvSpPr>
+          <p:cNvPr id="2" name="Title 1">
+            <a:extLst>
+              <a:ext uri="{FF2B5EF4-FFF2-40B4-BE49-F238E27FC236}">
+                <a16:creationId xmlns:a16="http://schemas.microsoft.com/office/drawing/2014/main" id="{B683D0D3-96EB-FDF1-CEEE-CB93179DE3E1}"/>
+              </a:ext>
+            </a:extLst>
+          </p:cNvPr>
+          <p:cNvSpPr>
+            <a:spLocks noGrp="1"/>
+          </p:cNvSpPr>
+          <p:nvPr>
+            <p:ph type="title"/>
+          </p:nvPr>
+        </p:nvSpPr>
+        <p:spPr/>
+        <p:txBody>
+          <a:bodyPr/>
+          <a:lstStyle/>
+          <a:p>
+            <a:r>
+              <a:rPr lang="en-US" dirty="0"/>
+              <a:t>Graders  for Fall 2025</a:t>
+            </a:r>
+          </a:p>
+        </p:txBody>
+      </p:sp>
+      <p:sp>
+        <p:nvSpPr>
+          <p:cNvPr id="3" name="Content Placeholder 2">
+            <a:extLst>
+              <a:ext uri="{FF2B5EF4-FFF2-40B4-BE49-F238E27FC236}">
+                <a16:creationId xmlns:a16="http://schemas.microsoft.com/office/drawing/2014/main" id="{DA09F3DE-7C5E-727A-FE83-0CDA713D2CC1}"/>
+              </a:ext>
+            </a:extLst>
+          </p:cNvPr>
+          <p:cNvSpPr>
+            <a:spLocks noGrp="1"/>
+          </p:cNvSpPr>
+          <p:nvPr>
+            <p:ph idx="1"/>
+          </p:nvPr>
+        </p:nvSpPr>
+        <p:spPr>
+          <a:xfrm>
+            <a:off x="1164188" y="3494209"/>
+            <a:ext cx="9771553" cy="2222645"/>
+          </a:xfrm>
+        </p:spPr>
+        <p:txBody>
+          <a:bodyPr/>
+          <a:lstStyle/>
+          <a:p>
+            <a:r>
+              <a:rPr lang="en-US" dirty="0"/>
+              <a:t>Graders will grade all labs, </a:t>
+            </a:r>
+            <a:r>
+              <a:rPr lang="en-US" dirty="0" err="1"/>
+              <a:t>homeworks</a:t>
+            </a:r>
+            <a:r>
+              <a:rPr lang="en-US" dirty="0"/>
+              <a:t>, and exams</a:t>
+            </a:r>
+          </a:p>
+          <a:p>
+            <a:r>
+              <a:rPr lang="en-US" dirty="0"/>
+              <a:t>Please contact them if there are any questions</a:t>
+            </a:r>
+          </a:p>
+          <a:p>
+            <a:r>
+              <a:rPr lang="en-US" dirty="0"/>
+              <a:t>Full graders will each have one hour of office hours per week</a:t>
+            </a:r>
+          </a:p>
+        </p:txBody>
+      </p:sp>
+      <p:sp>
+        <p:nvSpPr>
+          <p:cNvPr id="4" name="Slide Number Placeholder 3">
+            <a:extLst>
+              <a:ext uri="{FF2B5EF4-FFF2-40B4-BE49-F238E27FC236}">
+                <a16:creationId xmlns:a16="http://schemas.microsoft.com/office/drawing/2014/main" id="{9D8CAA67-B308-C534-7F2C-48CCF94B9896}"/>
+              </a:ext>
+            </a:extLst>
+          </p:cNvPr>
+          <p:cNvSpPr>
+            <a:spLocks noGrp="1"/>
+          </p:cNvSpPr>
+          <p:nvPr>
+            <p:ph type="sldNum" sz="quarter" idx="12"/>
+          </p:nvPr>
+        </p:nvSpPr>
+        <p:spPr/>
+        <p:txBody>
+          <a:bodyPr/>
+          <a:lstStyle/>
+          <a:p>
+            <a:fld id="{629637A9-119A-49DA-BD12-AAC58B377D80}" type="slidenum">
+              <a:rPr lang="en-US" smtClean="0"/>
+              <a:t>3</a:t>
+            </a:fld>
+            <a:endParaRPr lang="en-US" dirty="0"/>
+          </a:p>
+        </p:txBody>
+      </p:sp>
+      <p:graphicFrame>
+        <p:nvGraphicFramePr>
+          <p:cNvPr id="6" name="Table 5">
+            <a:extLst>
+              <a:ext uri="{FF2B5EF4-FFF2-40B4-BE49-F238E27FC236}">
+                <a16:creationId xmlns:a16="http://schemas.microsoft.com/office/drawing/2014/main" id="{8CE57283-16C6-486A-0D8A-9BC2793017C4}"/>
+              </a:ext>
+            </a:extLst>
+          </p:cNvPr>
+          <p:cNvGraphicFramePr>
+            <a:graphicFrameLocks noGrp="1"/>
+          </p:cNvGraphicFramePr>
+          <p:nvPr>
+            <p:extLst>
+              <p:ext uri="{D42A27DB-BD31-4B8C-83A1-F6EECF244321}">
+                <p14:modId xmlns:p14="http://schemas.microsoft.com/office/powerpoint/2010/main" val="1587481774"/>
+              </p:ext>
+            </p:extLst>
+          </p:nvPr>
+        </p:nvGraphicFramePr>
+        <p:xfrm>
+          <a:off x="1164188" y="1537958"/>
+          <a:ext cx="6658710" cy="1745107"/>
+        </p:xfrm>
+        <a:graphic>
+          <a:graphicData uri="http://schemas.openxmlformats.org/drawingml/2006/table">
+            <a:tbl>
+              <a:tblPr firstRow="1" firstCol="1" bandRow="1">
+                <a:tableStyleId>{72833802-FEF1-4C79-8D5D-14CF1EAF98D9}</a:tableStyleId>
+              </a:tblPr>
+              <a:tblGrid>
+                <a:gridCol w="2219570">
+                  <a:extLst>
+                    <a:ext uri="{9D8B030D-6E8A-4147-A177-3AD203B41FA5}">
+                      <a16:colId xmlns:a16="http://schemas.microsoft.com/office/drawing/2014/main" val="1541938243"/>
+                    </a:ext>
+                  </a:extLst>
+                </a:gridCol>
+                <a:gridCol w="2219570">
+                  <a:extLst>
+                    <a:ext uri="{9D8B030D-6E8A-4147-A177-3AD203B41FA5}">
+                      <a16:colId xmlns:a16="http://schemas.microsoft.com/office/drawing/2014/main" val="1847842239"/>
+                    </a:ext>
+                  </a:extLst>
+                </a:gridCol>
+                <a:gridCol w="2219570">
+                  <a:extLst>
+                    <a:ext uri="{9D8B030D-6E8A-4147-A177-3AD203B41FA5}">
+                      <a16:colId xmlns:a16="http://schemas.microsoft.com/office/drawing/2014/main" val="2730639527"/>
+                    </a:ext>
+                  </a:extLst>
+                </a:gridCol>
+              </a:tblGrid>
+              <a:tr h="200025">
+                <a:tc>
+                  <a:txBody>
+                    <a:bodyPr/>
+                    <a:lstStyle/>
+                    <a:p>
+                      <a:pPr marL="0" marR="0">
+                        <a:lnSpc>
+                          <a:spcPct val="107000"/>
+                        </a:lnSpc>
+                        <a:spcAft>
+                          <a:spcPts val="800"/>
+                        </a:spcAft>
+                        <a:buNone/>
+                      </a:pPr>
+                      <a:r>
+                        <a:rPr lang="en-US" sz="1600" b="0" dirty="0">
+                          <a:effectLst/>
+                        </a:rPr>
+                        <a:t>Grader name</a:t>
+                      </a:r>
+                      <a:endParaRPr lang="en-US" sz="1600" b="0" dirty="0">
+                        <a:effectLst/>
+                        <a:latin typeface="Calibri" panose="020F0502020204030204" pitchFamily="34" charset="0"/>
+                        <a:ea typeface="Calibri" panose="020F0502020204030204" pitchFamily="34" charset="0"/>
+                        <a:cs typeface="Times New Roman" panose="02020603050405020304" pitchFamily="18" charset="0"/>
+                      </a:endParaRPr>
+                    </a:p>
+                  </a:txBody>
+                  <a:tcPr marL="68580" marR="68580" marT="0" marB="0"/>
+                </a:tc>
+                <a:tc>
+                  <a:txBody>
+                    <a:bodyPr/>
+                    <a:lstStyle/>
+                    <a:p>
+                      <a:pPr marL="0" marR="0">
+                        <a:lnSpc>
+                          <a:spcPct val="107000"/>
+                        </a:lnSpc>
+                        <a:spcAft>
+                          <a:spcPts val="800"/>
+                        </a:spcAft>
+                        <a:buNone/>
+                      </a:pPr>
+                      <a:r>
+                        <a:rPr lang="en-US" sz="1600">
+                          <a:effectLst/>
+                        </a:rPr>
+                        <a:t>Email</a:t>
+                      </a:r>
+                      <a:endParaRPr lang="en-US" sz="1600">
+                        <a:effectLst/>
+                        <a:latin typeface="Calibri" panose="020F0502020204030204" pitchFamily="34" charset="0"/>
+                        <a:ea typeface="Calibri" panose="020F0502020204030204" pitchFamily="34" charset="0"/>
+                        <a:cs typeface="Times New Roman" panose="02020603050405020304" pitchFamily="18" charset="0"/>
+                      </a:endParaRPr>
+                    </a:p>
+                  </a:txBody>
+                  <a:tcPr marL="68580" marR="68580" marT="0" marB="0"/>
+                </a:tc>
+                <a:tc>
+                  <a:txBody>
+                    <a:bodyPr/>
+                    <a:lstStyle/>
+                    <a:p>
+                      <a:pPr marL="0" marR="0">
+                        <a:lnSpc>
+                          <a:spcPct val="107000"/>
+                        </a:lnSpc>
+                        <a:spcAft>
+                          <a:spcPts val="800"/>
+                        </a:spcAft>
+                        <a:buNone/>
+                      </a:pPr>
+                      <a:r>
+                        <a:rPr lang="en-US" sz="1600">
+                          <a:effectLst/>
+                        </a:rPr>
+                        <a:t>Allocation</a:t>
+                      </a:r>
+                      <a:endParaRPr lang="en-US" sz="1600">
+                        <a:effectLst/>
+                        <a:latin typeface="Calibri" panose="020F0502020204030204" pitchFamily="34" charset="0"/>
+                        <a:ea typeface="Calibri" panose="020F0502020204030204" pitchFamily="34" charset="0"/>
+                        <a:cs typeface="Times New Roman" panose="02020603050405020304" pitchFamily="18" charset="0"/>
+                      </a:endParaRPr>
+                    </a:p>
+                  </a:txBody>
+                  <a:tcPr marL="68580" marR="68580" marT="0" marB="0"/>
+                </a:tc>
+                <a:extLst>
+                  <a:ext uri="{0D108BD9-81ED-4DB2-BD59-A6C34878D82A}">
+                    <a16:rowId xmlns:a16="http://schemas.microsoft.com/office/drawing/2014/main" val="3332974389"/>
+                  </a:ext>
+                </a:extLst>
+              </a:tr>
+              <a:tr h="200025">
+                <a:tc>
+                  <a:txBody>
+                    <a:bodyPr/>
+                    <a:lstStyle/>
+                    <a:p>
+                      <a:pPr marL="0" marR="0">
+                        <a:lnSpc>
+                          <a:spcPct val="107000"/>
+                        </a:lnSpc>
+                        <a:spcAft>
+                          <a:spcPts val="800"/>
+                        </a:spcAft>
+                        <a:buNone/>
+                      </a:pPr>
+                      <a:r>
+                        <a:rPr lang="en-US" sz="1600" b="0">
+                          <a:effectLst/>
+                        </a:rPr>
+                        <a:t>Tejdeep Chippa</a:t>
+                      </a:r>
+                      <a:endParaRPr lang="en-US" sz="1600" b="0">
+                        <a:effectLst/>
+                        <a:latin typeface="Calibri" panose="020F0502020204030204" pitchFamily="34" charset="0"/>
+                        <a:ea typeface="Calibri" panose="020F0502020204030204" pitchFamily="34" charset="0"/>
+                        <a:cs typeface="Times New Roman" panose="02020603050405020304" pitchFamily="18" charset="0"/>
+                      </a:endParaRPr>
+                    </a:p>
+                  </a:txBody>
+                  <a:tcPr marL="68580" marR="68580" marT="0" marB="0"/>
+                </a:tc>
+                <a:tc>
+                  <a:txBody>
+                    <a:bodyPr/>
+                    <a:lstStyle/>
+                    <a:p>
+                      <a:pPr marL="0" marR="0">
+                        <a:lnSpc>
+                          <a:spcPct val="107000"/>
+                        </a:lnSpc>
+                        <a:spcAft>
+                          <a:spcPts val="800"/>
+                        </a:spcAft>
+                        <a:buNone/>
+                      </a:pPr>
+                      <a:r>
+                        <a:rPr lang="en-US" sz="1600" u="sng">
+                          <a:effectLst/>
+                          <a:hlinkClick r:id="rId2"/>
+                        </a:rPr>
+                        <a:t>tejdeep.chippa@nyu.edu</a:t>
+                      </a:r>
+                      <a:endParaRPr lang="en-US" sz="1600">
+                        <a:effectLst/>
+                        <a:latin typeface="Calibri" panose="020F0502020204030204" pitchFamily="34" charset="0"/>
+                        <a:ea typeface="Calibri" panose="020F0502020204030204" pitchFamily="34" charset="0"/>
+                        <a:cs typeface="Times New Roman" panose="02020603050405020304" pitchFamily="18" charset="0"/>
+                      </a:endParaRPr>
+                    </a:p>
+                  </a:txBody>
+                  <a:tcPr marL="68580" marR="68580" marT="0" marB="0"/>
+                </a:tc>
+                <a:tc>
+                  <a:txBody>
+                    <a:bodyPr/>
+                    <a:lstStyle/>
+                    <a:p>
+                      <a:pPr marL="0" marR="0">
+                        <a:lnSpc>
+                          <a:spcPct val="107000"/>
+                        </a:lnSpc>
+                        <a:spcAft>
+                          <a:spcPts val="800"/>
+                        </a:spcAft>
+                        <a:buNone/>
+                      </a:pPr>
+                      <a:r>
+                        <a:rPr lang="en-US" sz="1600">
+                          <a:effectLst/>
+                        </a:rPr>
+                        <a:t>Full</a:t>
+                      </a:r>
+                      <a:endParaRPr lang="en-US" sz="1600">
+                        <a:effectLst/>
+                        <a:latin typeface="Calibri" panose="020F0502020204030204" pitchFamily="34" charset="0"/>
+                        <a:ea typeface="Calibri" panose="020F0502020204030204" pitchFamily="34" charset="0"/>
+                        <a:cs typeface="Times New Roman" panose="02020603050405020304" pitchFamily="18" charset="0"/>
+                      </a:endParaRPr>
+                    </a:p>
+                  </a:txBody>
+                  <a:tcPr marL="68580" marR="68580" marT="0" marB="0"/>
+                </a:tc>
+                <a:extLst>
+                  <a:ext uri="{0D108BD9-81ED-4DB2-BD59-A6C34878D82A}">
+                    <a16:rowId xmlns:a16="http://schemas.microsoft.com/office/drawing/2014/main" val="3108256094"/>
+                  </a:ext>
+                </a:extLst>
+              </a:tr>
+              <a:tr h="200025">
+                <a:tc>
+                  <a:txBody>
+                    <a:bodyPr/>
+                    <a:lstStyle/>
+                    <a:p>
+                      <a:pPr marL="0" marR="0">
+                        <a:lnSpc>
+                          <a:spcPct val="107000"/>
+                        </a:lnSpc>
+                        <a:spcAft>
+                          <a:spcPts val="800"/>
+                        </a:spcAft>
+                        <a:buNone/>
+                      </a:pPr>
+                      <a:r>
+                        <a:rPr lang="en-US" sz="1600" b="0" dirty="0">
+                          <a:effectLst/>
+                        </a:rPr>
+                        <a:t>Roshan Nayak</a:t>
+                      </a:r>
+                      <a:endParaRPr lang="en-US" sz="1600" b="0" dirty="0">
+                        <a:effectLst/>
+                        <a:latin typeface="Calibri" panose="020F0502020204030204" pitchFamily="34" charset="0"/>
+                        <a:ea typeface="Calibri" panose="020F0502020204030204" pitchFamily="34" charset="0"/>
+                        <a:cs typeface="Times New Roman" panose="02020603050405020304" pitchFamily="18" charset="0"/>
+                      </a:endParaRPr>
+                    </a:p>
+                  </a:txBody>
+                  <a:tcPr marL="68580" marR="68580" marT="0" marB="0"/>
+                </a:tc>
+                <a:tc>
+                  <a:txBody>
+                    <a:bodyPr/>
+                    <a:lstStyle/>
+                    <a:p>
+                      <a:pPr marL="0" marR="0">
+                        <a:lnSpc>
+                          <a:spcPct val="107000"/>
+                        </a:lnSpc>
+                        <a:spcAft>
+                          <a:spcPts val="800"/>
+                        </a:spcAft>
+                        <a:buNone/>
+                      </a:pPr>
+                      <a:r>
+                        <a:rPr lang="en-US" sz="1600" u="sng">
+                          <a:effectLst/>
+                          <a:hlinkClick r:id="rId3"/>
+                        </a:rPr>
+                        <a:t>rn2588@nyu.edu</a:t>
+                      </a:r>
+                      <a:endParaRPr lang="en-US" sz="1600">
+                        <a:effectLst/>
+                        <a:latin typeface="Calibri" panose="020F0502020204030204" pitchFamily="34" charset="0"/>
+                        <a:ea typeface="Calibri" panose="020F0502020204030204" pitchFamily="34" charset="0"/>
+                        <a:cs typeface="Times New Roman" panose="02020603050405020304" pitchFamily="18" charset="0"/>
+                      </a:endParaRPr>
+                    </a:p>
+                  </a:txBody>
+                  <a:tcPr marL="68580" marR="68580" marT="0" marB="0"/>
+                </a:tc>
+                <a:tc>
+                  <a:txBody>
+                    <a:bodyPr/>
+                    <a:lstStyle/>
+                    <a:p>
+                      <a:pPr marL="0" marR="0">
+                        <a:lnSpc>
+                          <a:spcPct val="107000"/>
+                        </a:lnSpc>
+                        <a:spcAft>
+                          <a:spcPts val="800"/>
+                        </a:spcAft>
+                        <a:buNone/>
+                      </a:pPr>
+                      <a:r>
+                        <a:rPr lang="en-US" sz="1600">
+                          <a:effectLst/>
+                        </a:rPr>
+                        <a:t>Full</a:t>
+                      </a:r>
+                      <a:endParaRPr lang="en-US" sz="1600">
+                        <a:effectLst/>
+                        <a:latin typeface="Calibri" panose="020F0502020204030204" pitchFamily="34" charset="0"/>
+                        <a:ea typeface="Calibri" panose="020F0502020204030204" pitchFamily="34" charset="0"/>
+                        <a:cs typeface="Times New Roman" panose="02020603050405020304" pitchFamily="18" charset="0"/>
+                      </a:endParaRPr>
+                    </a:p>
+                  </a:txBody>
+                  <a:tcPr marL="68580" marR="68580" marT="0" marB="0"/>
+                </a:tc>
+                <a:extLst>
+                  <a:ext uri="{0D108BD9-81ED-4DB2-BD59-A6C34878D82A}">
+                    <a16:rowId xmlns:a16="http://schemas.microsoft.com/office/drawing/2014/main" val="3339805296"/>
+                  </a:ext>
+                </a:extLst>
+              </a:tr>
+              <a:tr h="200025">
+                <a:tc>
+                  <a:txBody>
+                    <a:bodyPr/>
+                    <a:lstStyle/>
+                    <a:p>
+                      <a:pPr marL="0" marR="0">
+                        <a:lnSpc>
+                          <a:spcPct val="107000"/>
+                        </a:lnSpc>
+                        <a:spcAft>
+                          <a:spcPts val="800"/>
+                        </a:spcAft>
+                        <a:buNone/>
+                      </a:pPr>
+                      <a:r>
+                        <a:rPr lang="en-US" sz="1600" b="0" dirty="0">
+                          <a:effectLst/>
+                        </a:rPr>
+                        <a:t>Akshat Singh</a:t>
+                      </a:r>
+                      <a:endParaRPr lang="en-US" sz="1600" b="0" dirty="0">
+                        <a:effectLst/>
+                        <a:latin typeface="Calibri" panose="020F0502020204030204" pitchFamily="34" charset="0"/>
+                        <a:ea typeface="Calibri" panose="020F0502020204030204" pitchFamily="34" charset="0"/>
+                        <a:cs typeface="Times New Roman" panose="02020603050405020304" pitchFamily="18" charset="0"/>
+                      </a:endParaRPr>
+                    </a:p>
+                  </a:txBody>
+                  <a:tcPr marL="68580" marR="68580" marT="0" marB="0"/>
+                </a:tc>
+                <a:tc>
+                  <a:txBody>
+                    <a:bodyPr/>
+                    <a:lstStyle/>
+                    <a:p>
+                      <a:pPr marL="0" marR="0">
+                        <a:lnSpc>
+                          <a:spcPct val="107000"/>
+                        </a:lnSpc>
+                        <a:spcAft>
+                          <a:spcPts val="800"/>
+                        </a:spcAft>
+                        <a:buNone/>
+                      </a:pPr>
+                      <a:r>
+                        <a:rPr lang="en-US" sz="1600" u="sng">
+                          <a:effectLst/>
+                          <a:hlinkClick r:id="rId4"/>
+                        </a:rPr>
+                        <a:t>akshat.singh@nyu.edu</a:t>
+                      </a:r>
+                      <a:endParaRPr lang="en-US" sz="1600">
+                        <a:effectLst/>
+                        <a:latin typeface="Calibri" panose="020F0502020204030204" pitchFamily="34" charset="0"/>
+                        <a:ea typeface="Calibri" panose="020F0502020204030204" pitchFamily="34" charset="0"/>
+                        <a:cs typeface="Times New Roman" panose="02020603050405020304" pitchFamily="18" charset="0"/>
+                      </a:endParaRPr>
+                    </a:p>
+                  </a:txBody>
+                  <a:tcPr marL="68580" marR="68580" marT="0" marB="0"/>
+                </a:tc>
+                <a:tc>
+                  <a:txBody>
+                    <a:bodyPr/>
+                    <a:lstStyle/>
+                    <a:p>
+                      <a:pPr marL="0" marR="0">
+                        <a:lnSpc>
+                          <a:spcPct val="107000"/>
+                        </a:lnSpc>
+                        <a:spcAft>
+                          <a:spcPts val="800"/>
+                        </a:spcAft>
+                        <a:buNone/>
+                      </a:pPr>
+                      <a:r>
+                        <a:rPr lang="en-US" sz="1600">
+                          <a:effectLst/>
+                        </a:rPr>
+                        <a:t>Full</a:t>
+                      </a:r>
+                      <a:endParaRPr lang="en-US" sz="1600">
+                        <a:effectLst/>
+                        <a:latin typeface="Calibri" panose="020F0502020204030204" pitchFamily="34" charset="0"/>
+                        <a:ea typeface="Calibri" panose="020F0502020204030204" pitchFamily="34" charset="0"/>
+                        <a:cs typeface="Times New Roman" panose="02020603050405020304" pitchFamily="18" charset="0"/>
+                      </a:endParaRPr>
+                    </a:p>
+                  </a:txBody>
+                  <a:tcPr marL="68580" marR="68580" marT="0" marB="0"/>
+                </a:tc>
+                <a:extLst>
+                  <a:ext uri="{0D108BD9-81ED-4DB2-BD59-A6C34878D82A}">
+                    <a16:rowId xmlns:a16="http://schemas.microsoft.com/office/drawing/2014/main" val="351016435"/>
+                  </a:ext>
+                </a:extLst>
+              </a:tr>
+              <a:tr h="200025">
+                <a:tc>
+                  <a:txBody>
+                    <a:bodyPr/>
+                    <a:lstStyle/>
+                    <a:p>
+                      <a:pPr marL="0" marR="0">
+                        <a:lnSpc>
+                          <a:spcPct val="107000"/>
+                        </a:lnSpc>
+                        <a:spcAft>
+                          <a:spcPts val="800"/>
+                        </a:spcAft>
+                        <a:buNone/>
+                      </a:pPr>
+                      <a:r>
+                        <a:rPr lang="en-US" sz="1600" b="0" dirty="0">
+                          <a:effectLst/>
+                        </a:rPr>
+                        <a:t>Aadit Anand Fadia</a:t>
+                      </a:r>
+                      <a:endParaRPr lang="en-US" sz="1600" b="0" dirty="0">
+                        <a:effectLst/>
+                        <a:latin typeface="Calibri" panose="020F0502020204030204" pitchFamily="34" charset="0"/>
+                        <a:ea typeface="Calibri" panose="020F0502020204030204" pitchFamily="34" charset="0"/>
+                        <a:cs typeface="Times New Roman" panose="02020603050405020304" pitchFamily="18" charset="0"/>
+                      </a:endParaRPr>
+                    </a:p>
+                  </a:txBody>
+                  <a:tcPr marL="68580" marR="68580" marT="0" marB="0"/>
+                </a:tc>
+                <a:tc>
+                  <a:txBody>
+                    <a:bodyPr/>
+                    <a:lstStyle/>
+                    <a:p>
+                      <a:pPr marL="0" marR="0">
+                        <a:lnSpc>
+                          <a:spcPct val="107000"/>
+                        </a:lnSpc>
+                        <a:spcAft>
+                          <a:spcPts val="800"/>
+                        </a:spcAft>
+                        <a:buNone/>
+                      </a:pPr>
+                      <a:r>
+                        <a:rPr lang="en-US" sz="1600" u="sng">
+                          <a:effectLst/>
+                          <a:hlinkClick r:id="rId5"/>
+                        </a:rPr>
+                        <a:t>aaf9407@nyu.edu</a:t>
+                      </a:r>
+                      <a:endParaRPr lang="en-US" sz="1600">
+                        <a:effectLst/>
+                        <a:latin typeface="Calibri" panose="020F0502020204030204" pitchFamily="34" charset="0"/>
+                        <a:ea typeface="Calibri" panose="020F0502020204030204" pitchFamily="34" charset="0"/>
+                        <a:cs typeface="Times New Roman" panose="02020603050405020304" pitchFamily="18" charset="0"/>
+                      </a:endParaRPr>
+                    </a:p>
+                  </a:txBody>
+                  <a:tcPr marL="68580" marR="68580" marT="0" marB="0"/>
+                </a:tc>
+                <a:tc>
+                  <a:txBody>
+                    <a:bodyPr/>
+                    <a:lstStyle/>
+                    <a:p>
+                      <a:pPr marL="0" marR="0">
+                        <a:lnSpc>
+                          <a:spcPct val="107000"/>
+                        </a:lnSpc>
+                        <a:spcAft>
+                          <a:spcPts val="800"/>
+                        </a:spcAft>
+                        <a:buNone/>
+                      </a:pPr>
+                      <a:r>
+                        <a:rPr lang="en-US" sz="1600">
+                          <a:effectLst/>
+                        </a:rPr>
+                        <a:t>Full</a:t>
+                      </a:r>
+                      <a:endParaRPr lang="en-US" sz="1600">
+                        <a:effectLst/>
+                        <a:latin typeface="Calibri" panose="020F0502020204030204" pitchFamily="34" charset="0"/>
+                        <a:ea typeface="Calibri" panose="020F0502020204030204" pitchFamily="34" charset="0"/>
+                        <a:cs typeface="Times New Roman" panose="02020603050405020304" pitchFamily="18" charset="0"/>
+                      </a:endParaRPr>
+                    </a:p>
+                  </a:txBody>
+                  <a:tcPr marL="68580" marR="68580" marT="0" marB="0"/>
+                </a:tc>
+                <a:extLst>
+                  <a:ext uri="{0D108BD9-81ED-4DB2-BD59-A6C34878D82A}">
+                    <a16:rowId xmlns:a16="http://schemas.microsoft.com/office/drawing/2014/main" val="2622459427"/>
+                  </a:ext>
+                </a:extLst>
+              </a:tr>
+              <a:tr h="200025">
+                <a:tc>
+                  <a:txBody>
+                    <a:bodyPr/>
+                    <a:lstStyle/>
+                    <a:p>
+                      <a:pPr marL="0" marR="0">
+                        <a:lnSpc>
+                          <a:spcPct val="107000"/>
+                        </a:lnSpc>
+                        <a:spcAft>
+                          <a:spcPts val="800"/>
+                        </a:spcAft>
+                        <a:buNone/>
+                      </a:pPr>
+                      <a:r>
+                        <a:rPr lang="en-US" sz="1600" b="0" dirty="0">
+                          <a:effectLst/>
+                        </a:rPr>
+                        <a:t>Sheetal Prasad</a:t>
+                      </a:r>
+                      <a:endParaRPr lang="en-US" sz="1600" b="0" dirty="0">
+                        <a:effectLst/>
+                        <a:latin typeface="Calibri" panose="020F0502020204030204" pitchFamily="34" charset="0"/>
+                        <a:ea typeface="Calibri" panose="020F0502020204030204" pitchFamily="34" charset="0"/>
+                        <a:cs typeface="Times New Roman" panose="02020603050405020304" pitchFamily="18" charset="0"/>
+                      </a:endParaRPr>
+                    </a:p>
+                  </a:txBody>
+                  <a:tcPr marL="68580" marR="68580" marT="0" marB="0"/>
+                </a:tc>
+                <a:tc>
+                  <a:txBody>
+                    <a:bodyPr/>
+                    <a:lstStyle/>
+                    <a:p>
+                      <a:pPr marL="0" marR="0">
+                        <a:lnSpc>
+                          <a:spcPct val="107000"/>
+                        </a:lnSpc>
+                        <a:spcAft>
+                          <a:spcPts val="800"/>
+                        </a:spcAft>
+                        <a:buNone/>
+                      </a:pPr>
+                      <a:r>
+                        <a:rPr lang="en-US" sz="1600" u="sng">
+                          <a:effectLst/>
+                          <a:hlinkClick r:id="rId6"/>
+                        </a:rPr>
+                        <a:t>sheetal.prasad@nyu.edu</a:t>
+                      </a:r>
+                      <a:endParaRPr lang="en-US" sz="1600">
+                        <a:effectLst/>
+                        <a:latin typeface="Calibri" panose="020F0502020204030204" pitchFamily="34" charset="0"/>
+                        <a:ea typeface="Calibri" panose="020F0502020204030204" pitchFamily="34" charset="0"/>
+                        <a:cs typeface="Times New Roman" panose="02020603050405020304" pitchFamily="18" charset="0"/>
+                      </a:endParaRPr>
+                    </a:p>
+                  </a:txBody>
+                  <a:tcPr marL="68580" marR="68580" marT="0" marB="0"/>
+                </a:tc>
+                <a:tc>
+                  <a:txBody>
+                    <a:bodyPr/>
+                    <a:lstStyle/>
+                    <a:p>
+                      <a:pPr marL="0" marR="0">
+                        <a:lnSpc>
+                          <a:spcPct val="107000"/>
+                        </a:lnSpc>
+                        <a:spcAft>
+                          <a:spcPts val="800"/>
+                        </a:spcAft>
+                        <a:buNone/>
+                      </a:pPr>
+                      <a:r>
+                        <a:rPr lang="en-US" sz="1600" dirty="0">
+                          <a:effectLst/>
+                        </a:rPr>
+                        <a:t>Half</a:t>
+                      </a:r>
+                      <a:endParaRPr lang="en-US" sz="1600" dirty="0">
+                        <a:effectLst/>
+                        <a:latin typeface="Calibri" panose="020F0502020204030204" pitchFamily="34" charset="0"/>
+                        <a:ea typeface="Calibri" panose="020F0502020204030204" pitchFamily="34" charset="0"/>
+                        <a:cs typeface="Times New Roman" panose="02020603050405020304" pitchFamily="18" charset="0"/>
+                      </a:endParaRPr>
+                    </a:p>
+                  </a:txBody>
+                  <a:tcPr marL="68580" marR="68580" marT="0" marB="0"/>
+                </a:tc>
+                <a:extLst>
+                  <a:ext uri="{0D108BD9-81ED-4DB2-BD59-A6C34878D82A}">
+                    <a16:rowId xmlns:a16="http://schemas.microsoft.com/office/drawing/2014/main" val="3780077963"/>
+                  </a:ext>
+                </a:extLst>
+              </a:tr>
+              <a:tr h="200025">
+                <a:tc>
+                  <a:txBody>
+                    <a:bodyPr/>
+                    <a:lstStyle/>
+                    <a:p>
+                      <a:pPr marL="0" marR="0">
+                        <a:lnSpc>
+                          <a:spcPct val="107000"/>
+                        </a:lnSpc>
+                        <a:spcAft>
+                          <a:spcPts val="800"/>
+                        </a:spcAft>
+                        <a:buNone/>
+                      </a:pPr>
+                      <a:r>
+                        <a:rPr lang="en-US" sz="1600" b="0" dirty="0">
+                          <a:effectLst/>
+                        </a:rPr>
+                        <a:t>Raunak Choudhary</a:t>
+                      </a:r>
+                      <a:endParaRPr lang="en-US" sz="1600" b="0" dirty="0">
+                        <a:effectLst/>
+                        <a:latin typeface="Calibri" panose="020F0502020204030204" pitchFamily="34" charset="0"/>
+                        <a:ea typeface="Calibri" panose="020F0502020204030204" pitchFamily="34" charset="0"/>
+                        <a:cs typeface="Times New Roman" panose="02020603050405020304" pitchFamily="18" charset="0"/>
+                      </a:endParaRPr>
+                    </a:p>
+                  </a:txBody>
+                  <a:tcPr marL="68580" marR="68580" marT="0" marB="0"/>
+                </a:tc>
+                <a:tc>
+                  <a:txBody>
+                    <a:bodyPr/>
+                    <a:lstStyle/>
+                    <a:p>
+                      <a:pPr marL="0" marR="0">
+                        <a:lnSpc>
+                          <a:spcPct val="107000"/>
+                        </a:lnSpc>
+                        <a:spcAft>
+                          <a:spcPts val="800"/>
+                        </a:spcAft>
+                        <a:buNone/>
+                      </a:pPr>
+                      <a:r>
+                        <a:rPr lang="en-US" sz="1600" u="sng">
+                          <a:effectLst/>
+                          <a:hlinkClick r:id="rId7"/>
+                        </a:rPr>
+                        <a:t>rc5553@nyu.edu</a:t>
+                      </a:r>
+                      <a:endParaRPr lang="en-US" sz="1600">
+                        <a:effectLst/>
+                        <a:latin typeface="Calibri" panose="020F0502020204030204" pitchFamily="34" charset="0"/>
+                        <a:ea typeface="Calibri" panose="020F0502020204030204" pitchFamily="34" charset="0"/>
+                        <a:cs typeface="Times New Roman" panose="02020603050405020304" pitchFamily="18" charset="0"/>
+                      </a:endParaRPr>
+                    </a:p>
+                  </a:txBody>
+                  <a:tcPr marL="68580" marR="68580" marT="0" marB="0"/>
+                </a:tc>
+                <a:tc>
+                  <a:txBody>
+                    <a:bodyPr/>
+                    <a:lstStyle/>
+                    <a:p>
+                      <a:pPr marL="0" marR="0">
+                        <a:lnSpc>
+                          <a:spcPct val="107000"/>
+                        </a:lnSpc>
+                        <a:spcAft>
+                          <a:spcPts val="800"/>
+                        </a:spcAft>
+                        <a:buNone/>
+                      </a:pPr>
+                      <a:r>
+                        <a:rPr lang="en-US" sz="1600" dirty="0">
+                          <a:effectLst/>
+                        </a:rPr>
+                        <a:t>Half</a:t>
+                      </a:r>
+                      <a:endParaRPr lang="en-US" sz="1600" dirty="0">
+                        <a:effectLst/>
+                        <a:latin typeface="Calibri" panose="020F0502020204030204" pitchFamily="34" charset="0"/>
+                        <a:ea typeface="Calibri" panose="020F0502020204030204" pitchFamily="34" charset="0"/>
+                        <a:cs typeface="Times New Roman" panose="02020603050405020304" pitchFamily="18" charset="0"/>
+                      </a:endParaRPr>
+                    </a:p>
+                  </a:txBody>
+                  <a:tcPr marL="68580" marR="68580" marT="0" marB="0"/>
+                </a:tc>
+                <a:extLst>
+                  <a:ext uri="{0D108BD9-81ED-4DB2-BD59-A6C34878D82A}">
+                    <a16:rowId xmlns:a16="http://schemas.microsoft.com/office/drawing/2014/main" val="3401751224"/>
+                  </a:ext>
+                </a:extLst>
+              </a:tr>
+            </a:tbl>
+          </a:graphicData>
+        </a:graphic>
+      </p:graphicFrame>
+    </p:spTree>
+    <p:extLst>
+      <p:ext uri="{BB962C8B-B14F-4D97-AF65-F5344CB8AC3E}">
+        <p14:creationId xmlns:p14="http://schemas.microsoft.com/office/powerpoint/2010/main" val="3945926268"/>
+      </p:ext>
+    </p:extLst>
+  </p:cSld>
+  <p:clrMapOvr>
+    <a:masterClrMapping/>
+  </p:clrMapOvr>
+</p:sld>
+</file>
+
+<file path=ppt/slides/slide4.xml><?xml version="1.0" encoding="utf-8"?>
+<p:sld xmlns:a="http://schemas.openxmlformats.org/drawingml/2006/main" xmlns:r="http://schemas.openxmlformats.org/officeDocument/2006/relationships" xmlns:p="http://schemas.openxmlformats.org/presentationml/2006/main">
+  <p:cSld>
+    <p:spTree>
+      <p:nvGrpSpPr>
+        <p:cNvPr id="1" name=""/>
+        <p:cNvGrpSpPr/>
+        <p:nvPr/>
+      </p:nvGrpSpPr>
+      <p:grpSpPr>
+        <a:xfrm>
+          <a:off x="0" y="0"/>
+          <a:ext cx="0" cy="0"/>
+          <a:chOff x="0" y="0"/>
+          <a:chExt cx="0" cy="0"/>
+        </a:xfrm>
+      </p:grpSpPr>
+      <p:sp>
+        <p:nvSpPr>
           <p:cNvPr id="2" name="Title 1"/>
           <p:cNvSpPr>
             <a:spLocks noGrp="1"/>
@@ -8552,7 +9591,7 @@
           <a:p>
             <a:fld id="{629637A9-119A-49DA-BD12-AAC58B377D80}" type="slidenum">
               <a:rPr lang="en-US" smtClean="0"/>
-              <a:t>3</a:t>
+              <a:t>4</a:t>
             </a:fld>
             <a:endParaRPr lang="en-US" dirty="0"/>
           </a:p>
@@ -8571,7 +9610,7 @@
 </p:sld>
 </file>
 
-<file path=ppt/slides/slide4.xml><?xml version="1.0" encoding="utf-8"?>
+<file path=ppt/slides/slide5.xml><?xml version="1.0" encoding="utf-8"?>
 <p:sld xmlns:a="http://schemas.openxmlformats.org/drawingml/2006/main" xmlns:r="http://schemas.openxmlformats.org/officeDocument/2006/relationships" xmlns:p="http://schemas.openxmlformats.org/presentationml/2006/main">
   <p:cSld>
     <p:spTree>
@@ -8750,7 +9789,7 @@
           <a:p>
             <a:fld id="{629637A9-119A-49DA-BD12-AAC58B377D80}" type="slidenum">
               <a:rPr lang="en-US" smtClean="0"/>
-              <a:t>4</a:t>
+              <a:t>5</a:t>
             </a:fld>
             <a:endParaRPr lang="en-US" dirty="0"/>
           </a:p>
@@ -8769,7 +9808,7 @@
 </p:sld>
 </file>
 
-<file path=ppt/slides/slide5.xml><?xml version="1.0" encoding="utf-8"?>
+<file path=ppt/slides/slide6.xml><?xml version="1.0" encoding="utf-8"?>
 <p:sld xmlns:a="http://schemas.openxmlformats.org/drawingml/2006/main" xmlns:r="http://schemas.openxmlformats.org/officeDocument/2006/relationships" xmlns:p="http://schemas.openxmlformats.org/presentationml/2006/main">
   <p:cSld>
     <p:spTree>
@@ -8957,7 +9996,7 @@
           <a:p>
             <a:fld id="{629637A9-119A-49DA-BD12-AAC58B377D80}" type="slidenum">
               <a:rPr lang="en-US" smtClean="0"/>
-              <a:t>5</a:t>
+              <a:t>6</a:t>
             </a:fld>
             <a:endParaRPr lang="en-US" dirty="0"/>
           </a:p>
@@ -8976,7 +10015,7 @@
 </p:sld>
 </file>
 
-<file path=ppt/slides/slide6.xml><?xml version="1.0" encoding="utf-8"?>
+<file path=ppt/slides/slide7.xml><?xml version="1.0" encoding="utf-8"?>
 <p:sld xmlns:a="http://schemas.openxmlformats.org/drawingml/2006/main" xmlns:r="http://schemas.openxmlformats.org/officeDocument/2006/relationships" xmlns:p="http://schemas.openxmlformats.org/presentationml/2006/main">
   <p:cSld>
     <p:spTree>
@@ -9152,7 +10191,7 @@
           <a:p>
             <a:fld id="{629637A9-119A-49DA-BD12-AAC58B377D80}" type="slidenum">
               <a:rPr lang="en-US" smtClean="0"/>
-              <a:t>6</a:t>
+              <a:t>7</a:t>
             </a:fld>
             <a:endParaRPr lang="en-US" dirty="0"/>
           </a:p>
@@ -9201,173 +10240,6 @@
 </p:sld>
 </file>
 
-<file path=ppt/slides/slide7.xml><?xml version="1.0" encoding="utf-8"?>
-<p:sld xmlns:a="http://schemas.openxmlformats.org/drawingml/2006/main" xmlns:r="http://schemas.openxmlformats.org/officeDocument/2006/relationships" xmlns:p="http://schemas.openxmlformats.org/presentationml/2006/main">
-  <p:cSld>
-    <p:spTree>
-      <p:nvGrpSpPr>
-        <p:cNvPr id="1" name=""/>
-        <p:cNvGrpSpPr/>
-        <p:nvPr/>
-      </p:nvGrpSpPr>
-      <p:grpSpPr>
-        <a:xfrm>
-          <a:off x="0" y="0"/>
-          <a:ext cx="0" cy="0"/>
-          <a:chOff x="0" y="0"/>
-          <a:chExt cx="0" cy="0"/>
-        </a:xfrm>
-      </p:grpSpPr>
-      <p:sp>
-        <p:nvSpPr>
-          <p:cNvPr id="2" name="Title 1"/>
-          <p:cNvSpPr>
-            <a:spLocks noGrp="1"/>
-          </p:cNvSpPr>
-          <p:nvPr>
-            <p:ph type="title"/>
-          </p:nvPr>
-        </p:nvSpPr>
-        <p:spPr/>
-        <p:txBody>
-          <a:bodyPr/>
-          <a:lstStyle/>
-          <a:p>
-            <a:r>
-              <a:rPr lang="en-US" dirty="0"/>
-              <a:t>Pre-Requisites </a:t>
-            </a:r>
-          </a:p>
-        </p:txBody>
-      </p:sp>
-      <p:sp>
-        <p:nvSpPr>
-          <p:cNvPr id="3" name="Content Placeholder 2"/>
-          <p:cNvSpPr>
-            <a:spLocks noGrp="1"/>
-          </p:cNvSpPr>
-          <p:nvPr>
-            <p:ph idx="1"/>
-          </p:nvPr>
-        </p:nvSpPr>
-        <p:spPr/>
-        <p:txBody>
-          <a:bodyPr>
-            <a:normAutofit/>
-          </a:bodyPr>
-          <a:lstStyle/>
-          <a:p>
-            <a:r>
-              <a:rPr lang="en-US" dirty="0"/>
-              <a:t>Undergrad probability required for both UG and Grad version:</a:t>
-            </a:r>
-          </a:p>
-          <a:p>
-            <a:pPr lvl="1"/>
-            <a:r>
-              <a:rPr lang="en-US" dirty="0"/>
-              <a:t>Basics of random variables, densities, Gaussian distributions, correlation, expectation, </a:t>
-            </a:r>
-            <a:br>
-              <a:rPr lang="en-US" dirty="0"/>
-            </a:br>
-            <a:r>
-              <a:rPr lang="en-US" dirty="0"/>
-              <a:t>conditional densities, Bayes’ theorem</a:t>
-            </a:r>
-          </a:p>
-          <a:p>
-            <a:pPr lvl="1"/>
-            <a:r>
-              <a:rPr lang="en-US" dirty="0"/>
-              <a:t>Will provide a short review</a:t>
-            </a:r>
-          </a:p>
-          <a:p>
-            <a:pPr lvl="1"/>
-            <a:r>
-              <a:rPr lang="en-US" dirty="0"/>
-              <a:t>NYU classes:  Data analysis or Intro Probability are sufficient</a:t>
-            </a:r>
-          </a:p>
-          <a:p>
-            <a:r>
-              <a:rPr lang="en-US" dirty="0"/>
-              <a:t>Undergraduate calculus and linear algebra</a:t>
-            </a:r>
-          </a:p>
-          <a:p>
-            <a:pPr lvl="1"/>
-            <a:r>
-              <a:rPr lang="en-US" dirty="0"/>
-              <a:t>Vectors, matrices, partial derivatives, gradients.</a:t>
-            </a:r>
-          </a:p>
-          <a:p>
-            <a:pPr lvl="1"/>
-            <a:r>
-              <a:rPr lang="en-US" dirty="0"/>
-              <a:t>Again, we will provide a brief review</a:t>
-            </a:r>
-          </a:p>
-          <a:p>
-            <a:r>
-              <a:rPr lang="en-US" dirty="0"/>
-              <a:t>No machine learning experience is necessary</a:t>
-            </a:r>
-          </a:p>
-          <a:p>
-            <a:pPr lvl="1"/>
-            <a:r>
-              <a:rPr lang="en-US" dirty="0"/>
-              <a:t>If you have ML experience, do NOT take this class.  </a:t>
-            </a:r>
-          </a:p>
-          <a:p>
-            <a:pPr lvl="1"/>
-            <a:r>
-              <a:rPr lang="en-US" dirty="0"/>
-              <a:t>Take Graduate probability (Fall) then Advanced machine learning (Spring)</a:t>
-            </a:r>
-          </a:p>
-        </p:txBody>
-      </p:sp>
-      <p:sp>
-        <p:nvSpPr>
-          <p:cNvPr id="4" name="Slide Number Placeholder 3"/>
-          <p:cNvSpPr>
-            <a:spLocks noGrp="1"/>
-          </p:cNvSpPr>
-          <p:nvPr>
-            <p:ph type="sldNum" sz="quarter" idx="12"/>
-          </p:nvPr>
-        </p:nvSpPr>
-        <p:spPr/>
-        <p:txBody>
-          <a:bodyPr/>
-          <a:lstStyle/>
-          <a:p>
-            <a:fld id="{629637A9-119A-49DA-BD12-AAC58B377D80}" type="slidenum">
-              <a:rPr lang="en-US" smtClean="0"/>
-              <a:t>7</a:t>
-            </a:fld>
-            <a:endParaRPr lang="en-US" dirty="0"/>
-          </a:p>
-        </p:txBody>
-      </p:sp>
-    </p:spTree>
-    <p:extLst>
-      <p:ext uri="{BB962C8B-B14F-4D97-AF65-F5344CB8AC3E}">
-        <p14:creationId xmlns:p14="http://schemas.microsoft.com/office/powerpoint/2010/main" val="1913674990"/>
-      </p:ext>
-    </p:extLst>
-  </p:cSld>
-  <p:clrMapOvr>
-    <a:masterClrMapping/>
-  </p:clrMapOvr>
-</p:sld>
-</file>
-
 <file path=ppt/slides/slide8.xml><?xml version="1.0" encoding="utf-8"?>
 <p:sld xmlns:a="http://schemas.openxmlformats.org/drawingml/2006/main" xmlns:r="http://schemas.openxmlformats.org/officeDocument/2006/relationships" xmlns:p="http://schemas.openxmlformats.org/presentationml/2006/main">
   <p:cSld>
@@ -9402,7 +10274,7 @@
           <a:p>
             <a:r>
               <a:rPr lang="en-US" dirty="0"/>
-              <a:t>Pre-Requisites Programming</a:t>
+              <a:t>Pre-Requisites </a:t>
             </a:r>
           </a:p>
         </p:txBody>
@@ -9426,131 +10298,76 @@
           <a:p>
             <a:r>
               <a:rPr lang="en-US" dirty="0"/>
-              <a:t>Python</a:t>
+              <a:t>Undergrad probability required for both UG and Grad version:</a:t>
             </a:r>
           </a:p>
           <a:p>
             <a:pPr lvl="1"/>
             <a:r>
               <a:rPr lang="en-US" dirty="0"/>
-              <a:t>All labs are in python, similar to object-oriented MATLAB, but many more libraries.  </a:t>
+              <a:t>Basics of random variables, densities, Gaussian distributions, correlation, expectation, </a:t>
+            </a:r>
+            <a:br>
+              <a:rPr lang="en-US" dirty="0"/>
+            </a:br>
+            <a:r>
+              <a:rPr lang="en-US" dirty="0"/>
+              <a:t>conditional densities, Bayes’ theorem</a:t>
             </a:r>
           </a:p>
           <a:p>
             <a:pPr lvl="1"/>
             <a:r>
               <a:rPr lang="en-US" dirty="0"/>
-              <a:t>And free!</a:t>
-            </a:r>
-          </a:p>
-          <a:p>
-            <a:r>
-              <a:rPr lang="en-US" dirty="0"/>
-              <a:t>What you need to know</a:t>
+              <a:t>Will provide a short review</a:t>
             </a:r>
           </a:p>
           <a:p>
             <a:pPr lvl="1"/>
             <a:r>
               <a:rPr lang="en-US" dirty="0"/>
-              <a:t>You do not need to know python before class.  But we will go over it quickly.</a:t>
+              <a:t>NYU classes:  Data analysis or Intro Probability are sufficient</a:t>
+            </a:r>
+          </a:p>
+          <a:p>
+            <a:r>
+              <a:rPr lang="en-US" dirty="0"/>
+              <a:t>Undergraduate calculus and linear algebra</a:t>
             </a:r>
           </a:p>
           <a:p>
             <a:pPr lvl="1"/>
             <a:r>
               <a:rPr lang="en-US" dirty="0"/>
-              <a:t>You should have experience in some programming language (</a:t>
-            </a:r>
-            <a:r>
-              <a:rPr lang="en-US" dirty="0" err="1"/>
-              <a:t>eg</a:t>
-            </a:r>
-            <a:r>
-              <a:rPr lang="en-US" dirty="0"/>
-              <a:t>. MATLAB). </a:t>
+              <a:t>Vectors, matrices, partial derivatives, gradients.</a:t>
             </a:r>
           </a:p>
           <a:p>
             <a:pPr lvl="1"/>
             <a:r>
               <a:rPr lang="en-US" dirty="0"/>
-              <a:t>You should know or being willing to learn object-oriented programming </a:t>
-            </a:r>
-          </a:p>
-          <a:p>
-            <a:r>
-              <a:rPr lang="en-US" dirty="0"/>
-              <a:t>Resources:</a:t>
+              <a:t>Again, we will provide a brief review</a:t>
+            </a:r>
+          </a:p>
+          <a:p>
+            <a:r>
+              <a:rPr lang="en-US" dirty="0"/>
+              <a:t>No machine learning experience is necessary</a:t>
             </a:r>
           </a:p>
           <a:p>
             <a:pPr lvl="1"/>
             <a:r>
               <a:rPr lang="en-US" dirty="0"/>
-              <a:t>Installing python and </a:t>
-            </a:r>
-            <a:r>
-              <a:rPr lang="en-US" dirty="0" err="1"/>
-              <a:t>ipython</a:t>
-            </a:r>
-            <a:r>
-              <a:rPr lang="en-US" dirty="0"/>
-              <a:t> notebook (make sure you install Version 3.12)</a:t>
-            </a:r>
-            <a:br>
-              <a:rPr lang="en-US" dirty="0"/>
-            </a:br>
-            <a:r>
-              <a:rPr lang="en-US" u="sng" dirty="0">
-                <a:hlinkClick r:id="rId2"/>
-              </a:rPr>
-              <a:t>http://jupyter-notebook-beginner-guide.readthedocs.io/en/latest/index.html</a:t>
-            </a:r>
-            <a:r>
-              <a:rPr lang="en-US" dirty="0"/>
-              <a:t> </a:t>
+              <a:t>If you have ML experience, do NOT take this class.  </a:t>
             </a:r>
           </a:p>
           <a:p>
             <a:pPr lvl="1"/>
             <a:r>
-              <a:rPr lang="es-419" dirty="0"/>
-              <a:t>Python tutorial:   </a:t>
-            </a:r>
-            <a:r>
-              <a:rPr lang="es-419" u="sng" dirty="0">
-                <a:hlinkClick r:id="rId3"/>
-              </a:rPr>
-              <a:t>https://docs.python.org/3/tutorial/</a:t>
-            </a:r>
-            <a:r>
-              <a:rPr lang="es-419" dirty="0"/>
-              <a:t> </a:t>
-            </a:r>
-            <a:endParaRPr lang="en-US" dirty="0"/>
-          </a:p>
-          <a:p>
-            <a:pPr lvl="1"/>
-            <a:r>
-              <a:rPr lang="en-US" dirty="0" err="1"/>
-              <a:t>Numpy</a:t>
-            </a:r>
-            <a:r>
-              <a:rPr lang="en-US" dirty="0"/>
-              <a:t>:  </a:t>
-            </a:r>
-            <a:r>
-              <a:rPr lang="en-US" dirty="0">
-                <a:hlinkClick r:id="rId4"/>
-              </a:rPr>
-              <a:t>http://cs231n.github.io/python-numpy-tutorial/</a:t>
-            </a:r>
-            <a:endParaRPr lang="en-US" dirty="0"/>
-          </a:p>
-          <a:p>
-            <a:pPr lvl="1"/>
-            <a:endParaRPr lang="en-US" dirty="0"/>
+              <a:rPr lang="en-US" dirty="0"/>
+              <a:t>Take Graduate probability (Fall) then Advanced machine learning (Spring)</a:t>
+            </a:r>
           </a:p>
         </p:txBody>
       </p:sp>
@@ -9580,7 +10397,7 @@
     </p:spTree>
     <p:extLst>
       <p:ext uri="{BB962C8B-B14F-4D97-AF65-F5344CB8AC3E}">
-        <p14:creationId xmlns:p14="http://schemas.microsoft.com/office/powerpoint/2010/main" val="1840468307"/>
+        <p14:creationId xmlns:p14="http://schemas.microsoft.com/office/powerpoint/2010/main" val="1913674990"/>
       </p:ext>
     </p:extLst>
   </p:cSld>
@@ -9624,7 +10441,7 @@
           <a:p>
             <a:r>
               <a:rPr lang="en-US" dirty="0"/>
-              <a:t>Grading:  Undergraduate</a:t>
+              <a:t>Pre-Requisites Programming</a:t>
             </a:r>
           </a:p>
         </p:txBody>
@@ -9641,88 +10458,138 @@
         </p:nvSpPr>
         <p:spPr/>
         <p:txBody>
-          <a:bodyPr/>
+          <a:bodyPr>
+            <a:normAutofit/>
+          </a:bodyPr>
           <a:lstStyle/>
           <a:p>
             <a:r>
               <a:rPr lang="en-US" dirty="0"/>
-              <a:t>Midterm 1:  25%, Midterm 2: 25%, Labs, HW: 25%, Final project: 25%</a:t>
-            </a:r>
-          </a:p>
-          <a:p>
-            <a:r>
-              <a:rPr lang="en-US" dirty="0"/>
-              <a:t>Labs:  Simple python exercises</a:t>
+              <a:t>Python</a:t>
             </a:r>
           </a:p>
           <a:p>
             <a:pPr lvl="1"/>
             <a:r>
               <a:rPr lang="en-US" dirty="0"/>
-              <a:t>Given as </a:t>
+              <a:t>All labs are in python, similar to object-oriented MATLAB, but many more libraries.  </a:t>
+            </a:r>
+          </a:p>
+          <a:p>
+            <a:pPr lvl="1"/>
+            <a:r>
+              <a:rPr lang="en-US" dirty="0"/>
+              <a:t>And free!</a:t>
+            </a:r>
+          </a:p>
+          <a:p>
+            <a:r>
+              <a:rPr lang="en-US" dirty="0"/>
+              <a:t>What you need to know</a:t>
+            </a:r>
+          </a:p>
+          <a:p>
+            <a:pPr lvl="1"/>
+            <a:r>
+              <a:rPr lang="en-US" dirty="0"/>
+              <a:t>You do not need to know python before class.  But we will go over it quickly.</a:t>
+            </a:r>
+          </a:p>
+          <a:p>
+            <a:pPr lvl="1"/>
+            <a:r>
+              <a:rPr lang="en-US" dirty="0"/>
+              <a:t>You should have experience in some programming language (</a:t>
             </a:r>
             <a:r>
               <a:rPr lang="en-US" dirty="0" err="1"/>
-              <a:t>jupyter</a:t>
-            </a:r>
-            <a:r>
-              <a:rPr lang="en-US" dirty="0"/>
-              <a:t> notebook that you complete.</a:t>
-            </a:r>
-          </a:p>
-          <a:p>
-            <a:r>
-              <a:rPr lang="en-US" dirty="0"/>
-              <a:t>Midterms</a:t>
+              <a:t>eg</a:t>
+            </a:r>
+            <a:r>
+              <a:rPr lang="en-US" dirty="0"/>
+              <a:t>. MATLAB). </a:t>
             </a:r>
           </a:p>
           <a:p>
             <a:pPr lvl="1"/>
             <a:r>
               <a:rPr lang="en-US" dirty="0"/>
-              <a:t>Each over approx. 3-4 weeks of material</a:t>
+              <a:t>You should know or being willing to learn object-oriented programming </a:t>
+            </a:r>
+          </a:p>
+          <a:p>
+            <a:r>
+              <a:rPr lang="en-US" dirty="0"/>
+              <a:t>Resources:</a:t>
             </a:r>
           </a:p>
           <a:p>
             <a:pPr lvl="1"/>
             <a:r>
               <a:rPr lang="en-US" dirty="0"/>
-              <a:t>Closed book with cheat sheet.  </a:t>
+              <a:t>Installing python and </a:t>
+            </a:r>
+            <a:r>
+              <a:rPr lang="en-US" dirty="0" err="1"/>
+              <a:t>ipython</a:t>
+            </a:r>
+            <a:r>
+              <a:rPr lang="en-US" dirty="0"/>
+              <a:t> notebook (make sure you install Version 3.12)</a:t>
+            </a:r>
+            <a:br>
+              <a:rPr lang="en-US" dirty="0"/>
+            </a:br>
+            <a:r>
+              <a:rPr lang="en-US" u="sng" dirty="0">
+                <a:hlinkClick r:id="rId2"/>
+              </a:rPr>
+              <a:t>http://jupyter-notebook-beginner-guide.readthedocs.io/en/latest/index.html</a:t>
+            </a:r>
+            <a:r>
+              <a:rPr lang="en-US" dirty="0"/>
+              <a:t> </a:t>
             </a:r>
           </a:p>
           <a:p>
             <a:pPr lvl="1"/>
             <a:r>
-              <a:rPr lang="en-US" dirty="0"/>
-              <a:t>Follows homework and quiz problems + some very basic python questions</a:t>
-            </a:r>
-          </a:p>
-          <a:p>
-            <a:r>
-              <a:rPr lang="en-US" dirty="0"/>
-              <a:t>Final project:  </a:t>
-            </a:r>
+              <a:rPr lang="es-419" dirty="0"/>
+              <a:t>Python tutorial:   </a:t>
+            </a:r>
+            <a:r>
+              <a:rPr lang="es-419" u="sng" dirty="0">
+                <a:hlinkClick r:id="rId3"/>
+              </a:rPr>
+              <a:t>https://docs.python.org/3/tutorial/</a:t>
+            </a:r>
+            <a:r>
+              <a:rPr lang="es-419" dirty="0"/>
+              <a:t> </a:t>
+            </a:r>
+            <a:endParaRPr lang="en-US" dirty="0"/>
           </a:p>
           <a:p>
             <a:pPr lvl="1"/>
             <a:r>
-              <a:rPr lang="en-US" dirty="0"/>
-              <a:t>Use machine learning in some interesting way.</a:t>
-            </a:r>
+              <a:rPr lang="en-US" dirty="0" err="1"/>
+              <a:t>Numpy</a:t>
+            </a:r>
+            <a:r>
+              <a:rPr lang="en-US" dirty="0"/>
+              <a:t>:  </a:t>
+            </a:r>
+            <a:r>
+              <a:rPr lang="en-US" dirty="0">
+                <a:hlinkClick r:id="rId4"/>
+              </a:rPr>
+              <a:t>http://cs231n.github.io/python-numpy-tutorial/</a:t>
+            </a:r>
+            <a:endParaRPr lang="en-US" dirty="0"/>
           </a:p>
           <a:p>
             <a:pPr lvl="1"/>
-            <a:r>
-              <a:rPr lang="en-US" dirty="0"/>
-              <a:t>Must use data and python analysis.</a:t>
-            </a:r>
-          </a:p>
-          <a:p>
-            <a:pPr lvl="1"/>
-            <a:r>
-              <a:rPr lang="en-US" dirty="0"/>
-              <a:t>Provide final report.</a:t>
-            </a:r>
+            <a:endParaRPr lang="en-US" dirty="0"/>
           </a:p>
         </p:txBody>
       </p:sp>
@@ -9752,7 +10619,7 @@
     </p:spTree>
     <p:extLst>
       <p:ext uri="{BB962C8B-B14F-4D97-AF65-F5344CB8AC3E}">
-        <p14:creationId xmlns:p14="http://schemas.microsoft.com/office/powerpoint/2010/main" val="2111641996"/>
+        <p14:creationId xmlns:p14="http://schemas.microsoft.com/office/powerpoint/2010/main" val="1840468307"/>
       </p:ext>
     </p:extLst>
   </p:cSld>

</xml_diff>